<commit_message>
Added a note on what to do in case of GIT conflicts updating this file (or other binaries)
</commit_message>
<xml_diff>
--- a/ViNo Get Started DEVELOPMENT V4.0.pptx
+++ b/ViNo Get Started DEVELOPMENT V4.0.pptx
@@ -23,9 +23,10 @@
     <p:sldId id="276" r:id="rId17"/>
     <p:sldId id="272" r:id="rId18"/>
     <p:sldId id="279" r:id="rId19"/>
-    <p:sldId id="275" r:id="rId20"/>
-    <p:sldId id="277" r:id="rId21"/>
-    <p:sldId id="278" r:id="rId22"/>
+    <p:sldId id="282" r:id="rId20"/>
+    <p:sldId id="275" r:id="rId21"/>
+    <p:sldId id="277" r:id="rId22"/>
+    <p:sldId id="278" r:id="rId23"/>
   </p:sldIdLst>
   <p:sldSz cx="12192000" cy="6858000"/>
   <p:notesSz cx="6858000" cy="9144000"/>
@@ -3175,6 +3176,1396 @@
       <dsp:cNvGrpSpPr/>
     </dsp:nvGrpSpPr>
     <dsp:grpSpPr/>
+    <dsp:sp modelId="{78A916C1-45FB-6547-9A4C-8052BBEDDF7C}">
+      <dsp:nvSpPr>
+        <dsp:cNvPr id="0" name=""/>
+        <dsp:cNvSpPr/>
+      </dsp:nvSpPr>
+      <dsp:spPr>
+        <a:xfrm>
+          <a:off x="5629275" y="2977518"/>
+          <a:ext cx="4978160" cy="273458"/>
+        </a:xfrm>
+        <a:custGeom>
+          <a:avLst/>
+          <a:gdLst/>
+          <a:ahLst/>
+          <a:cxnLst/>
+          <a:rect l="0" t="0" r="0" b="0"/>
+          <a:pathLst>
+            <a:path>
+              <a:moveTo>
+                <a:pt x="0" y="0"/>
+              </a:moveTo>
+              <a:lnTo>
+                <a:pt x="0" y="136729"/>
+              </a:lnTo>
+              <a:lnTo>
+                <a:pt x="4978160" y="136729"/>
+              </a:lnTo>
+              <a:lnTo>
+                <a:pt x="4978160" y="273458"/>
+              </a:lnTo>
+            </a:path>
+          </a:pathLst>
+        </a:custGeom>
+        <a:noFill/>
+        <a:ln w="6350" cap="flat" cmpd="sng" algn="ctr">
+          <a:solidFill>
+            <a:schemeClr val="accent1">
+              <a:shade val="60000"/>
+              <a:hueOff val="0"/>
+              <a:satOff val="0"/>
+              <a:lumOff val="0"/>
+              <a:alphaOff val="0"/>
+            </a:schemeClr>
+          </a:solidFill>
+          <a:prstDash val="solid"/>
+          <a:miter lim="800000"/>
+        </a:ln>
+        <a:effectLst/>
+      </dsp:spPr>
+      <dsp:style>
+        <a:lnRef idx="1">
+          <a:scrgbClr r="0" g="0" b="0"/>
+        </a:lnRef>
+        <a:fillRef idx="0">
+          <a:scrgbClr r="0" g="0" b="0"/>
+        </a:fillRef>
+        <a:effectRef idx="0">
+          <a:scrgbClr r="0" g="0" b="0"/>
+        </a:effectRef>
+        <a:fontRef idx="minor"/>
+      </dsp:style>
+    </dsp:sp>
+    <dsp:sp modelId="{E1763A78-C2EC-8745-BA79-01246259F009}">
+      <dsp:nvSpPr>
+        <dsp:cNvPr id="0" name=""/>
+        <dsp:cNvSpPr/>
+      </dsp:nvSpPr>
+      <dsp:spPr>
+        <a:xfrm>
+          <a:off x="5629275" y="2977518"/>
+          <a:ext cx="3402520" cy="273458"/>
+        </a:xfrm>
+        <a:custGeom>
+          <a:avLst/>
+          <a:gdLst/>
+          <a:ahLst/>
+          <a:cxnLst/>
+          <a:rect l="0" t="0" r="0" b="0"/>
+          <a:pathLst>
+            <a:path>
+              <a:moveTo>
+                <a:pt x="0" y="0"/>
+              </a:moveTo>
+              <a:lnTo>
+                <a:pt x="0" y="136729"/>
+              </a:lnTo>
+              <a:lnTo>
+                <a:pt x="3402520" y="136729"/>
+              </a:lnTo>
+              <a:lnTo>
+                <a:pt x="3402520" y="273458"/>
+              </a:lnTo>
+            </a:path>
+          </a:pathLst>
+        </a:custGeom>
+        <a:noFill/>
+        <a:ln w="6350" cap="flat" cmpd="sng" algn="ctr">
+          <a:solidFill>
+            <a:schemeClr val="accent1">
+              <a:shade val="60000"/>
+              <a:hueOff val="0"/>
+              <a:satOff val="0"/>
+              <a:lumOff val="0"/>
+              <a:alphaOff val="0"/>
+            </a:schemeClr>
+          </a:solidFill>
+          <a:prstDash val="solid"/>
+          <a:miter lim="800000"/>
+        </a:ln>
+        <a:effectLst/>
+      </dsp:spPr>
+      <dsp:style>
+        <a:lnRef idx="1">
+          <a:scrgbClr r="0" g="0" b="0"/>
+        </a:lnRef>
+        <a:fillRef idx="0">
+          <a:scrgbClr r="0" g="0" b="0"/>
+        </a:fillRef>
+        <a:effectRef idx="0">
+          <a:scrgbClr r="0" g="0" b="0"/>
+        </a:effectRef>
+        <a:fontRef idx="minor"/>
+      </dsp:style>
+    </dsp:sp>
+    <dsp:sp modelId="{CBAE471B-FE89-6E48-B021-5FC4136D6F1B}">
+      <dsp:nvSpPr>
+        <dsp:cNvPr id="0" name=""/>
+        <dsp:cNvSpPr/>
+      </dsp:nvSpPr>
+      <dsp:spPr>
+        <a:xfrm>
+          <a:off x="5629275" y="2977518"/>
+          <a:ext cx="1826880" cy="273458"/>
+        </a:xfrm>
+        <a:custGeom>
+          <a:avLst/>
+          <a:gdLst/>
+          <a:ahLst/>
+          <a:cxnLst/>
+          <a:rect l="0" t="0" r="0" b="0"/>
+          <a:pathLst>
+            <a:path>
+              <a:moveTo>
+                <a:pt x="0" y="0"/>
+              </a:moveTo>
+              <a:lnTo>
+                <a:pt x="0" y="136729"/>
+              </a:lnTo>
+              <a:lnTo>
+                <a:pt x="1826880" y="136729"/>
+              </a:lnTo>
+              <a:lnTo>
+                <a:pt x="1826880" y="273458"/>
+              </a:lnTo>
+            </a:path>
+          </a:pathLst>
+        </a:custGeom>
+        <a:noFill/>
+        <a:ln w="6350" cap="flat" cmpd="sng" algn="ctr">
+          <a:solidFill>
+            <a:schemeClr val="accent1">
+              <a:shade val="60000"/>
+              <a:hueOff val="0"/>
+              <a:satOff val="0"/>
+              <a:lumOff val="0"/>
+              <a:alphaOff val="0"/>
+            </a:schemeClr>
+          </a:solidFill>
+          <a:prstDash val="solid"/>
+          <a:miter lim="800000"/>
+        </a:ln>
+        <a:effectLst/>
+      </dsp:spPr>
+      <dsp:style>
+        <a:lnRef idx="1">
+          <a:scrgbClr r="0" g="0" b="0"/>
+        </a:lnRef>
+        <a:fillRef idx="0">
+          <a:scrgbClr r="0" g="0" b="0"/>
+        </a:fillRef>
+        <a:effectRef idx="0">
+          <a:scrgbClr r="0" g="0" b="0"/>
+        </a:effectRef>
+        <a:fontRef idx="minor"/>
+      </dsp:style>
+    </dsp:sp>
+    <dsp:sp modelId="{9B87DF03-7C43-5D46-8C35-C4D697A5299A}">
+      <dsp:nvSpPr>
+        <dsp:cNvPr id="0" name=""/>
+        <dsp:cNvSpPr/>
+      </dsp:nvSpPr>
+      <dsp:spPr>
+        <a:xfrm>
+          <a:off x="5629275" y="2977518"/>
+          <a:ext cx="251239" cy="273458"/>
+        </a:xfrm>
+        <a:custGeom>
+          <a:avLst/>
+          <a:gdLst/>
+          <a:ahLst/>
+          <a:cxnLst/>
+          <a:rect l="0" t="0" r="0" b="0"/>
+          <a:pathLst>
+            <a:path>
+              <a:moveTo>
+                <a:pt x="0" y="0"/>
+              </a:moveTo>
+              <a:lnTo>
+                <a:pt x="0" y="136729"/>
+              </a:lnTo>
+              <a:lnTo>
+                <a:pt x="251239" y="136729"/>
+              </a:lnTo>
+              <a:lnTo>
+                <a:pt x="251239" y="273458"/>
+              </a:lnTo>
+            </a:path>
+          </a:pathLst>
+        </a:custGeom>
+        <a:noFill/>
+        <a:ln w="6350" cap="flat" cmpd="sng" algn="ctr">
+          <a:solidFill>
+            <a:schemeClr val="accent1">
+              <a:shade val="60000"/>
+              <a:hueOff val="0"/>
+              <a:satOff val="0"/>
+              <a:lumOff val="0"/>
+              <a:alphaOff val="0"/>
+            </a:schemeClr>
+          </a:solidFill>
+          <a:prstDash val="solid"/>
+          <a:miter lim="800000"/>
+        </a:ln>
+        <a:effectLst/>
+      </dsp:spPr>
+      <dsp:style>
+        <a:lnRef idx="1">
+          <a:scrgbClr r="0" g="0" b="0"/>
+        </a:lnRef>
+        <a:fillRef idx="0">
+          <a:scrgbClr r="0" g="0" b="0"/>
+        </a:fillRef>
+        <a:effectRef idx="0">
+          <a:scrgbClr r="0" g="0" b="0"/>
+        </a:effectRef>
+        <a:fontRef idx="minor"/>
+      </dsp:style>
+    </dsp:sp>
+    <dsp:sp modelId="{8DFCF146-7C2B-7247-9822-DCE752D9A16A}">
+      <dsp:nvSpPr>
+        <dsp:cNvPr id="0" name=""/>
+        <dsp:cNvSpPr/>
+      </dsp:nvSpPr>
+      <dsp:spPr>
+        <a:xfrm>
+          <a:off x="4304874" y="2977518"/>
+          <a:ext cx="1324400" cy="273458"/>
+        </a:xfrm>
+        <a:custGeom>
+          <a:avLst/>
+          <a:gdLst/>
+          <a:ahLst/>
+          <a:cxnLst/>
+          <a:rect l="0" t="0" r="0" b="0"/>
+          <a:pathLst>
+            <a:path>
+              <a:moveTo>
+                <a:pt x="1324400" y="0"/>
+              </a:moveTo>
+              <a:lnTo>
+                <a:pt x="1324400" y="136729"/>
+              </a:lnTo>
+              <a:lnTo>
+                <a:pt x="0" y="136729"/>
+              </a:lnTo>
+              <a:lnTo>
+                <a:pt x="0" y="273458"/>
+              </a:lnTo>
+            </a:path>
+          </a:pathLst>
+        </a:custGeom>
+        <a:noFill/>
+        <a:ln w="6350" cap="flat" cmpd="sng" algn="ctr">
+          <a:solidFill>
+            <a:schemeClr val="accent1">
+              <a:shade val="60000"/>
+              <a:hueOff val="0"/>
+              <a:satOff val="0"/>
+              <a:lumOff val="0"/>
+              <a:alphaOff val="0"/>
+            </a:schemeClr>
+          </a:solidFill>
+          <a:prstDash val="solid"/>
+          <a:miter lim="800000"/>
+        </a:ln>
+        <a:effectLst/>
+      </dsp:spPr>
+      <dsp:style>
+        <a:lnRef idx="1">
+          <a:scrgbClr r="0" g="0" b="0"/>
+        </a:lnRef>
+        <a:fillRef idx="0">
+          <a:scrgbClr r="0" g="0" b="0"/>
+        </a:fillRef>
+        <a:effectRef idx="0">
+          <a:scrgbClr r="0" g="0" b="0"/>
+        </a:effectRef>
+        <a:fontRef idx="minor"/>
+      </dsp:style>
+    </dsp:sp>
+    <dsp:sp modelId="{CE8BF669-6A0C-B04A-80AC-D3DA0F976ABF}">
+      <dsp:nvSpPr>
+        <dsp:cNvPr id="0" name=""/>
+        <dsp:cNvSpPr/>
+      </dsp:nvSpPr>
+      <dsp:spPr>
+        <a:xfrm>
+          <a:off x="993181" y="3887782"/>
+          <a:ext cx="287934" cy="1327659"/>
+        </a:xfrm>
+        <a:custGeom>
+          <a:avLst/>
+          <a:gdLst/>
+          <a:ahLst/>
+          <a:cxnLst/>
+          <a:rect l="0" t="0" r="0" b="0"/>
+          <a:pathLst>
+            <a:path>
+              <a:moveTo>
+                <a:pt x="0" y="0"/>
+              </a:moveTo>
+              <a:lnTo>
+                <a:pt x="0" y="1327659"/>
+              </a:lnTo>
+              <a:lnTo>
+                <a:pt x="287934" y="1327659"/>
+              </a:lnTo>
+            </a:path>
+          </a:pathLst>
+        </a:custGeom>
+        <a:noFill/>
+        <a:ln w="6350" cap="flat" cmpd="sng" algn="ctr">
+          <a:solidFill>
+            <a:schemeClr val="accent1">
+              <a:shade val="80000"/>
+              <a:hueOff val="0"/>
+              <a:satOff val="0"/>
+              <a:lumOff val="0"/>
+              <a:alphaOff val="0"/>
+            </a:schemeClr>
+          </a:solidFill>
+          <a:prstDash val="solid"/>
+          <a:miter lim="800000"/>
+        </a:ln>
+        <a:effectLst/>
+      </dsp:spPr>
+      <dsp:style>
+        <a:lnRef idx="1">
+          <a:scrgbClr r="0" g="0" b="0"/>
+        </a:lnRef>
+        <a:fillRef idx="0">
+          <a:scrgbClr r="0" g="0" b="0"/>
+        </a:fillRef>
+        <a:effectRef idx="0">
+          <a:scrgbClr r="0" g="0" b="0"/>
+        </a:effectRef>
+        <a:fontRef idx="minor"/>
+      </dsp:style>
+    </dsp:sp>
+    <dsp:sp modelId="{A491FDAF-2359-B140-B33A-8323B9468F07}">
+      <dsp:nvSpPr>
+        <dsp:cNvPr id="0" name=""/>
+        <dsp:cNvSpPr/>
+      </dsp:nvSpPr>
+      <dsp:spPr>
+        <a:xfrm>
+          <a:off x="2051168" y="2977518"/>
+          <a:ext cx="3578106" cy="259173"/>
+        </a:xfrm>
+        <a:custGeom>
+          <a:avLst/>
+          <a:gdLst/>
+          <a:ahLst/>
+          <a:cxnLst/>
+          <a:rect l="0" t="0" r="0" b="0"/>
+          <a:pathLst>
+            <a:path>
+              <a:moveTo>
+                <a:pt x="3578106" y="0"/>
+              </a:moveTo>
+              <a:lnTo>
+                <a:pt x="3578106" y="122444"/>
+              </a:lnTo>
+              <a:lnTo>
+                <a:pt x="0" y="122444"/>
+              </a:lnTo>
+              <a:lnTo>
+                <a:pt x="0" y="259173"/>
+              </a:lnTo>
+            </a:path>
+          </a:pathLst>
+        </a:custGeom>
+        <a:noFill/>
+        <a:ln w="6350" cap="flat" cmpd="sng" algn="ctr">
+          <a:solidFill>
+            <a:schemeClr val="accent1">
+              <a:shade val="60000"/>
+              <a:hueOff val="0"/>
+              <a:satOff val="0"/>
+              <a:lumOff val="0"/>
+              <a:alphaOff val="0"/>
+            </a:schemeClr>
+          </a:solidFill>
+          <a:prstDash val="solid"/>
+          <a:miter lim="800000"/>
+        </a:ln>
+        <a:effectLst/>
+      </dsp:spPr>
+      <dsp:style>
+        <a:lnRef idx="1">
+          <a:scrgbClr r="0" g="0" b="0"/>
+        </a:lnRef>
+        <a:fillRef idx="0">
+          <a:scrgbClr r="0" g="0" b="0"/>
+        </a:fillRef>
+        <a:effectRef idx="0">
+          <a:scrgbClr r="0" g="0" b="0"/>
+        </a:effectRef>
+        <a:fontRef idx="minor"/>
+      </dsp:style>
+    </dsp:sp>
+    <dsp:sp modelId="{5B6F6B59-8F5B-6345-9968-75BE1F974883}">
+      <dsp:nvSpPr>
+        <dsp:cNvPr id="0" name=""/>
+        <dsp:cNvSpPr/>
+      </dsp:nvSpPr>
+      <dsp:spPr>
+        <a:xfrm>
+          <a:off x="3039716" y="1423370"/>
+          <a:ext cx="5179116" cy="1554147"/>
+        </a:xfrm>
+        <a:prstGeom prst="rect">
+          <a:avLst/>
+        </a:prstGeom>
+        <a:gradFill rotWithShape="0">
+          <a:gsLst>
+            <a:gs pos="0">
+              <a:schemeClr val="accent1">
+                <a:hueOff val="0"/>
+                <a:satOff val="0"/>
+                <a:lumOff val="0"/>
+                <a:alphaOff val="0"/>
+                <a:satMod val="103000"/>
+                <a:lumMod val="102000"/>
+                <a:tint val="94000"/>
+              </a:schemeClr>
+            </a:gs>
+            <a:gs pos="50000">
+              <a:schemeClr val="accent1">
+                <a:hueOff val="0"/>
+                <a:satOff val="0"/>
+                <a:lumOff val="0"/>
+                <a:alphaOff val="0"/>
+                <a:satMod val="110000"/>
+                <a:lumMod val="100000"/>
+                <a:shade val="100000"/>
+              </a:schemeClr>
+            </a:gs>
+            <a:gs pos="100000">
+              <a:schemeClr val="accent1">
+                <a:hueOff val="0"/>
+                <a:satOff val="0"/>
+                <a:lumOff val="0"/>
+                <a:alphaOff val="0"/>
+                <a:lumMod val="99000"/>
+                <a:satMod val="120000"/>
+                <a:shade val="78000"/>
+              </a:schemeClr>
+            </a:gs>
+          </a:gsLst>
+          <a:lin ang="5400000" scaled="0"/>
+        </a:gradFill>
+        <a:ln>
+          <a:noFill/>
+        </a:ln>
+        <a:effectLst/>
+      </dsp:spPr>
+      <dsp:style>
+        <a:lnRef idx="0">
+          <a:scrgbClr r="0" g="0" b="0"/>
+        </a:lnRef>
+        <a:fillRef idx="3">
+          <a:scrgbClr r="0" g="0" b="0"/>
+        </a:fillRef>
+        <a:effectRef idx="2">
+          <a:scrgbClr r="0" g="0" b="0"/>
+        </a:effectRef>
+        <a:fontRef idx="minor">
+          <a:schemeClr val="lt1"/>
+        </a:fontRef>
+      </dsp:style>
+      <dsp:txBody>
+        <a:bodyPr spcFirstLastPara="0" vert="horz" wrap="square" lIns="8255" tIns="8255" rIns="8255" bIns="8255" numCol="1" spcCol="1270" anchor="ctr" anchorCtr="0">
+          <a:noAutofit/>
+        </a:bodyPr>
+        <a:lstStyle/>
+        <a:p>
+          <a:pPr lvl="0" algn="ctr" defTabSz="577850">
+            <a:lnSpc>
+              <a:spcPct val="90000"/>
+            </a:lnSpc>
+            <a:spcBef>
+              <a:spcPct val="0"/>
+            </a:spcBef>
+            <a:spcAft>
+              <a:spcPct val="35000"/>
+            </a:spcAft>
+          </a:pPr>
+          <a:r>
+            <a:rPr lang="en-US" sz="1300" b="1" kern="1200" dirty="0" err="1" smtClean="0"/>
+            <a:t>MainApp</a:t>
+          </a:r>
+          <a:endParaRPr lang="en-US" sz="1300" b="1" kern="1200" dirty="0" smtClean="0"/>
+        </a:p>
+        <a:p>
+          <a:pPr lvl="0" algn="ctr" defTabSz="577850">
+            <a:lnSpc>
+              <a:spcPct val="90000"/>
+            </a:lnSpc>
+            <a:spcBef>
+              <a:spcPct val="0"/>
+            </a:spcBef>
+            <a:spcAft>
+              <a:spcPct val="35000"/>
+            </a:spcAft>
+          </a:pPr>
+          <a:r>
+            <a:rPr lang="en-US" sz="1300" kern="1200" dirty="0" smtClean="0"/>
+            <a:t>- The </a:t>
+          </a:r>
+          <a:r>
+            <a:rPr lang="en-US" sz="1300" kern="1200" dirty="0" err="1" smtClean="0"/>
+            <a:t>MainApp</a:t>
+          </a:r>
+          <a:r>
+            <a:rPr lang="en-US" sz="1300" kern="1200" dirty="0" smtClean="0"/>
+            <a:t> instantiates all views that require a window</a:t>
+          </a:r>
+          <a:endParaRPr lang="en-US" sz="1300" kern="1200" dirty="0"/>
+        </a:p>
+      </dsp:txBody>
+      <dsp:txXfrm>
+        <a:off x="3039716" y="1423370"/>
+        <a:ext cx="5179116" cy="1554147"/>
+      </dsp:txXfrm>
+    </dsp:sp>
+    <dsp:sp modelId="{3D554475-69D0-6C4E-8CB5-D5A8D6CC03B4}">
+      <dsp:nvSpPr>
+        <dsp:cNvPr id="0" name=""/>
+        <dsp:cNvSpPr/>
+      </dsp:nvSpPr>
+      <dsp:spPr>
+        <a:xfrm>
+          <a:off x="728685" y="3236691"/>
+          <a:ext cx="2644966" cy="651091"/>
+        </a:xfrm>
+        <a:prstGeom prst="rect">
+          <a:avLst/>
+        </a:prstGeom>
+        <a:gradFill rotWithShape="0">
+          <a:gsLst>
+            <a:gs pos="0">
+              <a:schemeClr val="accent1">
+                <a:hueOff val="0"/>
+                <a:satOff val="0"/>
+                <a:lumOff val="0"/>
+                <a:alphaOff val="0"/>
+                <a:satMod val="103000"/>
+                <a:lumMod val="102000"/>
+                <a:tint val="94000"/>
+              </a:schemeClr>
+            </a:gs>
+            <a:gs pos="50000">
+              <a:schemeClr val="accent1">
+                <a:hueOff val="0"/>
+                <a:satOff val="0"/>
+                <a:lumOff val="0"/>
+                <a:alphaOff val="0"/>
+                <a:satMod val="110000"/>
+                <a:lumMod val="100000"/>
+                <a:shade val="100000"/>
+              </a:schemeClr>
+            </a:gs>
+            <a:gs pos="100000">
+              <a:schemeClr val="accent1">
+                <a:hueOff val="0"/>
+                <a:satOff val="0"/>
+                <a:lumOff val="0"/>
+                <a:alphaOff val="0"/>
+                <a:lumMod val="99000"/>
+                <a:satMod val="120000"/>
+                <a:shade val="78000"/>
+              </a:schemeClr>
+            </a:gs>
+          </a:gsLst>
+          <a:lin ang="5400000" scaled="0"/>
+        </a:gradFill>
+        <a:ln>
+          <a:noFill/>
+        </a:ln>
+        <a:effectLst/>
+      </dsp:spPr>
+      <dsp:style>
+        <a:lnRef idx="0">
+          <a:scrgbClr r="0" g="0" b="0"/>
+        </a:lnRef>
+        <a:fillRef idx="3">
+          <a:scrgbClr r="0" g="0" b="0"/>
+        </a:fillRef>
+        <a:effectRef idx="2">
+          <a:scrgbClr r="0" g="0" b="0"/>
+        </a:effectRef>
+        <a:fontRef idx="minor">
+          <a:schemeClr val="lt1"/>
+        </a:fontRef>
+      </dsp:style>
+      <dsp:txBody>
+        <a:bodyPr spcFirstLastPara="0" vert="horz" wrap="square" lIns="8255" tIns="8255" rIns="8255" bIns="8255" numCol="1" spcCol="1270" anchor="ctr" anchorCtr="0">
+          <a:noAutofit/>
+        </a:bodyPr>
+        <a:lstStyle/>
+        <a:p>
+          <a:pPr lvl="0" algn="ctr" defTabSz="577850">
+            <a:lnSpc>
+              <a:spcPct val="90000"/>
+            </a:lnSpc>
+            <a:spcBef>
+              <a:spcPct val="0"/>
+            </a:spcBef>
+            <a:spcAft>
+              <a:spcPct val="35000"/>
+            </a:spcAft>
+          </a:pPr>
+          <a:r>
+            <a:rPr lang="en-US" sz="1300" b="1" kern="1200" dirty="0" err="1" smtClean="0"/>
+            <a:t>RootLayout</a:t>
+          </a:r>
+          <a:endParaRPr lang="en-US" sz="1300" b="1" kern="1200" dirty="0" smtClean="0"/>
+        </a:p>
+        <a:p>
+          <a:pPr lvl="0" algn="ctr" defTabSz="577850">
+            <a:lnSpc>
+              <a:spcPct val="90000"/>
+            </a:lnSpc>
+            <a:spcBef>
+              <a:spcPct val="0"/>
+            </a:spcBef>
+            <a:spcAft>
+              <a:spcPct val="35000"/>
+            </a:spcAft>
+          </a:pPr>
+          <a:r>
+            <a:rPr lang="en-US" sz="1300" kern="1200" dirty="0" smtClean="0"/>
+            <a:t>- The basic window and </a:t>
+          </a:r>
+          <a:r>
+            <a:rPr lang="en-US" sz="1300" kern="1200" dirty="0" err="1" smtClean="0"/>
+            <a:t>menubar</a:t>
+          </a:r>
+          <a:endParaRPr lang="en-US" sz="1300" kern="1200" dirty="0"/>
+        </a:p>
+      </dsp:txBody>
+      <dsp:txXfrm>
+        <a:off x="728685" y="3236691"/>
+        <a:ext cx="2644966" cy="651091"/>
+      </dsp:txXfrm>
+    </dsp:sp>
+    <dsp:sp modelId="{1FC02C9F-9E09-8C42-AF69-19C03F84467B}">
+      <dsp:nvSpPr>
+        <dsp:cNvPr id="0" name=""/>
+        <dsp:cNvSpPr/>
+      </dsp:nvSpPr>
+      <dsp:spPr>
+        <a:xfrm>
+          <a:off x="1281116" y="4889896"/>
+          <a:ext cx="2719060" cy="651091"/>
+        </a:xfrm>
+        <a:prstGeom prst="rect">
+          <a:avLst/>
+        </a:prstGeom>
+        <a:gradFill rotWithShape="0">
+          <a:gsLst>
+            <a:gs pos="0">
+              <a:schemeClr val="accent1">
+                <a:hueOff val="0"/>
+                <a:satOff val="0"/>
+                <a:lumOff val="0"/>
+                <a:alphaOff val="0"/>
+                <a:satMod val="103000"/>
+                <a:lumMod val="102000"/>
+                <a:tint val="94000"/>
+              </a:schemeClr>
+            </a:gs>
+            <a:gs pos="50000">
+              <a:schemeClr val="accent1">
+                <a:hueOff val="0"/>
+                <a:satOff val="0"/>
+                <a:lumOff val="0"/>
+                <a:alphaOff val="0"/>
+                <a:satMod val="110000"/>
+                <a:lumMod val="100000"/>
+                <a:shade val="100000"/>
+              </a:schemeClr>
+            </a:gs>
+            <a:gs pos="100000">
+              <a:schemeClr val="accent1">
+                <a:hueOff val="0"/>
+                <a:satOff val="0"/>
+                <a:lumOff val="0"/>
+                <a:alphaOff val="0"/>
+                <a:lumMod val="99000"/>
+                <a:satMod val="120000"/>
+                <a:shade val="78000"/>
+              </a:schemeClr>
+            </a:gs>
+          </a:gsLst>
+          <a:lin ang="5400000" scaled="0"/>
+        </a:gradFill>
+        <a:ln>
+          <a:noFill/>
+        </a:ln>
+        <a:effectLst/>
+      </dsp:spPr>
+      <dsp:style>
+        <a:lnRef idx="0">
+          <a:scrgbClr r="0" g="0" b="0"/>
+        </a:lnRef>
+        <a:fillRef idx="3">
+          <a:scrgbClr r="0" g="0" b="0"/>
+        </a:fillRef>
+        <a:effectRef idx="2">
+          <a:scrgbClr r="0" g="0" b="0"/>
+        </a:effectRef>
+        <a:fontRef idx="minor">
+          <a:schemeClr val="lt1"/>
+        </a:fontRef>
+      </dsp:style>
+      <dsp:txBody>
+        <a:bodyPr spcFirstLastPara="0" vert="horz" wrap="square" lIns="8255" tIns="8255" rIns="8255" bIns="8255" numCol="1" spcCol="1270" anchor="ctr" anchorCtr="0">
+          <a:noAutofit/>
+        </a:bodyPr>
+        <a:lstStyle/>
+        <a:p>
+          <a:pPr lvl="0" algn="ctr" defTabSz="577850">
+            <a:lnSpc>
+              <a:spcPct val="90000"/>
+            </a:lnSpc>
+            <a:spcBef>
+              <a:spcPct val="0"/>
+            </a:spcBef>
+            <a:spcAft>
+              <a:spcPct val="35000"/>
+            </a:spcAft>
+          </a:pPr>
+          <a:r>
+            <a:rPr lang="en-US" sz="1300" kern="1200" dirty="0" err="1" smtClean="0"/>
+            <a:t>MainEditorView</a:t>
+          </a:r>
+          <a:endParaRPr lang="en-US" sz="1300" kern="1200" dirty="0" smtClean="0"/>
+        </a:p>
+        <a:p>
+          <a:pPr lvl="0" algn="ctr" defTabSz="577850">
+            <a:lnSpc>
+              <a:spcPct val="90000"/>
+            </a:lnSpc>
+            <a:spcBef>
+              <a:spcPct val="0"/>
+            </a:spcBef>
+            <a:spcAft>
+              <a:spcPct val="35000"/>
+            </a:spcAft>
+          </a:pPr>
+          <a:r>
+            <a:rPr lang="en-US" sz="1300" kern="1200" dirty="0" smtClean="0"/>
+            <a:t>- The graphical UI content</a:t>
+          </a:r>
+          <a:endParaRPr lang="en-US" sz="1300" kern="1200" dirty="0"/>
+        </a:p>
+      </dsp:txBody>
+      <dsp:txXfrm>
+        <a:off x="1281116" y="4889896"/>
+        <a:ext cx="2719060" cy="651091"/>
+      </dsp:txXfrm>
+    </dsp:sp>
+    <dsp:sp modelId="{9D264941-B744-944A-A6C3-E09FB9D87287}">
+      <dsp:nvSpPr>
+        <dsp:cNvPr id="0" name=""/>
+        <dsp:cNvSpPr/>
+      </dsp:nvSpPr>
+      <dsp:spPr>
+        <a:xfrm>
+          <a:off x="3653783" y="3250976"/>
+          <a:ext cx="1302182" cy="1246637"/>
+        </a:xfrm>
+        <a:prstGeom prst="rect">
+          <a:avLst/>
+        </a:prstGeom>
+        <a:gradFill rotWithShape="0">
+          <a:gsLst>
+            <a:gs pos="0">
+              <a:schemeClr val="accent1">
+                <a:hueOff val="0"/>
+                <a:satOff val="0"/>
+                <a:lumOff val="0"/>
+                <a:alphaOff val="0"/>
+                <a:satMod val="103000"/>
+                <a:lumMod val="102000"/>
+                <a:tint val="94000"/>
+              </a:schemeClr>
+            </a:gs>
+            <a:gs pos="50000">
+              <a:schemeClr val="accent1">
+                <a:hueOff val="0"/>
+                <a:satOff val="0"/>
+                <a:lumOff val="0"/>
+                <a:alphaOff val="0"/>
+                <a:satMod val="110000"/>
+                <a:lumMod val="100000"/>
+                <a:shade val="100000"/>
+              </a:schemeClr>
+            </a:gs>
+            <a:gs pos="100000">
+              <a:schemeClr val="accent1">
+                <a:hueOff val="0"/>
+                <a:satOff val="0"/>
+                <a:lumOff val="0"/>
+                <a:alphaOff val="0"/>
+                <a:lumMod val="99000"/>
+                <a:satMod val="120000"/>
+                <a:shade val="78000"/>
+              </a:schemeClr>
+            </a:gs>
+          </a:gsLst>
+          <a:lin ang="5400000" scaled="0"/>
+        </a:gradFill>
+        <a:ln>
+          <a:noFill/>
+        </a:ln>
+        <a:effectLst/>
+      </dsp:spPr>
+      <dsp:style>
+        <a:lnRef idx="0">
+          <a:scrgbClr r="0" g="0" b="0"/>
+        </a:lnRef>
+        <a:fillRef idx="3">
+          <a:scrgbClr r="0" g="0" b="0"/>
+        </a:fillRef>
+        <a:effectRef idx="2">
+          <a:scrgbClr r="0" g="0" b="0"/>
+        </a:effectRef>
+        <a:fontRef idx="minor">
+          <a:schemeClr val="lt1"/>
+        </a:fontRef>
+      </dsp:style>
+      <dsp:txBody>
+        <a:bodyPr spcFirstLastPara="0" vert="horz" wrap="square" lIns="8255" tIns="8255" rIns="8255" bIns="8255" numCol="1" spcCol="1270" anchor="ctr" anchorCtr="0">
+          <a:noAutofit/>
+        </a:bodyPr>
+        <a:lstStyle/>
+        <a:p>
+          <a:pPr lvl="0" algn="ctr" defTabSz="577850">
+            <a:lnSpc>
+              <a:spcPct val="90000"/>
+            </a:lnSpc>
+            <a:spcBef>
+              <a:spcPct val="0"/>
+            </a:spcBef>
+            <a:spcAft>
+              <a:spcPct val="35000"/>
+            </a:spcAft>
+          </a:pPr>
+          <a:r>
+            <a:rPr lang="en-US" sz="1300" kern="1200" dirty="0" err="1" smtClean="0"/>
+            <a:t>CompiledView</a:t>
+          </a:r>
+          <a:endParaRPr lang="en-US" sz="1300" kern="1200" dirty="0" smtClean="0"/>
+        </a:p>
+        <a:p>
+          <a:pPr lvl="0" algn="ctr" defTabSz="577850">
+            <a:lnSpc>
+              <a:spcPct val="90000"/>
+            </a:lnSpc>
+            <a:spcBef>
+              <a:spcPct val="0"/>
+            </a:spcBef>
+            <a:spcAft>
+              <a:spcPct val="35000"/>
+            </a:spcAft>
+          </a:pPr>
+          <a:r>
+            <a:rPr lang="en-US" sz="1300" kern="1200" dirty="0" smtClean="0"/>
+            <a:t>- Shows the video GUI</a:t>
+          </a:r>
+          <a:endParaRPr lang="en-US" sz="1300" kern="1200" dirty="0"/>
+        </a:p>
+      </dsp:txBody>
+      <dsp:txXfrm>
+        <a:off x="3653783" y="3250976"/>
+        <a:ext cx="1302182" cy="1246637"/>
+      </dsp:txXfrm>
+    </dsp:sp>
+    <dsp:sp modelId="{13D0ABDF-E05E-774A-9CDE-34211E6EFA3F}">
+      <dsp:nvSpPr>
+        <dsp:cNvPr id="0" name=""/>
+        <dsp:cNvSpPr/>
+      </dsp:nvSpPr>
+      <dsp:spPr>
+        <a:xfrm>
+          <a:off x="5229423" y="3250976"/>
+          <a:ext cx="1302182" cy="1246637"/>
+        </a:xfrm>
+        <a:prstGeom prst="rect">
+          <a:avLst/>
+        </a:prstGeom>
+        <a:gradFill rotWithShape="0">
+          <a:gsLst>
+            <a:gs pos="0">
+              <a:schemeClr val="accent1">
+                <a:hueOff val="0"/>
+                <a:satOff val="0"/>
+                <a:lumOff val="0"/>
+                <a:alphaOff val="0"/>
+                <a:satMod val="103000"/>
+                <a:lumMod val="102000"/>
+                <a:tint val="94000"/>
+              </a:schemeClr>
+            </a:gs>
+            <a:gs pos="50000">
+              <a:schemeClr val="accent1">
+                <a:hueOff val="0"/>
+                <a:satOff val="0"/>
+                <a:lumOff val="0"/>
+                <a:alphaOff val="0"/>
+                <a:satMod val="110000"/>
+                <a:lumMod val="100000"/>
+                <a:shade val="100000"/>
+              </a:schemeClr>
+            </a:gs>
+            <a:gs pos="100000">
+              <a:schemeClr val="accent1">
+                <a:hueOff val="0"/>
+                <a:satOff val="0"/>
+                <a:lumOff val="0"/>
+                <a:alphaOff val="0"/>
+                <a:lumMod val="99000"/>
+                <a:satMod val="120000"/>
+                <a:shade val="78000"/>
+              </a:schemeClr>
+            </a:gs>
+          </a:gsLst>
+          <a:lin ang="5400000" scaled="0"/>
+        </a:gradFill>
+        <a:ln>
+          <a:noFill/>
+        </a:ln>
+        <a:effectLst/>
+      </dsp:spPr>
+      <dsp:style>
+        <a:lnRef idx="0">
+          <a:scrgbClr r="0" g="0" b="0"/>
+        </a:lnRef>
+        <a:fillRef idx="3">
+          <a:scrgbClr r="0" g="0" b="0"/>
+        </a:fillRef>
+        <a:effectRef idx="2">
+          <a:scrgbClr r="0" g="0" b="0"/>
+        </a:effectRef>
+        <a:fontRef idx="minor">
+          <a:schemeClr val="lt1"/>
+        </a:fontRef>
+      </dsp:style>
+      <dsp:txBody>
+        <a:bodyPr spcFirstLastPara="0" vert="horz" wrap="square" lIns="8255" tIns="8255" rIns="8255" bIns="8255" numCol="1" spcCol="1270" anchor="ctr" anchorCtr="0">
+          <a:noAutofit/>
+        </a:bodyPr>
+        <a:lstStyle/>
+        <a:p>
+          <a:pPr lvl="0" algn="ctr" defTabSz="577850">
+            <a:lnSpc>
+              <a:spcPct val="90000"/>
+            </a:lnSpc>
+            <a:spcBef>
+              <a:spcPct val="0"/>
+            </a:spcBef>
+            <a:spcAft>
+              <a:spcPct val="35000"/>
+            </a:spcAft>
+          </a:pPr>
+          <a:r>
+            <a:rPr lang="en-US" sz="1300" kern="1200" dirty="0" err="1" smtClean="0"/>
+            <a:t>GetStartedView</a:t>
+          </a:r>
+          <a:endParaRPr lang="en-US" sz="1300" kern="1200" dirty="0" smtClean="0"/>
+        </a:p>
+        <a:p>
+          <a:pPr lvl="0" algn="ctr" defTabSz="577850">
+            <a:lnSpc>
+              <a:spcPct val="90000"/>
+            </a:lnSpc>
+            <a:spcBef>
+              <a:spcPct val="0"/>
+            </a:spcBef>
+            <a:spcAft>
+              <a:spcPct val="35000"/>
+            </a:spcAft>
+          </a:pPr>
+          <a:r>
+            <a:rPr lang="en-US" sz="1300" kern="1200" dirty="0" smtClean="0"/>
+            <a:t>- A quick introduction to </a:t>
+          </a:r>
+          <a:r>
+            <a:rPr lang="en-US" sz="1300" kern="1200" dirty="0" err="1" smtClean="0"/>
+            <a:t>ViNO</a:t>
+          </a:r>
+          <a:endParaRPr lang="en-US" sz="1300" kern="1200" dirty="0"/>
+        </a:p>
+      </dsp:txBody>
+      <dsp:txXfrm>
+        <a:off x="5229423" y="3250976"/>
+        <a:ext cx="1302182" cy="1246637"/>
+      </dsp:txXfrm>
+    </dsp:sp>
+    <dsp:sp modelId="{63C14AB2-CDA5-254B-BD0E-31094C7416D6}">
+      <dsp:nvSpPr>
+        <dsp:cNvPr id="0" name=""/>
+        <dsp:cNvSpPr/>
+      </dsp:nvSpPr>
+      <dsp:spPr>
+        <a:xfrm>
+          <a:off x="6805064" y="3250976"/>
+          <a:ext cx="1302182" cy="1246637"/>
+        </a:xfrm>
+        <a:prstGeom prst="rect">
+          <a:avLst/>
+        </a:prstGeom>
+        <a:gradFill rotWithShape="0">
+          <a:gsLst>
+            <a:gs pos="0">
+              <a:schemeClr val="accent1">
+                <a:hueOff val="0"/>
+                <a:satOff val="0"/>
+                <a:lumOff val="0"/>
+                <a:alphaOff val="0"/>
+                <a:satMod val="103000"/>
+                <a:lumMod val="102000"/>
+                <a:tint val="94000"/>
+              </a:schemeClr>
+            </a:gs>
+            <a:gs pos="50000">
+              <a:schemeClr val="accent1">
+                <a:hueOff val="0"/>
+                <a:satOff val="0"/>
+                <a:lumOff val="0"/>
+                <a:alphaOff val="0"/>
+                <a:satMod val="110000"/>
+                <a:lumMod val="100000"/>
+                <a:shade val="100000"/>
+              </a:schemeClr>
+            </a:gs>
+            <a:gs pos="100000">
+              <a:schemeClr val="accent1">
+                <a:hueOff val="0"/>
+                <a:satOff val="0"/>
+                <a:lumOff val="0"/>
+                <a:alphaOff val="0"/>
+                <a:lumMod val="99000"/>
+                <a:satMod val="120000"/>
+                <a:shade val="78000"/>
+              </a:schemeClr>
+            </a:gs>
+          </a:gsLst>
+          <a:lin ang="5400000" scaled="0"/>
+        </a:gradFill>
+        <a:ln>
+          <a:noFill/>
+        </a:ln>
+        <a:effectLst/>
+      </dsp:spPr>
+      <dsp:style>
+        <a:lnRef idx="0">
+          <a:scrgbClr r="0" g="0" b="0"/>
+        </a:lnRef>
+        <a:fillRef idx="3">
+          <a:scrgbClr r="0" g="0" b="0"/>
+        </a:fillRef>
+        <a:effectRef idx="2">
+          <a:scrgbClr r="0" g="0" b="0"/>
+        </a:effectRef>
+        <a:fontRef idx="minor">
+          <a:schemeClr val="lt1"/>
+        </a:fontRef>
+      </dsp:style>
+      <dsp:txBody>
+        <a:bodyPr spcFirstLastPara="0" vert="horz" wrap="square" lIns="8255" tIns="8255" rIns="8255" bIns="8255" numCol="1" spcCol="1270" anchor="ctr" anchorCtr="0">
+          <a:noAutofit/>
+        </a:bodyPr>
+        <a:lstStyle/>
+        <a:p>
+          <a:pPr lvl="0" algn="ctr" defTabSz="577850">
+            <a:lnSpc>
+              <a:spcPct val="90000"/>
+            </a:lnSpc>
+            <a:spcBef>
+              <a:spcPct val="0"/>
+            </a:spcBef>
+            <a:spcAft>
+              <a:spcPct val="35000"/>
+            </a:spcAft>
+          </a:pPr>
+          <a:r>
+            <a:rPr lang="en-US" sz="1300" kern="1200" dirty="0" err="1" smtClean="0"/>
+            <a:t>ImportVideosView</a:t>
+          </a:r>
+          <a:endParaRPr lang="en-US" sz="1300" kern="1200" dirty="0" smtClean="0"/>
+        </a:p>
+        <a:p>
+          <a:pPr lvl="0" algn="ctr" defTabSz="577850">
+            <a:lnSpc>
+              <a:spcPct val="90000"/>
+            </a:lnSpc>
+            <a:spcBef>
+              <a:spcPct val="0"/>
+            </a:spcBef>
+            <a:spcAft>
+              <a:spcPct val="35000"/>
+            </a:spcAft>
+          </a:pPr>
+          <a:r>
+            <a:rPr lang="en-US" sz="1300" kern="1200" dirty="0" smtClean="0"/>
+            <a:t>- Importing videos from the camera or memory card</a:t>
+          </a:r>
+          <a:endParaRPr lang="en-US" sz="1300" kern="1200" dirty="0"/>
+        </a:p>
+      </dsp:txBody>
+      <dsp:txXfrm>
+        <a:off x="6805064" y="3250976"/>
+        <a:ext cx="1302182" cy="1246637"/>
+      </dsp:txXfrm>
+    </dsp:sp>
+    <dsp:sp modelId="{5A1501C8-A3B6-3144-A030-37CB02246727}">
+      <dsp:nvSpPr>
+        <dsp:cNvPr id="0" name=""/>
+        <dsp:cNvSpPr/>
+      </dsp:nvSpPr>
+      <dsp:spPr>
+        <a:xfrm>
+          <a:off x="8380704" y="3250976"/>
+          <a:ext cx="1302182" cy="1246637"/>
+        </a:xfrm>
+        <a:prstGeom prst="rect">
+          <a:avLst/>
+        </a:prstGeom>
+        <a:gradFill rotWithShape="0">
+          <a:gsLst>
+            <a:gs pos="0">
+              <a:schemeClr val="accent1">
+                <a:hueOff val="0"/>
+                <a:satOff val="0"/>
+                <a:lumOff val="0"/>
+                <a:alphaOff val="0"/>
+                <a:satMod val="103000"/>
+                <a:lumMod val="102000"/>
+                <a:tint val="94000"/>
+              </a:schemeClr>
+            </a:gs>
+            <a:gs pos="50000">
+              <a:schemeClr val="accent1">
+                <a:hueOff val="0"/>
+                <a:satOff val="0"/>
+                <a:lumOff val="0"/>
+                <a:alphaOff val="0"/>
+                <a:satMod val="110000"/>
+                <a:lumMod val="100000"/>
+                <a:shade val="100000"/>
+              </a:schemeClr>
+            </a:gs>
+            <a:gs pos="100000">
+              <a:schemeClr val="accent1">
+                <a:hueOff val="0"/>
+                <a:satOff val="0"/>
+                <a:lumOff val="0"/>
+                <a:alphaOff val="0"/>
+                <a:lumMod val="99000"/>
+                <a:satMod val="120000"/>
+                <a:shade val="78000"/>
+              </a:schemeClr>
+            </a:gs>
+          </a:gsLst>
+          <a:lin ang="5400000" scaled="0"/>
+        </a:gradFill>
+        <a:ln>
+          <a:noFill/>
+        </a:ln>
+        <a:effectLst/>
+      </dsp:spPr>
+      <dsp:style>
+        <a:lnRef idx="0">
+          <a:scrgbClr r="0" g="0" b="0"/>
+        </a:lnRef>
+        <a:fillRef idx="3">
+          <a:scrgbClr r="0" g="0" b="0"/>
+        </a:fillRef>
+        <a:effectRef idx="2">
+          <a:scrgbClr r="0" g="0" b="0"/>
+        </a:effectRef>
+        <a:fontRef idx="minor">
+          <a:schemeClr val="lt1"/>
+        </a:fontRef>
+      </dsp:style>
+      <dsp:txBody>
+        <a:bodyPr spcFirstLastPara="0" vert="horz" wrap="square" lIns="8255" tIns="8255" rIns="8255" bIns="8255" numCol="1" spcCol="1270" anchor="ctr" anchorCtr="0">
+          <a:noAutofit/>
+        </a:bodyPr>
+        <a:lstStyle/>
+        <a:p>
+          <a:pPr lvl="0" algn="ctr" defTabSz="577850">
+            <a:lnSpc>
+              <a:spcPct val="90000"/>
+            </a:lnSpc>
+            <a:spcBef>
+              <a:spcPct val="0"/>
+            </a:spcBef>
+            <a:spcAft>
+              <a:spcPct val="35000"/>
+            </a:spcAft>
+          </a:pPr>
+          <a:r>
+            <a:rPr lang="en-US" sz="1300" b="1" kern="1200" dirty="0" smtClean="0"/>
+            <a:t>MediaView</a:t>
+          </a:r>
+        </a:p>
+        <a:p>
+          <a:pPr lvl="0" algn="ctr" defTabSz="577850">
+            <a:lnSpc>
+              <a:spcPct val="90000"/>
+            </a:lnSpc>
+            <a:spcBef>
+              <a:spcPct val="0"/>
+            </a:spcBef>
+            <a:spcAft>
+              <a:spcPct val="35000"/>
+            </a:spcAft>
+          </a:pPr>
+          <a:r>
+            <a:rPr lang="en-US" sz="1300" kern="1200" dirty="0" smtClean="0"/>
+            <a:t>- Not used, see </a:t>
+          </a:r>
+          <a:r>
+            <a:rPr lang="en-US" sz="1300" kern="1200" dirty="0" err="1" smtClean="0"/>
+            <a:t>CompiledView</a:t>
+          </a:r>
+          <a:r>
+            <a:rPr lang="en-US" sz="1300" kern="1200" dirty="0" smtClean="0"/>
+            <a:t> instead</a:t>
+          </a:r>
+          <a:endParaRPr lang="en-US" sz="1300" kern="1200" dirty="0"/>
+        </a:p>
+      </dsp:txBody>
+      <dsp:txXfrm>
+        <a:off x="8380704" y="3250976"/>
+        <a:ext cx="1302182" cy="1246637"/>
+      </dsp:txXfrm>
+    </dsp:sp>
+    <dsp:sp modelId="{F76AFC63-9020-C646-8913-D2BA5F56F803}">
+      <dsp:nvSpPr>
+        <dsp:cNvPr id="0" name=""/>
+        <dsp:cNvSpPr/>
+      </dsp:nvSpPr>
+      <dsp:spPr>
+        <a:xfrm>
+          <a:off x="9956344" y="3250976"/>
+          <a:ext cx="1302182" cy="1246644"/>
+        </a:xfrm>
+        <a:prstGeom prst="rect">
+          <a:avLst/>
+        </a:prstGeom>
+        <a:gradFill rotWithShape="0">
+          <a:gsLst>
+            <a:gs pos="0">
+              <a:schemeClr val="accent1">
+                <a:hueOff val="0"/>
+                <a:satOff val="0"/>
+                <a:lumOff val="0"/>
+                <a:alphaOff val="0"/>
+                <a:satMod val="103000"/>
+                <a:lumMod val="102000"/>
+                <a:tint val="94000"/>
+              </a:schemeClr>
+            </a:gs>
+            <a:gs pos="50000">
+              <a:schemeClr val="accent1">
+                <a:hueOff val="0"/>
+                <a:satOff val="0"/>
+                <a:lumOff val="0"/>
+                <a:alphaOff val="0"/>
+                <a:satMod val="110000"/>
+                <a:lumMod val="100000"/>
+                <a:shade val="100000"/>
+              </a:schemeClr>
+            </a:gs>
+            <a:gs pos="100000">
+              <a:schemeClr val="accent1">
+                <a:hueOff val="0"/>
+                <a:satOff val="0"/>
+                <a:lumOff val="0"/>
+                <a:alphaOff val="0"/>
+                <a:lumMod val="99000"/>
+                <a:satMod val="120000"/>
+                <a:shade val="78000"/>
+              </a:schemeClr>
+            </a:gs>
+          </a:gsLst>
+          <a:lin ang="5400000" scaled="0"/>
+        </a:gradFill>
+        <a:ln>
+          <a:noFill/>
+        </a:ln>
+        <a:effectLst/>
+      </dsp:spPr>
+      <dsp:style>
+        <a:lnRef idx="0">
+          <a:scrgbClr r="0" g="0" b="0"/>
+        </a:lnRef>
+        <a:fillRef idx="3">
+          <a:scrgbClr r="0" g="0" b="0"/>
+        </a:fillRef>
+        <a:effectRef idx="2">
+          <a:scrgbClr r="0" g="0" b="0"/>
+        </a:effectRef>
+        <a:fontRef idx="minor">
+          <a:schemeClr val="lt1"/>
+        </a:fontRef>
+      </dsp:style>
+      <dsp:txBody>
+        <a:bodyPr spcFirstLastPara="0" vert="horz" wrap="square" lIns="8255" tIns="8255" rIns="8255" bIns="8255" numCol="1" spcCol="1270" anchor="ctr" anchorCtr="0">
+          <a:noAutofit/>
+        </a:bodyPr>
+        <a:lstStyle/>
+        <a:p>
+          <a:pPr lvl="0" algn="ctr" defTabSz="577850">
+            <a:lnSpc>
+              <a:spcPct val="90000"/>
+            </a:lnSpc>
+            <a:spcBef>
+              <a:spcPct val="0"/>
+            </a:spcBef>
+            <a:spcAft>
+              <a:spcPct val="35000"/>
+            </a:spcAft>
+          </a:pPr>
+          <a:r>
+            <a:rPr lang="en-US" sz="1300" kern="1200" dirty="0" err="1" smtClean="0"/>
+            <a:t>NoteDetailsView</a:t>
+          </a:r>
+          <a:endParaRPr lang="en-US" sz="1300" kern="1200" dirty="0" smtClean="0"/>
+        </a:p>
+        <a:p>
+          <a:pPr lvl="0" algn="ctr" defTabSz="577850">
+            <a:lnSpc>
+              <a:spcPct val="90000"/>
+            </a:lnSpc>
+            <a:spcBef>
+              <a:spcPct val="0"/>
+            </a:spcBef>
+            <a:spcAft>
+              <a:spcPct val="35000"/>
+            </a:spcAft>
+          </a:pPr>
+          <a:r>
+            <a:rPr lang="en-US" sz="1300" kern="1200" dirty="0" smtClean="0"/>
+            <a:t>- Meta data GUI</a:t>
+          </a:r>
+          <a:endParaRPr lang="en-US" sz="1300" kern="1200" dirty="0"/>
+        </a:p>
+      </dsp:txBody>
+      <dsp:txXfrm>
+        <a:off x="9956344" y="3250976"/>
+        <a:ext cx="1302182" cy="1246644"/>
+      </dsp:txXfrm>
+    </dsp:sp>
   </dsp:spTree>
 </dsp:drawing>
 </file>
@@ -3187,6 +4578,906 @@
       <dsp:cNvGrpSpPr/>
     </dsp:nvGrpSpPr>
     <dsp:grpSpPr/>
+    <dsp:sp modelId="{A3661789-984B-4B12-AAFA-1703B25E4BE4}">
+      <dsp:nvSpPr>
+        <dsp:cNvPr id="0" name=""/>
+        <dsp:cNvSpPr/>
+      </dsp:nvSpPr>
+      <dsp:spPr>
+        <a:xfrm>
+          <a:off x="252061" y="1895742"/>
+          <a:ext cx="2634599" cy="1317299"/>
+        </a:xfrm>
+        <a:prstGeom prst="roundRect">
+          <a:avLst>
+            <a:gd name="adj" fmla="val 10000"/>
+          </a:avLst>
+        </a:prstGeom>
+        <a:solidFill>
+          <a:schemeClr val="accent1">
+            <a:hueOff val="0"/>
+            <a:satOff val="0"/>
+            <a:lumOff val="0"/>
+            <a:alphaOff val="0"/>
+          </a:schemeClr>
+        </a:solidFill>
+        <a:ln w="12700" cap="flat" cmpd="sng" algn="ctr">
+          <a:solidFill>
+            <a:schemeClr val="lt1">
+              <a:hueOff val="0"/>
+              <a:satOff val="0"/>
+              <a:lumOff val="0"/>
+              <a:alphaOff val="0"/>
+            </a:schemeClr>
+          </a:solidFill>
+          <a:prstDash val="solid"/>
+          <a:miter lim="800000"/>
+        </a:ln>
+        <a:effectLst/>
+      </dsp:spPr>
+      <dsp:style>
+        <a:lnRef idx="2">
+          <a:scrgbClr r="0" g="0" b="0"/>
+        </a:lnRef>
+        <a:fillRef idx="1">
+          <a:scrgbClr r="0" g="0" b="0"/>
+        </a:fillRef>
+        <a:effectRef idx="0">
+          <a:scrgbClr r="0" g="0" b="0"/>
+        </a:effectRef>
+        <a:fontRef idx="minor">
+          <a:schemeClr val="lt1"/>
+        </a:fontRef>
+      </dsp:style>
+      <dsp:txBody>
+        <a:bodyPr spcFirstLastPara="0" vert="horz" wrap="square" lIns="8255" tIns="8255" rIns="8255" bIns="8255" numCol="1" spcCol="1270" anchor="ctr" anchorCtr="0">
+          <a:noAutofit/>
+        </a:bodyPr>
+        <a:lstStyle/>
+        <a:p>
+          <a:pPr lvl="0" algn="ctr" defTabSz="577850">
+            <a:lnSpc>
+              <a:spcPct val="90000"/>
+            </a:lnSpc>
+            <a:spcBef>
+              <a:spcPct val="0"/>
+            </a:spcBef>
+            <a:spcAft>
+              <a:spcPct val="35000"/>
+            </a:spcAft>
+          </a:pPr>
+          <a:r>
+            <a:rPr lang="da-DK" sz="1300" kern="1200" dirty="0" err="1" smtClean="0"/>
+            <a:t>Mainapp.gopro</a:t>
+          </a:r>
+          <a:r>
+            <a:rPr lang="da-DK" sz="1300" kern="1200" dirty="0" smtClean="0"/>
+            <a:t>::</a:t>
+          </a:r>
+          <a:r>
+            <a:rPr lang="da-DK" sz="1300" kern="1200" dirty="0" err="1" smtClean="0"/>
+            <a:t>GoProAPI</a:t>
+          </a:r>
+          <a:endParaRPr lang="en-GB" sz="1300" kern="1200" dirty="0"/>
+        </a:p>
+      </dsp:txBody>
+      <dsp:txXfrm>
+        <a:off x="290643" y="1934324"/>
+        <a:ext cx="2557435" cy="1240135"/>
+      </dsp:txXfrm>
+    </dsp:sp>
+    <dsp:sp modelId="{BD868FF2-2C29-4C2A-9FDC-77A25C641E66}">
+      <dsp:nvSpPr>
+        <dsp:cNvPr id="0" name=""/>
+        <dsp:cNvSpPr/>
+      </dsp:nvSpPr>
+      <dsp:spPr>
+        <a:xfrm rot="18770822">
+          <a:off x="2638747" y="1959061"/>
+          <a:ext cx="1549665" cy="54492"/>
+        </a:xfrm>
+        <a:custGeom>
+          <a:avLst/>
+          <a:gdLst/>
+          <a:ahLst/>
+          <a:cxnLst/>
+          <a:rect l="0" t="0" r="0" b="0"/>
+          <a:pathLst>
+            <a:path>
+              <a:moveTo>
+                <a:pt x="0" y="27246"/>
+              </a:moveTo>
+              <a:lnTo>
+                <a:pt x="1549665" y="27246"/>
+              </a:lnTo>
+            </a:path>
+          </a:pathLst>
+        </a:custGeom>
+        <a:noFill/>
+        <a:ln w="12700" cap="flat" cmpd="sng" algn="ctr">
+          <a:solidFill>
+            <a:schemeClr val="accent1">
+              <a:shade val="60000"/>
+              <a:hueOff val="0"/>
+              <a:satOff val="0"/>
+              <a:lumOff val="0"/>
+              <a:alphaOff val="0"/>
+            </a:schemeClr>
+          </a:solidFill>
+          <a:prstDash val="solid"/>
+          <a:miter lim="800000"/>
+        </a:ln>
+        <a:effectLst/>
+      </dsp:spPr>
+      <dsp:style>
+        <a:lnRef idx="2">
+          <a:scrgbClr r="0" g="0" b="0"/>
+        </a:lnRef>
+        <a:fillRef idx="0">
+          <a:scrgbClr r="0" g="0" b="0"/>
+        </a:fillRef>
+        <a:effectRef idx="0">
+          <a:scrgbClr r="0" g="0" b="0"/>
+        </a:effectRef>
+        <a:fontRef idx="minor"/>
+      </dsp:style>
+      <dsp:txBody>
+        <a:bodyPr spcFirstLastPara="0" vert="horz" wrap="square" lIns="12700" tIns="0" rIns="12700" bIns="0" numCol="1" spcCol="1270" anchor="ctr" anchorCtr="0">
+          <a:noAutofit/>
+        </a:bodyPr>
+        <a:lstStyle/>
+        <a:p>
+          <a:pPr lvl="0" algn="ctr" defTabSz="222250">
+            <a:lnSpc>
+              <a:spcPct val="90000"/>
+            </a:lnSpc>
+            <a:spcBef>
+              <a:spcPct val="0"/>
+            </a:spcBef>
+            <a:spcAft>
+              <a:spcPct val="35000"/>
+            </a:spcAft>
+          </a:pPr>
+          <a:endParaRPr lang="en-GB" sz="500" kern="1200"/>
+        </a:p>
+      </dsp:txBody>
+      <dsp:txXfrm>
+        <a:off x="3374838" y="1947565"/>
+        <a:ext cx="77483" cy="77483"/>
+      </dsp:txXfrm>
+    </dsp:sp>
+    <dsp:sp modelId="{6E9A058B-3C46-4621-8C16-20C0E40254DB}">
+      <dsp:nvSpPr>
+        <dsp:cNvPr id="0" name=""/>
+        <dsp:cNvSpPr/>
+      </dsp:nvSpPr>
+      <dsp:spPr>
+        <a:xfrm>
+          <a:off x="3940500" y="759571"/>
+          <a:ext cx="2634599" cy="1317299"/>
+        </a:xfrm>
+        <a:prstGeom prst="roundRect">
+          <a:avLst>
+            <a:gd name="adj" fmla="val 10000"/>
+          </a:avLst>
+        </a:prstGeom>
+        <a:solidFill>
+          <a:schemeClr val="accent1">
+            <a:hueOff val="0"/>
+            <a:satOff val="0"/>
+            <a:lumOff val="0"/>
+            <a:alphaOff val="0"/>
+          </a:schemeClr>
+        </a:solidFill>
+        <a:ln w="12700" cap="flat" cmpd="sng" algn="ctr">
+          <a:solidFill>
+            <a:schemeClr val="lt1">
+              <a:hueOff val="0"/>
+              <a:satOff val="0"/>
+              <a:lumOff val="0"/>
+              <a:alphaOff val="0"/>
+            </a:schemeClr>
+          </a:solidFill>
+          <a:prstDash val="solid"/>
+          <a:miter lim="800000"/>
+        </a:ln>
+        <a:effectLst/>
+      </dsp:spPr>
+      <dsp:style>
+        <a:lnRef idx="2">
+          <a:scrgbClr r="0" g="0" b="0"/>
+        </a:lnRef>
+        <a:fillRef idx="1">
+          <a:scrgbClr r="0" g="0" b="0"/>
+        </a:fillRef>
+        <a:effectRef idx="0">
+          <a:scrgbClr r="0" g="0" b="0"/>
+        </a:effectRef>
+        <a:fontRef idx="minor">
+          <a:schemeClr val="lt1"/>
+        </a:fontRef>
+      </dsp:style>
+      <dsp:txBody>
+        <a:bodyPr spcFirstLastPara="0" vert="horz" wrap="square" lIns="8255" tIns="8255" rIns="8255" bIns="8255" numCol="1" spcCol="1270" anchor="ctr" anchorCtr="0">
+          <a:noAutofit/>
+        </a:bodyPr>
+        <a:lstStyle/>
+        <a:p>
+          <a:pPr lvl="0" algn="ctr" defTabSz="577850">
+            <a:lnSpc>
+              <a:spcPct val="90000"/>
+            </a:lnSpc>
+            <a:spcBef>
+              <a:spcPct val="0"/>
+            </a:spcBef>
+            <a:spcAft>
+              <a:spcPct val="35000"/>
+            </a:spcAft>
+          </a:pPr>
+          <a:r>
+            <a:rPr lang="da-DK" sz="1300" kern="1200" dirty="0" err="1" smtClean="0"/>
+            <a:t>GoProHelper</a:t>
+          </a:r>
+          <a:r>
+            <a:rPr lang="da-DK" sz="1300" kern="1200" dirty="0" smtClean="0"/>
+            <a:t>::</a:t>
+          </a:r>
+          <a:r>
+            <a:rPr lang="da-DK" sz="1300" kern="1200" dirty="0" err="1" smtClean="0"/>
+            <a:t>GoProHelper</a:t>
+          </a:r>
+          <a:endParaRPr lang="en-GB" sz="1300" kern="1200" dirty="0"/>
+        </a:p>
+      </dsp:txBody>
+      <dsp:txXfrm>
+        <a:off x="3979082" y="798153"/>
+        <a:ext cx="2557435" cy="1240135"/>
+      </dsp:txXfrm>
+    </dsp:sp>
+    <dsp:sp modelId="{BC3C51C2-FE4A-461D-8012-EA4C23FD71B7}">
+      <dsp:nvSpPr>
+        <dsp:cNvPr id="0" name=""/>
+        <dsp:cNvSpPr/>
+      </dsp:nvSpPr>
+      <dsp:spPr>
+        <a:xfrm rot="19457599">
+          <a:off x="6453115" y="1012252"/>
+          <a:ext cx="1297807" cy="54492"/>
+        </a:xfrm>
+        <a:custGeom>
+          <a:avLst/>
+          <a:gdLst/>
+          <a:ahLst/>
+          <a:cxnLst/>
+          <a:rect l="0" t="0" r="0" b="0"/>
+          <a:pathLst>
+            <a:path>
+              <a:moveTo>
+                <a:pt x="0" y="27246"/>
+              </a:moveTo>
+              <a:lnTo>
+                <a:pt x="1297807" y="27246"/>
+              </a:lnTo>
+            </a:path>
+          </a:pathLst>
+        </a:custGeom>
+        <a:noFill/>
+        <a:ln w="12700" cap="flat" cmpd="sng" algn="ctr">
+          <a:solidFill>
+            <a:schemeClr val="accent1">
+              <a:shade val="80000"/>
+              <a:hueOff val="0"/>
+              <a:satOff val="0"/>
+              <a:lumOff val="0"/>
+              <a:alphaOff val="0"/>
+            </a:schemeClr>
+          </a:solidFill>
+          <a:prstDash val="solid"/>
+          <a:miter lim="800000"/>
+        </a:ln>
+        <a:effectLst/>
+      </dsp:spPr>
+      <dsp:style>
+        <a:lnRef idx="2">
+          <a:scrgbClr r="0" g="0" b="0"/>
+        </a:lnRef>
+        <a:fillRef idx="0">
+          <a:scrgbClr r="0" g="0" b="0"/>
+        </a:fillRef>
+        <a:effectRef idx="0">
+          <a:scrgbClr r="0" g="0" b="0"/>
+        </a:effectRef>
+        <a:fontRef idx="minor"/>
+      </dsp:style>
+      <dsp:txBody>
+        <a:bodyPr spcFirstLastPara="0" vert="horz" wrap="square" lIns="12700" tIns="0" rIns="12700" bIns="0" numCol="1" spcCol="1270" anchor="ctr" anchorCtr="0">
+          <a:noAutofit/>
+        </a:bodyPr>
+        <a:lstStyle/>
+        <a:p>
+          <a:pPr lvl="0" algn="ctr" defTabSz="222250">
+            <a:lnSpc>
+              <a:spcPct val="90000"/>
+            </a:lnSpc>
+            <a:spcBef>
+              <a:spcPct val="0"/>
+            </a:spcBef>
+            <a:spcAft>
+              <a:spcPct val="35000"/>
+            </a:spcAft>
+          </a:pPr>
+          <a:endParaRPr lang="en-GB" sz="500" kern="1200"/>
+        </a:p>
+      </dsp:txBody>
+      <dsp:txXfrm>
+        <a:off x="7069574" y="1007052"/>
+        <a:ext cx="64890" cy="64890"/>
+      </dsp:txXfrm>
+    </dsp:sp>
+    <dsp:sp modelId="{9F0FD1FC-514D-4BAB-9922-4EEF3DA665B0}">
+      <dsp:nvSpPr>
+        <dsp:cNvPr id="0" name=""/>
+        <dsp:cNvSpPr/>
+      </dsp:nvSpPr>
+      <dsp:spPr>
+        <a:xfrm>
+          <a:off x="7628939" y="2124"/>
+          <a:ext cx="2634599" cy="1317299"/>
+        </a:xfrm>
+        <a:prstGeom prst="roundRect">
+          <a:avLst>
+            <a:gd name="adj" fmla="val 10000"/>
+          </a:avLst>
+        </a:prstGeom>
+        <a:solidFill>
+          <a:schemeClr val="accent1">
+            <a:hueOff val="0"/>
+            <a:satOff val="0"/>
+            <a:lumOff val="0"/>
+            <a:alphaOff val="0"/>
+          </a:schemeClr>
+        </a:solidFill>
+        <a:ln w="12700" cap="flat" cmpd="sng" algn="ctr">
+          <a:solidFill>
+            <a:schemeClr val="lt1">
+              <a:hueOff val="0"/>
+              <a:satOff val="0"/>
+              <a:lumOff val="0"/>
+              <a:alphaOff val="0"/>
+            </a:schemeClr>
+          </a:solidFill>
+          <a:prstDash val="solid"/>
+          <a:miter lim="800000"/>
+        </a:ln>
+        <a:effectLst/>
+      </dsp:spPr>
+      <dsp:style>
+        <a:lnRef idx="2">
+          <a:scrgbClr r="0" g="0" b="0"/>
+        </a:lnRef>
+        <a:fillRef idx="1">
+          <a:scrgbClr r="0" g="0" b="0"/>
+        </a:fillRef>
+        <a:effectRef idx="0">
+          <a:scrgbClr r="0" g="0" b="0"/>
+        </a:effectRef>
+        <a:fontRef idx="minor">
+          <a:schemeClr val="lt1"/>
+        </a:fontRef>
+      </dsp:style>
+      <dsp:txBody>
+        <a:bodyPr spcFirstLastPara="0" vert="horz" wrap="square" lIns="8255" tIns="8255" rIns="8255" bIns="8255" numCol="1" spcCol="1270" anchor="ctr" anchorCtr="0">
+          <a:noAutofit/>
+        </a:bodyPr>
+        <a:lstStyle/>
+        <a:p>
+          <a:pPr lvl="0" algn="ctr" defTabSz="577850">
+            <a:lnSpc>
+              <a:spcPct val="90000"/>
+            </a:lnSpc>
+            <a:spcBef>
+              <a:spcPct val="0"/>
+            </a:spcBef>
+            <a:spcAft>
+              <a:spcPct val="35000"/>
+            </a:spcAft>
+          </a:pPr>
+          <a:r>
+            <a:rPr lang="da-DK" sz="1300" kern="1200" dirty="0" err="1" smtClean="0"/>
+            <a:t>mClient</a:t>
+          </a:r>
+          <a:r>
+            <a:rPr lang="da-DK" sz="1300" kern="1200" dirty="0" smtClean="0"/>
+            <a:t>::</a:t>
+          </a:r>
+          <a:r>
+            <a:rPr lang="da-DK" sz="1300" kern="1200" dirty="0" err="1" smtClean="0"/>
+            <a:t>HttpClient</a:t>
+          </a:r>
+          <a:endParaRPr lang="en-GB" sz="1300" kern="1200" dirty="0"/>
+        </a:p>
+      </dsp:txBody>
+      <dsp:txXfrm>
+        <a:off x="7667521" y="40706"/>
+        <a:ext cx="2557435" cy="1240135"/>
+      </dsp:txXfrm>
+    </dsp:sp>
+    <dsp:sp modelId="{2739BC17-6545-4BB4-8DA5-AB47358EF6E3}">
+      <dsp:nvSpPr>
+        <dsp:cNvPr id="0" name=""/>
+        <dsp:cNvSpPr/>
+      </dsp:nvSpPr>
+      <dsp:spPr>
+        <a:xfrm rot="2142401">
+          <a:off x="6453115" y="1769699"/>
+          <a:ext cx="1297807" cy="54492"/>
+        </a:xfrm>
+        <a:custGeom>
+          <a:avLst/>
+          <a:gdLst/>
+          <a:ahLst/>
+          <a:cxnLst/>
+          <a:rect l="0" t="0" r="0" b="0"/>
+          <a:pathLst>
+            <a:path>
+              <a:moveTo>
+                <a:pt x="0" y="27246"/>
+              </a:moveTo>
+              <a:lnTo>
+                <a:pt x="1297807" y="27246"/>
+              </a:lnTo>
+            </a:path>
+          </a:pathLst>
+        </a:custGeom>
+        <a:noFill/>
+        <a:ln w="12700" cap="flat" cmpd="sng" algn="ctr">
+          <a:solidFill>
+            <a:schemeClr val="accent1">
+              <a:shade val="80000"/>
+              <a:hueOff val="0"/>
+              <a:satOff val="0"/>
+              <a:lumOff val="0"/>
+              <a:alphaOff val="0"/>
+            </a:schemeClr>
+          </a:solidFill>
+          <a:prstDash val="solid"/>
+          <a:miter lim="800000"/>
+        </a:ln>
+        <a:effectLst/>
+      </dsp:spPr>
+      <dsp:style>
+        <a:lnRef idx="2">
+          <a:scrgbClr r="0" g="0" b="0"/>
+        </a:lnRef>
+        <a:fillRef idx="0">
+          <a:scrgbClr r="0" g="0" b="0"/>
+        </a:fillRef>
+        <a:effectRef idx="0">
+          <a:scrgbClr r="0" g="0" b="0"/>
+        </a:effectRef>
+        <a:fontRef idx="minor"/>
+      </dsp:style>
+      <dsp:txBody>
+        <a:bodyPr spcFirstLastPara="0" vert="horz" wrap="square" lIns="12700" tIns="0" rIns="12700" bIns="0" numCol="1" spcCol="1270" anchor="ctr" anchorCtr="0">
+          <a:noAutofit/>
+        </a:bodyPr>
+        <a:lstStyle/>
+        <a:p>
+          <a:pPr lvl="0" algn="ctr" defTabSz="222250">
+            <a:lnSpc>
+              <a:spcPct val="90000"/>
+            </a:lnSpc>
+            <a:spcBef>
+              <a:spcPct val="0"/>
+            </a:spcBef>
+            <a:spcAft>
+              <a:spcPct val="35000"/>
+            </a:spcAft>
+          </a:pPr>
+          <a:endParaRPr lang="en-GB" sz="500" kern="1200"/>
+        </a:p>
+      </dsp:txBody>
+      <dsp:txXfrm>
+        <a:off x="7069574" y="1764500"/>
+        <a:ext cx="64890" cy="64890"/>
+      </dsp:txXfrm>
+    </dsp:sp>
+    <dsp:sp modelId="{C6D84F83-5413-4EAA-AC66-99AA0AB75FB6}">
+      <dsp:nvSpPr>
+        <dsp:cNvPr id="0" name=""/>
+        <dsp:cNvSpPr/>
+      </dsp:nvSpPr>
+      <dsp:spPr>
+        <a:xfrm>
+          <a:off x="7628939" y="1517019"/>
+          <a:ext cx="2634599" cy="1317299"/>
+        </a:xfrm>
+        <a:prstGeom prst="roundRect">
+          <a:avLst>
+            <a:gd name="adj" fmla="val 10000"/>
+          </a:avLst>
+        </a:prstGeom>
+        <a:solidFill>
+          <a:schemeClr val="accent1">
+            <a:hueOff val="0"/>
+            <a:satOff val="0"/>
+            <a:lumOff val="0"/>
+            <a:alphaOff val="0"/>
+          </a:schemeClr>
+        </a:solidFill>
+        <a:ln w="12700" cap="flat" cmpd="sng" algn="ctr">
+          <a:solidFill>
+            <a:schemeClr val="lt1">
+              <a:hueOff val="0"/>
+              <a:satOff val="0"/>
+              <a:lumOff val="0"/>
+              <a:alphaOff val="0"/>
+            </a:schemeClr>
+          </a:solidFill>
+          <a:prstDash val="solid"/>
+          <a:miter lim="800000"/>
+        </a:ln>
+        <a:effectLst/>
+      </dsp:spPr>
+      <dsp:style>
+        <a:lnRef idx="2">
+          <a:scrgbClr r="0" g="0" b="0"/>
+        </a:lnRef>
+        <a:fillRef idx="1">
+          <a:scrgbClr r="0" g="0" b="0"/>
+        </a:fillRef>
+        <a:effectRef idx="0">
+          <a:scrgbClr r="0" g="0" b="0"/>
+        </a:effectRef>
+        <a:fontRef idx="minor">
+          <a:schemeClr val="lt1"/>
+        </a:fontRef>
+      </dsp:style>
+      <dsp:txBody>
+        <a:bodyPr spcFirstLastPara="0" vert="horz" wrap="square" lIns="8255" tIns="8255" rIns="8255" bIns="8255" numCol="1" spcCol="1270" anchor="ctr" anchorCtr="0">
+          <a:noAutofit/>
+        </a:bodyPr>
+        <a:lstStyle/>
+        <a:p>
+          <a:pPr lvl="0" algn="ctr" defTabSz="577850">
+            <a:lnSpc>
+              <a:spcPct val="90000"/>
+            </a:lnSpc>
+            <a:spcBef>
+              <a:spcPct val="0"/>
+            </a:spcBef>
+            <a:spcAft>
+              <a:spcPct val="35000"/>
+            </a:spcAft>
+          </a:pPr>
+          <a:r>
+            <a:rPr lang="en-GB" sz="1300" kern="1200" err="1" smtClean="0"/>
+            <a:t>activeGoProAPI</a:t>
+          </a:r>
+          <a:r>
+            <a:rPr lang="en-GB" sz="1300" kern="1200" smtClean="0"/>
+            <a:t>::GoProAPIconstants</a:t>
+          </a:r>
+          <a:endParaRPr lang="en-GB" sz="1300" kern="1200" dirty="0"/>
+        </a:p>
+      </dsp:txBody>
+      <dsp:txXfrm>
+        <a:off x="7667521" y="1555601"/>
+        <a:ext cx="2557435" cy="1240135"/>
+      </dsp:txXfrm>
+    </dsp:sp>
+    <dsp:sp modelId="{BCA4B487-17B2-4CCC-B602-C10F2A180696}">
+      <dsp:nvSpPr>
+        <dsp:cNvPr id="0" name=""/>
+        <dsp:cNvSpPr/>
+      </dsp:nvSpPr>
+      <dsp:spPr>
+        <a:xfrm rot="2829178">
+          <a:off x="2638747" y="3095231"/>
+          <a:ext cx="1549665" cy="54492"/>
+        </a:xfrm>
+        <a:custGeom>
+          <a:avLst/>
+          <a:gdLst/>
+          <a:ahLst/>
+          <a:cxnLst/>
+          <a:rect l="0" t="0" r="0" b="0"/>
+          <a:pathLst>
+            <a:path>
+              <a:moveTo>
+                <a:pt x="0" y="27246"/>
+              </a:moveTo>
+              <a:lnTo>
+                <a:pt x="1549665" y="27246"/>
+              </a:lnTo>
+            </a:path>
+          </a:pathLst>
+        </a:custGeom>
+        <a:noFill/>
+        <a:ln w="12700" cap="flat" cmpd="sng" algn="ctr">
+          <a:solidFill>
+            <a:schemeClr val="accent1">
+              <a:shade val="60000"/>
+              <a:hueOff val="0"/>
+              <a:satOff val="0"/>
+              <a:lumOff val="0"/>
+              <a:alphaOff val="0"/>
+            </a:schemeClr>
+          </a:solidFill>
+          <a:prstDash val="solid"/>
+          <a:miter lim="800000"/>
+        </a:ln>
+        <a:effectLst/>
+      </dsp:spPr>
+      <dsp:style>
+        <a:lnRef idx="2">
+          <a:scrgbClr r="0" g="0" b="0"/>
+        </a:lnRef>
+        <a:fillRef idx="0">
+          <a:scrgbClr r="0" g="0" b="0"/>
+        </a:fillRef>
+        <a:effectRef idx="0">
+          <a:scrgbClr r="0" g="0" b="0"/>
+        </a:effectRef>
+        <a:fontRef idx="minor"/>
+      </dsp:style>
+      <dsp:txBody>
+        <a:bodyPr spcFirstLastPara="0" vert="horz" wrap="square" lIns="12700" tIns="0" rIns="12700" bIns="0" numCol="1" spcCol="1270" anchor="ctr" anchorCtr="0">
+          <a:noAutofit/>
+        </a:bodyPr>
+        <a:lstStyle/>
+        <a:p>
+          <a:pPr lvl="0" algn="ctr" defTabSz="222250">
+            <a:lnSpc>
+              <a:spcPct val="90000"/>
+            </a:lnSpc>
+            <a:spcBef>
+              <a:spcPct val="0"/>
+            </a:spcBef>
+            <a:spcAft>
+              <a:spcPct val="35000"/>
+            </a:spcAft>
+          </a:pPr>
+          <a:endParaRPr lang="en-GB" sz="500" kern="1200"/>
+        </a:p>
+      </dsp:txBody>
+      <dsp:txXfrm>
+        <a:off x="3374838" y="3083736"/>
+        <a:ext cx="77483" cy="77483"/>
+      </dsp:txXfrm>
+    </dsp:sp>
+    <dsp:sp modelId="{8429CEE7-FE1C-4D21-98C4-57718A675A1C}">
+      <dsp:nvSpPr>
+        <dsp:cNvPr id="0" name=""/>
+        <dsp:cNvSpPr/>
+      </dsp:nvSpPr>
+      <dsp:spPr>
+        <a:xfrm>
+          <a:off x="3940500" y="3031913"/>
+          <a:ext cx="2634599" cy="1317299"/>
+        </a:xfrm>
+        <a:prstGeom prst="roundRect">
+          <a:avLst>
+            <a:gd name="adj" fmla="val 10000"/>
+          </a:avLst>
+        </a:prstGeom>
+        <a:solidFill>
+          <a:schemeClr val="accent1">
+            <a:hueOff val="0"/>
+            <a:satOff val="0"/>
+            <a:lumOff val="0"/>
+            <a:alphaOff val="0"/>
+          </a:schemeClr>
+        </a:solidFill>
+        <a:ln w="12700" cap="flat" cmpd="sng" algn="ctr">
+          <a:solidFill>
+            <a:schemeClr val="lt1">
+              <a:hueOff val="0"/>
+              <a:satOff val="0"/>
+              <a:lumOff val="0"/>
+              <a:alphaOff val="0"/>
+            </a:schemeClr>
+          </a:solidFill>
+          <a:prstDash val="solid"/>
+          <a:miter lim="800000"/>
+        </a:ln>
+        <a:effectLst/>
+      </dsp:spPr>
+      <dsp:style>
+        <a:lnRef idx="2">
+          <a:scrgbClr r="0" g="0" b="0"/>
+        </a:lnRef>
+        <a:fillRef idx="1">
+          <a:scrgbClr r="0" g="0" b="0"/>
+        </a:fillRef>
+        <a:effectRef idx="0">
+          <a:scrgbClr r="0" g="0" b="0"/>
+        </a:effectRef>
+        <a:fontRef idx="minor">
+          <a:schemeClr val="lt1"/>
+        </a:fontRef>
+      </dsp:style>
+      <dsp:txBody>
+        <a:bodyPr spcFirstLastPara="0" vert="horz" wrap="square" lIns="8255" tIns="8255" rIns="8255" bIns="8255" numCol="1" spcCol="1270" anchor="ctr" anchorCtr="0">
+          <a:noAutofit/>
+        </a:bodyPr>
+        <a:lstStyle/>
+        <a:p>
+          <a:pPr lvl="0" algn="ctr" defTabSz="577850">
+            <a:lnSpc>
+              <a:spcPct val="90000"/>
+            </a:lnSpc>
+            <a:spcBef>
+              <a:spcPct val="0"/>
+            </a:spcBef>
+            <a:spcAft>
+              <a:spcPct val="35000"/>
+            </a:spcAft>
+          </a:pPr>
+          <a:endParaRPr lang="en-GB" sz="1300" kern="1200"/>
+        </a:p>
+      </dsp:txBody>
+      <dsp:txXfrm>
+        <a:off x="3979082" y="3070495"/>
+        <a:ext cx="2557435" cy="1240135"/>
+      </dsp:txXfrm>
+    </dsp:sp>
+    <dsp:sp modelId="{E3AA8C3A-73A5-4744-B386-BF6D3D88B9B5}">
+      <dsp:nvSpPr>
+        <dsp:cNvPr id="0" name=""/>
+        <dsp:cNvSpPr/>
+      </dsp:nvSpPr>
+      <dsp:spPr>
+        <a:xfrm>
+          <a:off x="6575099" y="3663317"/>
+          <a:ext cx="1053839" cy="54492"/>
+        </a:xfrm>
+        <a:custGeom>
+          <a:avLst/>
+          <a:gdLst/>
+          <a:ahLst/>
+          <a:cxnLst/>
+          <a:rect l="0" t="0" r="0" b="0"/>
+          <a:pathLst>
+            <a:path>
+              <a:moveTo>
+                <a:pt x="0" y="27246"/>
+              </a:moveTo>
+              <a:lnTo>
+                <a:pt x="1053839" y="27246"/>
+              </a:lnTo>
+            </a:path>
+          </a:pathLst>
+        </a:custGeom>
+        <a:noFill/>
+        <a:ln w="12700" cap="flat" cmpd="sng" algn="ctr">
+          <a:solidFill>
+            <a:schemeClr val="accent1">
+              <a:shade val="80000"/>
+              <a:hueOff val="0"/>
+              <a:satOff val="0"/>
+              <a:lumOff val="0"/>
+              <a:alphaOff val="0"/>
+            </a:schemeClr>
+          </a:solidFill>
+          <a:prstDash val="solid"/>
+          <a:miter lim="800000"/>
+        </a:ln>
+        <a:effectLst/>
+      </dsp:spPr>
+      <dsp:style>
+        <a:lnRef idx="2">
+          <a:scrgbClr r="0" g="0" b="0"/>
+        </a:lnRef>
+        <a:fillRef idx="0">
+          <a:scrgbClr r="0" g="0" b="0"/>
+        </a:fillRef>
+        <a:effectRef idx="0">
+          <a:scrgbClr r="0" g="0" b="0"/>
+        </a:effectRef>
+        <a:fontRef idx="minor"/>
+      </dsp:style>
+      <dsp:txBody>
+        <a:bodyPr spcFirstLastPara="0" vert="horz" wrap="square" lIns="12700" tIns="0" rIns="12700" bIns="0" numCol="1" spcCol="1270" anchor="ctr" anchorCtr="0">
+          <a:noAutofit/>
+        </a:bodyPr>
+        <a:lstStyle/>
+        <a:p>
+          <a:pPr lvl="0" algn="ctr" defTabSz="222250">
+            <a:lnSpc>
+              <a:spcPct val="90000"/>
+            </a:lnSpc>
+            <a:spcBef>
+              <a:spcPct val="0"/>
+            </a:spcBef>
+            <a:spcAft>
+              <a:spcPct val="35000"/>
+            </a:spcAft>
+          </a:pPr>
+          <a:endParaRPr lang="en-GB" sz="500" kern="1200"/>
+        </a:p>
+      </dsp:txBody>
+      <dsp:txXfrm>
+        <a:off x="7075673" y="3664217"/>
+        <a:ext cx="52691" cy="52691"/>
+      </dsp:txXfrm>
+    </dsp:sp>
+    <dsp:sp modelId="{35E51A8A-B501-4C80-8C19-169EE305B69B}">
+      <dsp:nvSpPr>
+        <dsp:cNvPr id="0" name=""/>
+        <dsp:cNvSpPr/>
+      </dsp:nvSpPr>
+      <dsp:spPr>
+        <a:xfrm>
+          <a:off x="7628939" y="3031913"/>
+          <a:ext cx="2634599" cy="1317299"/>
+        </a:xfrm>
+        <a:prstGeom prst="roundRect">
+          <a:avLst>
+            <a:gd name="adj" fmla="val 10000"/>
+          </a:avLst>
+        </a:prstGeom>
+        <a:solidFill>
+          <a:schemeClr val="accent1">
+            <a:hueOff val="0"/>
+            <a:satOff val="0"/>
+            <a:lumOff val="0"/>
+            <a:alphaOff val="0"/>
+          </a:schemeClr>
+        </a:solidFill>
+        <a:ln w="12700" cap="flat" cmpd="sng" algn="ctr">
+          <a:solidFill>
+            <a:schemeClr val="lt1">
+              <a:hueOff val="0"/>
+              <a:satOff val="0"/>
+              <a:lumOff val="0"/>
+              <a:alphaOff val="0"/>
+            </a:schemeClr>
+          </a:solidFill>
+          <a:prstDash val="solid"/>
+          <a:miter lim="800000"/>
+        </a:ln>
+        <a:effectLst/>
+      </dsp:spPr>
+      <dsp:style>
+        <a:lnRef idx="2">
+          <a:scrgbClr r="0" g="0" b="0"/>
+        </a:lnRef>
+        <a:fillRef idx="1">
+          <a:scrgbClr r="0" g="0" b="0"/>
+        </a:fillRef>
+        <a:effectRef idx="0">
+          <a:scrgbClr r="0" g="0" b="0"/>
+        </a:effectRef>
+        <a:fontRef idx="minor">
+          <a:schemeClr val="lt1"/>
+        </a:fontRef>
+      </dsp:style>
+      <dsp:txBody>
+        <a:bodyPr spcFirstLastPara="0" vert="horz" wrap="square" lIns="8255" tIns="8255" rIns="8255" bIns="8255" numCol="1" spcCol="1270" anchor="ctr" anchorCtr="0">
+          <a:noAutofit/>
+        </a:bodyPr>
+        <a:lstStyle/>
+        <a:p>
+          <a:pPr lvl="0" algn="ctr" defTabSz="577850">
+            <a:lnSpc>
+              <a:spcPct val="90000"/>
+            </a:lnSpc>
+            <a:spcBef>
+              <a:spcPct val="0"/>
+            </a:spcBef>
+            <a:spcAft>
+              <a:spcPct val="35000"/>
+            </a:spcAft>
+          </a:pPr>
+          <a:endParaRPr lang="en-GB" sz="1300" kern="1200"/>
+        </a:p>
+      </dsp:txBody>
+      <dsp:txXfrm>
+        <a:off x="7667521" y="3070495"/>
+        <a:ext cx="2557435" cy="1240135"/>
+      </dsp:txXfrm>
+    </dsp:sp>
   </dsp:spTree>
 </dsp:drawing>
 </file>
@@ -14704,16 +16995,25 @@
             <p:ph type="title"/>
           </p:nvPr>
         </p:nvSpPr>
-        <p:spPr/>
+        <p:spPr>
+          <a:xfrm>
+            <a:off x="838200" y="4398"/>
+            <a:ext cx="10515600" cy="1325563"/>
+          </a:xfrm>
+        </p:spPr>
         <p:txBody>
           <a:bodyPr/>
           <a:lstStyle/>
           <a:p>
             <a:r>
-              <a:rPr lang="da-DK" dirty="0" smtClean="0"/>
-              <a:t>Tips</a:t>
-            </a:r>
-            <a:endParaRPr lang="en-GB" dirty="0"/>
+              <a:rPr lang="en-US" dirty="0" err="1" smtClean="0"/>
+              <a:t>Git</a:t>
+            </a:r>
+            <a:r>
+              <a:rPr lang="en-US" dirty="0" smtClean="0"/>
+              <a:t> specifics</a:t>
+            </a:r>
+            <a:endParaRPr lang="en-US" dirty="0"/>
           </a:p>
         </p:txBody>
       </p:sp>
@@ -14727,64 +17027,404 @@
             <p:ph idx="1"/>
           </p:nvPr>
         </p:nvSpPr>
-        <p:spPr/>
+        <p:spPr>
+          <a:xfrm>
+            <a:off x="838200" y="1313897"/>
+            <a:ext cx="10515600" cy="4351338"/>
+          </a:xfrm>
+        </p:spPr>
         <p:txBody>
           <a:bodyPr/>
           <a:lstStyle/>
           <a:p>
-            <a:pPr fontAlgn="base"/>
             <a:r>
               <a:rPr lang="en-US" dirty="0" smtClean="0"/>
-              <a:t>Import library into Eclipse</a:t>
-            </a:r>
-          </a:p>
-          <a:p>
-            <a:pPr lvl="1" fontAlgn="base"/>
+              <a:t>If problems updating/</a:t>
+            </a:r>
+            <a:r>
+              <a:rPr lang="en-US" dirty="0" err="1" smtClean="0"/>
+              <a:t>mergin</a:t>
+            </a:r>
             <a:r>
               <a:rPr lang="en-US" dirty="0" smtClean="0"/>
-              <a:t>Download </a:t>
-            </a:r>
-            <a:r>
-              <a:rPr lang="en-US" dirty="0"/>
-              <a:t>the ZIP file from this </a:t>
-            </a:r>
+              <a:t> binary files (e.g. this power point):</a:t>
+            </a:r>
+          </a:p>
+          <a:p>
+            <a:pPr lvl="1"/>
             <a:r>
               <a:rPr lang="en-US" dirty="0">
                 <a:hlinkClick r:id="rId2"/>
               </a:rPr>
-              <a:t>URL</a:t>
-            </a:r>
-            <a:r>
-              <a:rPr lang="en-US" dirty="0"/>
-              <a:t> and extract it to get the Jar. Add the Jar to your build path. To check the available classes in this Jar use this </a:t>
-            </a:r>
-            <a:r>
-              <a:rPr lang="en-US" dirty="0">
-                <a:hlinkClick r:id="rId3"/>
+              <a:t>https://</a:t>
+            </a:r>
+            <a:r>
+              <a:rPr lang="en-US" dirty="0" smtClean="0">
+                <a:hlinkClick r:id="rId2"/>
               </a:rPr>
-              <a:t>URL</a:t>
-            </a:r>
-            <a:r>
-              <a:rPr lang="en-US" dirty="0"/>
-              <a:t>.</a:t>
-            </a:r>
-          </a:p>
-          <a:p>
-            <a:pPr lvl="1" fontAlgn="base"/>
-            <a:r>
-              <a:rPr lang="en-US" dirty="0"/>
-              <a:t>To Add this Jar to your build path Right click the Project &gt; Build Path &gt; Configure build path&gt; Select Libraries tab &gt; Click Add External Libraries &gt; Select the Jar file Download</a:t>
-            </a:r>
-          </a:p>
-          <a:p>
-            <a:endParaRPr lang="en-GB" dirty="0"/>
+              <a:t>stackoverflow.com/questions/278081/resolving-a-git-conflict-with-binary-files</a:t>
+            </a:r>
+            <a:r>
+              <a:rPr lang="en-US" dirty="0" smtClean="0"/>
+              <a:t> </a:t>
+            </a:r>
+          </a:p>
+          <a:p>
+            <a:endParaRPr lang="en-US" dirty="0"/>
+          </a:p>
+        </p:txBody>
+      </p:sp>
+      <p:sp>
+        <p:nvSpPr>
+          <p:cNvPr id="4" name="TextBox 3"/>
+          <p:cNvSpPr txBox="1"/>
+          <p:nvPr/>
+        </p:nvSpPr>
+        <p:spPr>
+          <a:xfrm>
+            <a:off x="3322040" y="2295141"/>
+            <a:ext cx="8180445" cy="4662815"/>
+          </a:xfrm>
+          <a:prstGeom prst="rect">
+            <a:avLst/>
+          </a:prstGeom>
+          <a:noFill/>
+        </p:spPr>
+        <p:txBody>
+          <a:bodyPr wrap="none" rtlCol="0">
+            <a:spAutoFit/>
+          </a:bodyPr>
+          <a:lstStyle/>
+          <a:p>
+            <a:r>
+              <a:rPr lang="en-US" sz="1100" dirty="0"/>
+              <a:t>nnohrras@HER100DG5K662 MINGW64 /c/</a:t>
+            </a:r>
+            <a:r>
+              <a:rPr lang="en-US" sz="1100" dirty="0" err="1"/>
+              <a:t>data_no_backup_active</a:t>
+            </a:r>
+            <a:r>
+              <a:rPr lang="en-US" sz="1100" dirty="0"/>
+              <a:t>/test </a:t>
+            </a:r>
+            <a:r>
+              <a:rPr lang="en-US" sz="1100" dirty="0" err="1"/>
+              <a:t>github</a:t>
+            </a:r>
+            <a:r>
+              <a:rPr lang="en-US" sz="1100" dirty="0"/>
+              <a:t>/GIT/GoPro-</a:t>
+            </a:r>
+            <a:r>
+              <a:rPr lang="en-US" sz="1100" dirty="0" err="1"/>
+              <a:t>Notetaker</a:t>
+            </a:r>
+            <a:r>
+              <a:rPr lang="en-US" sz="1100" dirty="0"/>
+              <a:t>-tool (master)</a:t>
+            </a:r>
+          </a:p>
+          <a:p>
+            <a:r>
+              <a:rPr lang="en-US" sz="1100" dirty="0"/>
+              <a:t>$ </a:t>
+            </a:r>
+            <a:r>
+              <a:rPr lang="en-US" sz="1100" b="1" dirty="0" err="1"/>
+              <a:t>git</a:t>
+            </a:r>
+            <a:r>
+              <a:rPr lang="en-US" sz="1100" b="1" dirty="0"/>
+              <a:t> pull origin master</a:t>
+            </a:r>
+          </a:p>
+          <a:p>
+            <a:r>
+              <a:rPr lang="en-US" sz="1100" dirty="0"/>
+              <a:t>From https://github.com/ratnick/GoPro-Notetaker-tool</a:t>
+            </a:r>
+          </a:p>
+          <a:p>
+            <a:r>
+              <a:rPr lang="en-US" sz="1100" dirty="0"/>
+              <a:t> * branch            master     -&gt; FETCH_HEAD</a:t>
+            </a:r>
+          </a:p>
+          <a:p>
+            <a:r>
+              <a:rPr lang="en-US" sz="1100" dirty="0"/>
+              <a:t>warning: Cannot merge binary files: </a:t>
+            </a:r>
+            <a:r>
+              <a:rPr lang="en-US" sz="1100" dirty="0" err="1"/>
+              <a:t>ViNo</a:t>
+            </a:r>
+            <a:r>
+              <a:rPr lang="en-US" sz="1100" dirty="0"/>
+              <a:t> Get Started DEVELOPMENT V4.0.pptx (HEAD vs. edf7986a34baa7729f84ad8a22d199dae955539e)</a:t>
+            </a:r>
+          </a:p>
+          <a:p>
+            <a:r>
+              <a:rPr lang="en-US" sz="1100" dirty="0"/>
+              <a:t>Auto-merging </a:t>
+            </a:r>
+            <a:r>
+              <a:rPr lang="en-US" sz="1100" dirty="0" err="1"/>
+              <a:t>ViNo</a:t>
+            </a:r>
+            <a:r>
+              <a:rPr lang="en-US" sz="1100" dirty="0"/>
+              <a:t> Get Started DEVELOPMENT V4.0.pptx</a:t>
+            </a:r>
+          </a:p>
+          <a:p>
+            <a:r>
+              <a:rPr lang="en-US" sz="1100" dirty="0"/>
+              <a:t>CONFLICT (content): Merge conflict in </a:t>
+            </a:r>
+            <a:r>
+              <a:rPr lang="en-US" sz="1100" dirty="0" err="1"/>
+              <a:t>ViNo</a:t>
+            </a:r>
+            <a:r>
+              <a:rPr lang="en-US" sz="1100" dirty="0"/>
+              <a:t> Get Started DEVELOPMENT V4.0.pptx</a:t>
+            </a:r>
+          </a:p>
+          <a:p>
+            <a:r>
+              <a:rPr lang="en-US" sz="1100" dirty="0"/>
+              <a:t>Automatic merge failed; fix conflicts and then commit the result.</a:t>
+            </a:r>
+          </a:p>
+          <a:p>
+            <a:endParaRPr lang="en-US" sz="1100" dirty="0"/>
+          </a:p>
+          <a:p>
+            <a:r>
+              <a:rPr lang="en-US" sz="1100" dirty="0"/>
+              <a:t>nnohrras@HER100DG5K662 MINGW64 /c/</a:t>
+            </a:r>
+            <a:r>
+              <a:rPr lang="en-US" sz="1100" dirty="0" err="1"/>
+              <a:t>data_no_backup_active</a:t>
+            </a:r>
+            <a:r>
+              <a:rPr lang="en-US" sz="1100" dirty="0"/>
+              <a:t>/test </a:t>
+            </a:r>
+            <a:r>
+              <a:rPr lang="en-US" sz="1100" dirty="0" err="1"/>
+              <a:t>github</a:t>
+            </a:r>
+            <a:r>
+              <a:rPr lang="en-US" sz="1100" dirty="0"/>
+              <a:t>/GIT/GoPro-</a:t>
+            </a:r>
+            <a:r>
+              <a:rPr lang="en-US" sz="1100" dirty="0" err="1"/>
+              <a:t>Notetaker</a:t>
+            </a:r>
+            <a:r>
+              <a:rPr lang="en-US" sz="1100" dirty="0"/>
+              <a:t>-tool (</a:t>
+            </a:r>
+            <a:r>
+              <a:rPr lang="en-US" sz="1100" dirty="0" err="1"/>
+              <a:t>master|MERGING</a:t>
+            </a:r>
+            <a:r>
+              <a:rPr lang="en-US" sz="1100" dirty="0"/>
+              <a:t>)</a:t>
+            </a:r>
+          </a:p>
+          <a:p>
+            <a:r>
+              <a:rPr lang="en-US" sz="1100" dirty="0"/>
+              <a:t>$ </a:t>
+            </a:r>
+            <a:r>
+              <a:rPr lang="en-US" sz="1100" b="1" dirty="0" err="1"/>
+              <a:t>git</a:t>
+            </a:r>
+            <a:r>
+              <a:rPr lang="en-US" sz="1100" b="1" dirty="0"/>
+              <a:t> commit -a -m "fix merge conflict in </a:t>
+            </a:r>
+            <a:r>
+              <a:rPr lang="en-US" sz="1100" b="1" dirty="0" err="1"/>
+              <a:t>powerpoint</a:t>
+            </a:r>
+            <a:r>
+              <a:rPr lang="en-US" sz="1100" b="1" dirty="0"/>
+              <a:t> binary file"</a:t>
+            </a:r>
+          </a:p>
+          <a:p>
+            <a:r>
+              <a:rPr lang="en-US" sz="1100" dirty="0"/>
+              <a:t>[master 10592da] fix merge conflict in </a:t>
+            </a:r>
+            <a:r>
+              <a:rPr lang="en-US" sz="1100" dirty="0" err="1"/>
+              <a:t>powerpoint</a:t>
+            </a:r>
+            <a:r>
+              <a:rPr lang="en-US" sz="1100" dirty="0"/>
+              <a:t> binary file</a:t>
+            </a:r>
+          </a:p>
+          <a:p>
+            <a:r>
+              <a:rPr lang="en-US" sz="1100" dirty="0"/>
+              <a:t> Author: Nikolaj </a:t>
+            </a:r>
+            <a:r>
+              <a:rPr lang="en-US" sz="1100" dirty="0" err="1"/>
+              <a:t>NÃ¸hr-Rasmussen</a:t>
+            </a:r>
+            <a:r>
+              <a:rPr lang="en-US" sz="1100" dirty="0"/>
+              <a:t> &lt;nikolaj@noehr-rasmussen.dk&gt;</a:t>
+            </a:r>
+          </a:p>
+          <a:p>
+            <a:endParaRPr lang="en-US" sz="1100" dirty="0"/>
+          </a:p>
+          <a:p>
+            <a:r>
+              <a:rPr lang="en-US" sz="1100" dirty="0"/>
+              <a:t>nnohrras@HER100DG5K662 MINGW64 /c/</a:t>
+            </a:r>
+            <a:r>
+              <a:rPr lang="en-US" sz="1100" dirty="0" err="1"/>
+              <a:t>data_no_backup_active</a:t>
+            </a:r>
+            <a:r>
+              <a:rPr lang="en-US" sz="1100" dirty="0"/>
+              <a:t>/test </a:t>
+            </a:r>
+            <a:r>
+              <a:rPr lang="en-US" sz="1100" dirty="0" err="1"/>
+              <a:t>github</a:t>
+            </a:r>
+            <a:r>
+              <a:rPr lang="en-US" sz="1100" dirty="0"/>
+              <a:t>/GIT/GoPro-</a:t>
+            </a:r>
+            <a:r>
+              <a:rPr lang="en-US" sz="1100" dirty="0" err="1"/>
+              <a:t>Notetaker</a:t>
+            </a:r>
+            <a:r>
+              <a:rPr lang="en-US" sz="1100" dirty="0"/>
+              <a:t>-tool (master)</a:t>
+            </a:r>
+          </a:p>
+          <a:p>
+            <a:r>
+              <a:rPr lang="en-US" sz="1100" dirty="0"/>
+              <a:t>$ </a:t>
+            </a:r>
+            <a:r>
+              <a:rPr lang="en-US" sz="1100" b="1" dirty="0" err="1"/>
+              <a:t>git</a:t>
+            </a:r>
+            <a:r>
+              <a:rPr lang="en-US" sz="1100" b="1" dirty="0"/>
+              <a:t> push origin</a:t>
+            </a:r>
+          </a:p>
+          <a:p>
+            <a:r>
+              <a:rPr lang="en-US" sz="1100" dirty="0"/>
+              <a:t>Fatal: </a:t>
+            </a:r>
+            <a:r>
+              <a:rPr lang="en-US" sz="1100" dirty="0" err="1"/>
+              <a:t>HttpRequestException</a:t>
+            </a:r>
+            <a:r>
+              <a:rPr lang="en-US" sz="1100" dirty="0"/>
+              <a:t> encountered.</a:t>
+            </a:r>
+          </a:p>
+          <a:p>
+            <a:r>
+              <a:rPr lang="en-US" sz="1100" dirty="0"/>
+              <a:t>   An error occurred while sending the request.</a:t>
+            </a:r>
+          </a:p>
+          <a:p>
+            <a:r>
+              <a:rPr lang="en-US" sz="1100" dirty="0"/>
+              <a:t>Counting objects: 4, done.</a:t>
+            </a:r>
+          </a:p>
+          <a:p>
+            <a:r>
+              <a:rPr lang="en-US" sz="1100" dirty="0"/>
+              <a:t>Delta compression using up to 8 threads.</a:t>
+            </a:r>
+          </a:p>
+          <a:p>
+            <a:r>
+              <a:rPr lang="en-US" sz="1100" dirty="0"/>
+              <a:t>Compressing objects: 100% (4/4), done.</a:t>
+            </a:r>
+          </a:p>
+          <a:p>
+            <a:r>
+              <a:rPr lang="en-US" sz="1100" dirty="0"/>
+              <a:t>Writing objects: 100% (4/4), 98.51 KiB | 0 bytes/s, done.</a:t>
+            </a:r>
+          </a:p>
+          <a:p>
+            <a:r>
+              <a:rPr lang="sv-SE" sz="1100" dirty="0"/>
+              <a:t>Total 4 (delta 3), </a:t>
+            </a:r>
+            <a:r>
+              <a:rPr lang="sv-SE" sz="1100" dirty="0" err="1"/>
+              <a:t>reused</a:t>
+            </a:r>
+            <a:r>
+              <a:rPr lang="sv-SE" sz="1100" dirty="0"/>
+              <a:t> 0 (delta 0)</a:t>
+            </a:r>
+          </a:p>
+          <a:p>
+            <a:r>
+              <a:rPr lang="en-US" sz="1100" dirty="0"/>
+              <a:t>remote: Resolving deltas: 100% (3/3), completed with 2 local objects.</a:t>
+            </a:r>
+          </a:p>
+          <a:p>
+            <a:r>
+              <a:rPr lang="en-US" sz="1100" dirty="0"/>
+              <a:t>To https://github.com/ratnick/GoPro-Notetaker-tool.git</a:t>
+            </a:r>
+          </a:p>
+          <a:p>
+            <a:r>
+              <a:rPr lang="en-US" sz="1100" dirty="0"/>
+              <a:t>   edf7986..10592da  master -&gt; master</a:t>
+            </a:r>
+          </a:p>
+          <a:p>
+            <a:endParaRPr lang="en-US" sz="1100" dirty="0">
+              <a:latin typeface="Courier New" panose="02070309020205020404" pitchFamily="49" charset="0"/>
+              <a:cs typeface="Courier New" panose="02070309020205020404" pitchFamily="49" charset="0"/>
+            </a:endParaRPr>
           </a:p>
         </p:txBody>
       </p:sp>
     </p:spTree>
     <p:extLst>
       <p:ext uri="{BB962C8B-B14F-4D97-AF65-F5344CB8AC3E}">
-        <p14:creationId xmlns:p14="http://schemas.microsoft.com/office/powerpoint/2010/main" val="4115334664"/>
+        <p14:creationId xmlns:p14="http://schemas.microsoft.com/office/powerpoint/2010/main" val="2159133581"/>
       </p:ext>
     </p:extLst>
   </p:cSld>
@@ -15024,6 +17664,123 @@
           <a:p>
             <a:r>
               <a:rPr lang="da-DK" dirty="0" smtClean="0"/>
+              <a:t>Tips</a:t>
+            </a:r>
+            <a:endParaRPr lang="en-GB" dirty="0"/>
+          </a:p>
+        </p:txBody>
+      </p:sp>
+      <p:sp>
+        <p:nvSpPr>
+          <p:cNvPr id="3" name="Content Placeholder 2"/>
+          <p:cNvSpPr>
+            <a:spLocks noGrp="1"/>
+          </p:cNvSpPr>
+          <p:nvPr>
+            <p:ph idx="1"/>
+          </p:nvPr>
+        </p:nvSpPr>
+        <p:spPr/>
+        <p:txBody>
+          <a:bodyPr/>
+          <a:lstStyle/>
+          <a:p>
+            <a:pPr fontAlgn="base"/>
+            <a:r>
+              <a:rPr lang="en-US" dirty="0" smtClean="0"/>
+              <a:t>Import library into Eclipse</a:t>
+            </a:r>
+          </a:p>
+          <a:p>
+            <a:pPr lvl="1" fontAlgn="base"/>
+            <a:r>
+              <a:rPr lang="en-US" dirty="0" smtClean="0"/>
+              <a:t>Download </a:t>
+            </a:r>
+            <a:r>
+              <a:rPr lang="en-US" dirty="0"/>
+              <a:t>the ZIP file from this </a:t>
+            </a:r>
+            <a:r>
+              <a:rPr lang="en-US" dirty="0">
+                <a:hlinkClick r:id="rId2"/>
+              </a:rPr>
+              <a:t>URL</a:t>
+            </a:r>
+            <a:r>
+              <a:rPr lang="en-US" dirty="0"/>
+              <a:t> and extract it to get the Jar. Add the Jar to your build path. To check the available classes in this Jar use this </a:t>
+            </a:r>
+            <a:r>
+              <a:rPr lang="en-US" dirty="0">
+                <a:hlinkClick r:id="rId3"/>
+              </a:rPr>
+              <a:t>URL</a:t>
+            </a:r>
+            <a:r>
+              <a:rPr lang="en-US" dirty="0"/>
+              <a:t>.</a:t>
+            </a:r>
+          </a:p>
+          <a:p>
+            <a:pPr lvl="1" fontAlgn="base"/>
+            <a:r>
+              <a:rPr lang="en-US" dirty="0"/>
+              <a:t>To Add this Jar to your build path Right click the Project &gt; Build Path &gt; Configure build path&gt; Select Libraries tab &gt; Click Add External Libraries &gt; Select the Jar file Download</a:t>
+            </a:r>
+          </a:p>
+          <a:p>
+            <a:endParaRPr lang="en-GB" dirty="0"/>
+          </a:p>
+        </p:txBody>
+      </p:sp>
+    </p:spTree>
+    <p:extLst>
+      <p:ext uri="{BB962C8B-B14F-4D97-AF65-F5344CB8AC3E}">
+        <p14:creationId xmlns:p14="http://schemas.microsoft.com/office/powerpoint/2010/main" val="4115334664"/>
+      </p:ext>
+    </p:extLst>
+  </p:cSld>
+  <p:clrMapOvr>
+    <a:masterClrMapping/>
+  </p:clrMapOvr>
+</p:sld>
+</file>
+
+<file path=ppt/slides/slide21.xml><?xml version="1.0" encoding="utf-8"?>
+<p:sld xmlns:a="http://schemas.openxmlformats.org/drawingml/2006/main" xmlns:r="http://schemas.openxmlformats.org/officeDocument/2006/relationships" xmlns:p="http://schemas.openxmlformats.org/presentationml/2006/main">
+  <p:cSld>
+    <p:spTree>
+      <p:nvGrpSpPr>
+        <p:cNvPr id="1" name=""/>
+        <p:cNvGrpSpPr/>
+        <p:nvPr/>
+      </p:nvGrpSpPr>
+      <p:grpSpPr>
+        <a:xfrm>
+          <a:off x="0" y="0"/>
+          <a:ext cx="0" cy="0"/>
+          <a:chOff x="0" y="0"/>
+          <a:chExt cx="0" cy="0"/>
+        </a:xfrm>
+      </p:grpSpPr>
+      <p:sp>
+        <p:nvSpPr>
+          <p:cNvPr id="2" name="Title 1"/>
+          <p:cNvSpPr>
+            <a:spLocks noGrp="1"/>
+          </p:cNvSpPr>
+          <p:nvPr>
+            <p:ph type="title"/>
+          </p:nvPr>
+        </p:nvSpPr>
+        <p:spPr/>
+        <p:txBody>
+          <a:bodyPr/>
+          <a:lstStyle/>
+          <a:p>
+            <a:r>
+              <a:rPr lang="da-DK" dirty="0" smtClean="0"/>
               <a:t>Manual </a:t>
             </a:r>
             <a:r>
@@ -15340,7 +18097,7 @@
 </p:sld>
 </file>
 
-<file path=ppt/slides/slide21.xml><?xml version="1.0" encoding="utf-8"?>
+<file path=ppt/slides/slide22.xml><?xml version="1.0" encoding="utf-8"?>
 <p:sld xmlns:a="http://schemas.openxmlformats.org/drawingml/2006/main" xmlns:r="http://schemas.openxmlformats.org/officeDocument/2006/relationships" xmlns:p="http://schemas.openxmlformats.org/presentationml/2006/main">
   <p:cSld>
     <p:spTree>
@@ -15928,11 +18685,7 @@
             </a:r>
             <a:r>
               <a:rPr lang="en-US" dirty="0" smtClean="0"/>
-              <a:t> (e.g. by starting a new workspace in Eclipse</a:t>
-            </a:r>
-            <a:r>
-              <a:rPr lang="en-US" dirty="0" smtClean="0"/>
-              <a:t>)</a:t>
+              <a:t> (e.g. by starting a new workspace in Eclipse)</a:t>
             </a:r>
           </a:p>
           <a:p>

</xml_diff>

<commit_message>
Included a binary version of all used libraries. They will have to be extracted and installed properly to work.
</commit_message>
<xml_diff>
--- a/ViNo Get Started DEVELOPMENT V4.0.pptx
+++ b/ViNo Get Started DEVELOPMENT V4.0.pptx
@@ -3176,1396 +3176,6 @@
       <dsp:cNvGrpSpPr/>
     </dsp:nvGrpSpPr>
     <dsp:grpSpPr/>
-    <dsp:sp modelId="{78A916C1-45FB-6547-9A4C-8052BBEDDF7C}">
-      <dsp:nvSpPr>
-        <dsp:cNvPr id="0" name=""/>
-        <dsp:cNvSpPr/>
-      </dsp:nvSpPr>
-      <dsp:spPr>
-        <a:xfrm>
-          <a:off x="5629275" y="2977518"/>
-          <a:ext cx="4978160" cy="273458"/>
-        </a:xfrm>
-        <a:custGeom>
-          <a:avLst/>
-          <a:gdLst/>
-          <a:ahLst/>
-          <a:cxnLst/>
-          <a:rect l="0" t="0" r="0" b="0"/>
-          <a:pathLst>
-            <a:path>
-              <a:moveTo>
-                <a:pt x="0" y="0"/>
-              </a:moveTo>
-              <a:lnTo>
-                <a:pt x="0" y="136729"/>
-              </a:lnTo>
-              <a:lnTo>
-                <a:pt x="4978160" y="136729"/>
-              </a:lnTo>
-              <a:lnTo>
-                <a:pt x="4978160" y="273458"/>
-              </a:lnTo>
-            </a:path>
-          </a:pathLst>
-        </a:custGeom>
-        <a:noFill/>
-        <a:ln w="6350" cap="flat" cmpd="sng" algn="ctr">
-          <a:solidFill>
-            <a:schemeClr val="accent1">
-              <a:shade val="60000"/>
-              <a:hueOff val="0"/>
-              <a:satOff val="0"/>
-              <a:lumOff val="0"/>
-              <a:alphaOff val="0"/>
-            </a:schemeClr>
-          </a:solidFill>
-          <a:prstDash val="solid"/>
-          <a:miter lim="800000"/>
-        </a:ln>
-        <a:effectLst/>
-      </dsp:spPr>
-      <dsp:style>
-        <a:lnRef idx="1">
-          <a:scrgbClr r="0" g="0" b="0"/>
-        </a:lnRef>
-        <a:fillRef idx="0">
-          <a:scrgbClr r="0" g="0" b="0"/>
-        </a:fillRef>
-        <a:effectRef idx="0">
-          <a:scrgbClr r="0" g="0" b="0"/>
-        </a:effectRef>
-        <a:fontRef idx="minor"/>
-      </dsp:style>
-    </dsp:sp>
-    <dsp:sp modelId="{E1763A78-C2EC-8745-BA79-01246259F009}">
-      <dsp:nvSpPr>
-        <dsp:cNvPr id="0" name=""/>
-        <dsp:cNvSpPr/>
-      </dsp:nvSpPr>
-      <dsp:spPr>
-        <a:xfrm>
-          <a:off x="5629275" y="2977518"/>
-          <a:ext cx="3402520" cy="273458"/>
-        </a:xfrm>
-        <a:custGeom>
-          <a:avLst/>
-          <a:gdLst/>
-          <a:ahLst/>
-          <a:cxnLst/>
-          <a:rect l="0" t="0" r="0" b="0"/>
-          <a:pathLst>
-            <a:path>
-              <a:moveTo>
-                <a:pt x="0" y="0"/>
-              </a:moveTo>
-              <a:lnTo>
-                <a:pt x="0" y="136729"/>
-              </a:lnTo>
-              <a:lnTo>
-                <a:pt x="3402520" y="136729"/>
-              </a:lnTo>
-              <a:lnTo>
-                <a:pt x="3402520" y="273458"/>
-              </a:lnTo>
-            </a:path>
-          </a:pathLst>
-        </a:custGeom>
-        <a:noFill/>
-        <a:ln w="6350" cap="flat" cmpd="sng" algn="ctr">
-          <a:solidFill>
-            <a:schemeClr val="accent1">
-              <a:shade val="60000"/>
-              <a:hueOff val="0"/>
-              <a:satOff val="0"/>
-              <a:lumOff val="0"/>
-              <a:alphaOff val="0"/>
-            </a:schemeClr>
-          </a:solidFill>
-          <a:prstDash val="solid"/>
-          <a:miter lim="800000"/>
-        </a:ln>
-        <a:effectLst/>
-      </dsp:spPr>
-      <dsp:style>
-        <a:lnRef idx="1">
-          <a:scrgbClr r="0" g="0" b="0"/>
-        </a:lnRef>
-        <a:fillRef idx="0">
-          <a:scrgbClr r="0" g="0" b="0"/>
-        </a:fillRef>
-        <a:effectRef idx="0">
-          <a:scrgbClr r="0" g="0" b="0"/>
-        </a:effectRef>
-        <a:fontRef idx="minor"/>
-      </dsp:style>
-    </dsp:sp>
-    <dsp:sp modelId="{CBAE471B-FE89-6E48-B021-5FC4136D6F1B}">
-      <dsp:nvSpPr>
-        <dsp:cNvPr id="0" name=""/>
-        <dsp:cNvSpPr/>
-      </dsp:nvSpPr>
-      <dsp:spPr>
-        <a:xfrm>
-          <a:off x="5629275" y="2977518"/>
-          <a:ext cx="1826880" cy="273458"/>
-        </a:xfrm>
-        <a:custGeom>
-          <a:avLst/>
-          <a:gdLst/>
-          <a:ahLst/>
-          <a:cxnLst/>
-          <a:rect l="0" t="0" r="0" b="0"/>
-          <a:pathLst>
-            <a:path>
-              <a:moveTo>
-                <a:pt x="0" y="0"/>
-              </a:moveTo>
-              <a:lnTo>
-                <a:pt x="0" y="136729"/>
-              </a:lnTo>
-              <a:lnTo>
-                <a:pt x="1826880" y="136729"/>
-              </a:lnTo>
-              <a:lnTo>
-                <a:pt x="1826880" y="273458"/>
-              </a:lnTo>
-            </a:path>
-          </a:pathLst>
-        </a:custGeom>
-        <a:noFill/>
-        <a:ln w="6350" cap="flat" cmpd="sng" algn="ctr">
-          <a:solidFill>
-            <a:schemeClr val="accent1">
-              <a:shade val="60000"/>
-              <a:hueOff val="0"/>
-              <a:satOff val="0"/>
-              <a:lumOff val="0"/>
-              <a:alphaOff val="0"/>
-            </a:schemeClr>
-          </a:solidFill>
-          <a:prstDash val="solid"/>
-          <a:miter lim="800000"/>
-        </a:ln>
-        <a:effectLst/>
-      </dsp:spPr>
-      <dsp:style>
-        <a:lnRef idx="1">
-          <a:scrgbClr r="0" g="0" b="0"/>
-        </a:lnRef>
-        <a:fillRef idx="0">
-          <a:scrgbClr r="0" g="0" b="0"/>
-        </a:fillRef>
-        <a:effectRef idx="0">
-          <a:scrgbClr r="0" g="0" b="0"/>
-        </a:effectRef>
-        <a:fontRef idx="minor"/>
-      </dsp:style>
-    </dsp:sp>
-    <dsp:sp modelId="{9B87DF03-7C43-5D46-8C35-C4D697A5299A}">
-      <dsp:nvSpPr>
-        <dsp:cNvPr id="0" name=""/>
-        <dsp:cNvSpPr/>
-      </dsp:nvSpPr>
-      <dsp:spPr>
-        <a:xfrm>
-          <a:off x="5629275" y="2977518"/>
-          <a:ext cx="251239" cy="273458"/>
-        </a:xfrm>
-        <a:custGeom>
-          <a:avLst/>
-          <a:gdLst/>
-          <a:ahLst/>
-          <a:cxnLst/>
-          <a:rect l="0" t="0" r="0" b="0"/>
-          <a:pathLst>
-            <a:path>
-              <a:moveTo>
-                <a:pt x="0" y="0"/>
-              </a:moveTo>
-              <a:lnTo>
-                <a:pt x="0" y="136729"/>
-              </a:lnTo>
-              <a:lnTo>
-                <a:pt x="251239" y="136729"/>
-              </a:lnTo>
-              <a:lnTo>
-                <a:pt x="251239" y="273458"/>
-              </a:lnTo>
-            </a:path>
-          </a:pathLst>
-        </a:custGeom>
-        <a:noFill/>
-        <a:ln w="6350" cap="flat" cmpd="sng" algn="ctr">
-          <a:solidFill>
-            <a:schemeClr val="accent1">
-              <a:shade val="60000"/>
-              <a:hueOff val="0"/>
-              <a:satOff val="0"/>
-              <a:lumOff val="0"/>
-              <a:alphaOff val="0"/>
-            </a:schemeClr>
-          </a:solidFill>
-          <a:prstDash val="solid"/>
-          <a:miter lim="800000"/>
-        </a:ln>
-        <a:effectLst/>
-      </dsp:spPr>
-      <dsp:style>
-        <a:lnRef idx="1">
-          <a:scrgbClr r="0" g="0" b="0"/>
-        </a:lnRef>
-        <a:fillRef idx="0">
-          <a:scrgbClr r="0" g="0" b="0"/>
-        </a:fillRef>
-        <a:effectRef idx="0">
-          <a:scrgbClr r="0" g="0" b="0"/>
-        </a:effectRef>
-        <a:fontRef idx="minor"/>
-      </dsp:style>
-    </dsp:sp>
-    <dsp:sp modelId="{8DFCF146-7C2B-7247-9822-DCE752D9A16A}">
-      <dsp:nvSpPr>
-        <dsp:cNvPr id="0" name=""/>
-        <dsp:cNvSpPr/>
-      </dsp:nvSpPr>
-      <dsp:spPr>
-        <a:xfrm>
-          <a:off x="4304874" y="2977518"/>
-          <a:ext cx="1324400" cy="273458"/>
-        </a:xfrm>
-        <a:custGeom>
-          <a:avLst/>
-          <a:gdLst/>
-          <a:ahLst/>
-          <a:cxnLst/>
-          <a:rect l="0" t="0" r="0" b="0"/>
-          <a:pathLst>
-            <a:path>
-              <a:moveTo>
-                <a:pt x="1324400" y="0"/>
-              </a:moveTo>
-              <a:lnTo>
-                <a:pt x="1324400" y="136729"/>
-              </a:lnTo>
-              <a:lnTo>
-                <a:pt x="0" y="136729"/>
-              </a:lnTo>
-              <a:lnTo>
-                <a:pt x="0" y="273458"/>
-              </a:lnTo>
-            </a:path>
-          </a:pathLst>
-        </a:custGeom>
-        <a:noFill/>
-        <a:ln w="6350" cap="flat" cmpd="sng" algn="ctr">
-          <a:solidFill>
-            <a:schemeClr val="accent1">
-              <a:shade val="60000"/>
-              <a:hueOff val="0"/>
-              <a:satOff val="0"/>
-              <a:lumOff val="0"/>
-              <a:alphaOff val="0"/>
-            </a:schemeClr>
-          </a:solidFill>
-          <a:prstDash val="solid"/>
-          <a:miter lim="800000"/>
-        </a:ln>
-        <a:effectLst/>
-      </dsp:spPr>
-      <dsp:style>
-        <a:lnRef idx="1">
-          <a:scrgbClr r="0" g="0" b="0"/>
-        </a:lnRef>
-        <a:fillRef idx="0">
-          <a:scrgbClr r="0" g="0" b="0"/>
-        </a:fillRef>
-        <a:effectRef idx="0">
-          <a:scrgbClr r="0" g="0" b="0"/>
-        </a:effectRef>
-        <a:fontRef idx="minor"/>
-      </dsp:style>
-    </dsp:sp>
-    <dsp:sp modelId="{CE8BF669-6A0C-B04A-80AC-D3DA0F976ABF}">
-      <dsp:nvSpPr>
-        <dsp:cNvPr id="0" name=""/>
-        <dsp:cNvSpPr/>
-      </dsp:nvSpPr>
-      <dsp:spPr>
-        <a:xfrm>
-          <a:off x="993181" y="3887782"/>
-          <a:ext cx="287934" cy="1327659"/>
-        </a:xfrm>
-        <a:custGeom>
-          <a:avLst/>
-          <a:gdLst/>
-          <a:ahLst/>
-          <a:cxnLst/>
-          <a:rect l="0" t="0" r="0" b="0"/>
-          <a:pathLst>
-            <a:path>
-              <a:moveTo>
-                <a:pt x="0" y="0"/>
-              </a:moveTo>
-              <a:lnTo>
-                <a:pt x="0" y="1327659"/>
-              </a:lnTo>
-              <a:lnTo>
-                <a:pt x="287934" y="1327659"/>
-              </a:lnTo>
-            </a:path>
-          </a:pathLst>
-        </a:custGeom>
-        <a:noFill/>
-        <a:ln w="6350" cap="flat" cmpd="sng" algn="ctr">
-          <a:solidFill>
-            <a:schemeClr val="accent1">
-              <a:shade val="80000"/>
-              <a:hueOff val="0"/>
-              <a:satOff val="0"/>
-              <a:lumOff val="0"/>
-              <a:alphaOff val="0"/>
-            </a:schemeClr>
-          </a:solidFill>
-          <a:prstDash val="solid"/>
-          <a:miter lim="800000"/>
-        </a:ln>
-        <a:effectLst/>
-      </dsp:spPr>
-      <dsp:style>
-        <a:lnRef idx="1">
-          <a:scrgbClr r="0" g="0" b="0"/>
-        </a:lnRef>
-        <a:fillRef idx="0">
-          <a:scrgbClr r="0" g="0" b="0"/>
-        </a:fillRef>
-        <a:effectRef idx="0">
-          <a:scrgbClr r="0" g="0" b="0"/>
-        </a:effectRef>
-        <a:fontRef idx="minor"/>
-      </dsp:style>
-    </dsp:sp>
-    <dsp:sp modelId="{A491FDAF-2359-B140-B33A-8323B9468F07}">
-      <dsp:nvSpPr>
-        <dsp:cNvPr id="0" name=""/>
-        <dsp:cNvSpPr/>
-      </dsp:nvSpPr>
-      <dsp:spPr>
-        <a:xfrm>
-          <a:off x="2051168" y="2977518"/>
-          <a:ext cx="3578106" cy="259173"/>
-        </a:xfrm>
-        <a:custGeom>
-          <a:avLst/>
-          <a:gdLst/>
-          <a:ahLst/>
-          <a:cxnLst/>
-          <a:rect l="0" t="0" r="0" b="0"/>
-          <a:pathLst>
-            <a:path>
-              <a:moveTo>
-                <a:pt x="3578106" y="0"/>
-              </a:moveTo>
-              <a:lnTo>
-                <a:pt x="3578106" y="122444"/>
-              </a:lnTo>
-              <a:lnTo>
-                <a:pt x="0" y="122444"/>
-              </a:lnTo>
-              <a:lnTo>
-                <a:pt x="0" y="259173"/>
-              </a:lnTo>
-            </a:path>
-          </a:pathLst>
-        </a:custGeom>
-        <a:noFill/>
-        <a:ln w="6350" cap="flat" cmpd="sng" algn="ctr">
-          <a:solidFill>
-            <a:schemeClr val="accent1">
-              <a:shade val="60000"/>
-              <a:hueOff val="0"/>
-              <a:satOff val="0"/>
-              <a:lumOff val="0"/>
-              <a:alphaOff val="0"/>
-            </a:schemeClr>
-          </a:solidFill>
-          <a:prstDash val="solid"/>
-          <a:miter lim="800000"/>
-        </a:ln>
-        <a:effectLst/>
-      </dsp:spPr>
-      <dsp:style>
-        <a:lnRef idx="1">
-          <a:scrgbClr r="0" g="0" b="0"/>
-        </a:lnRef>
-        <a:fillRef idx="0">
-          <a:scrgbClr r="0" g="0" b="0"/>
-        </a:fillRef>
-        <a:effectRef idx="0">
-          <a:scrgbClr r="0" g="0" b="0"/>
-        </a:effectRef>
-        <a:fontRef idx="minor"/>
-      </dsp:style>
-    </dsp:sp>
-    <dsp:sp modelId="{5B6F6B59-8F5B-6345-9968-75BE1F974883}">
-      <dsp:nvSpPr>
-        <dsp:cNvPr id="0" name=""/>
-        <dsp:cNvSpPr/>
-      </dsp:nvSpPr>
-      <dsp:spPr>
-        <a:xfrm>
-          <a:off x="3039716" y="1423370"/>
-          <a:ext cx="5179116" cy="1554147"/>
-        </a:xfrm>
-        <a:prstGeom prst="rect">
-          <a:avLst/>
-        </a:prstGeom>
-        <a:gradFill rotWithShape="0">
-          <a:gsLst>
-            <a:gs pos="0">
-              <a:schemeClr val="accent1">
-                <a:hueOff val="0"/>
-                <a:satOff val="0"/>
-                <a:lumOff val="0"/>
-                <a:alphaOff val="0"/>
-                <a:satMod val="103000"/>
-                <a:lumMod val="102000"/>
-                <a:tint val="94000"/>
-              </a:schemeClr>
-            </a:gs>
-            <a:gs pos="50000">
-              <a:schemeClr val="accent1">
-                <a:hueOff val="0"/>
-                <a:satOff val="0"/>
-                <a:lumOff val="0"/>
-                <a:alphaOff val="0"/>
-                <a:satMod val="110000"/>
-                <a:lumMod val="100000"/>
-                <a:shade val="100000"/>
-              </a:schemeClr>
-            </a:gs>
-            <a:gs pos="100000">
-              <a:schemeClr val="accent1">
-                <a:hueOff val="0"/>
-                <a:satOff val="0"/>
-                <a:lumOff val="0"/>
-                <a:alphaOff val="0"/>
-                <a:lumMod val="99000"/>
-                <a:satMod val="120000"/>
-                <a:shade val="78000"/>
-              </a:schemeClr>
-            </a:gs>
-          </a:gsLst>
-          <a:lin ang="5400000" scaled="0"/>
-        </a:gradFill>
-        <a:ln>
-          <a:noFill/>
-        </a:ln>
-        <a:effectLst/>
-      </dsp:spPr>
-      <dsp:style>
-        <a:lnRef idx="0">
-          <a:scrgbClr r="0" g="0" b="0"/>
-        </a:lnRef>
-        <a:fillRef idx="3">
-          <a:scrgbClr r="0" g="0" b="0"/>
-        </a:fillRef>
-        <a:effectRef idx="2">
-          <a:scrgbClr r="0" g="0" b="0"/>
-        </a:effectRef>
-        <a:fontRef idx="minor">
-          <a:schemeClr val="lt1"/>
-        </a:fontRef>
-      </dsp:style>
-      <dsp:txBody>
-        <a:bodyPr spcFirstLastPara="0" vert="horz" wrap="square" lIns="8255" tIns="8255" rIns="8255" bIns="8255" numCol="1" spcCol="1270" anchor="ctr" anchorCtr="0">
-          <a:noAutofit/>
-        </a:bodyPr>
-        <a:lstStyle/>
-        <a:p>
-          <a:pPr lvl="0" algn="ctr" defTabSz="577850">
-            <a:lnSpc>
-              <a:spcPct val="90000"/>
-            </a:lnSpc>
-            <a:spcBef>
-              <a:spcPct val="0"/>
-            </a:spcBef>
-            <a:spcAft>
-              <a:spcPct val="35000"/>
-            </a:spcAft>
-          </a:pPr>
-          <a:r>
-            <a:rPr lang="en-US" sz="1300" b="1" kern="1200" dirty="0" err="1" smtClean="0"/>
-            <a:t>MainApp</a:t>
-          </a:r>
-          <a:endParaRPr lang="en-US" sz="1300" b="1" kern="1200" dirty="0" smtClean="0"/>
-        </a:p>
-        <a:p>
-          <a:pPr lvl="0" algn="ctr" defTabSz="577850">
-            <a:lnSpc>
-              <a:spcPct val="90000"/>
-            </a:lnSpc>
-            <a:spcBef>
-              <a:spcPct val="0"/>
-            </a:spcBef>
-            <a:spcAft>
-              <a:spcPct val="35000"/>
-            </a:spcAft>
-          </a:pPr>
-          <a:r>
-            <a:rPr lang="en-US" sz="1300" kern="1200" dirty="0" smtClean="0"/>
-            <a:t>- The </a:t>
-          </a:r>
-          <a:r>
-            <a:rPr lang="en-US" sz="1300" kern="1200" dirty="0" err="1" smtClean="0"/>
-            <a:t>MainApp</a:t>
-          </a:r>
-          <a:r>
-            <a:rPr lang="en-US" sz="1300" kern="1200" dirty="0" smtClean="0"/>
-            <a:t> instantiates all views that require a window</a:t>
-          </a:r>
-          <a:endParaRPr lang="en-US" sz="1300" kern="1200" dirty="0"/>
-        </a:p>
-      </dsp:txBody>
-      <dsp:txXfrm>
-        <a:off x="3039716" y="1423370"/>
-        <a:ext cx="5179116" cy="1554147"/>
-      </dsp:txXfrm>
-    </dsp:sp>
-    <dsp:sp modelId="{3D554475-69D0-6C4E-8CB5-D5A8D6CC03B4}">
-      <dsp:nvSpPr>
-        <dsp:cNvPr id="0" name=""/>
-        <dsp:cNvSpPr/>
-      </dsp:nvSpPr>
-      <dsp:spPr>
-        <a:xfrm>
-          <a:off x="728685" y="3236691"/>
-          <a:ext cx="2644966" cy="651091"/>
-        </a:xfrm>
-        <a:prstGeom prst="rect">
-          <a:avLst/>
-        </a:prstGeom>
-        <a:gradFill rotWithShape="0">
-          <a:gsLst>
-            <a:gs pos="0">
-              <a:schemeClr val="accent1">
-                <a:hueOff val="0"/>
-                <a:satOff val="0"/>
-                <a:lumOff val="0"/>
-                <a:alphaOff val="0"/>
-                <a:satMod val="103000"/>
-                <a:lumMod val="102000"/>
-                <a:tint val="94000"/>
-              </a:schemeClr>
-            </a:gs>
-            <a:gs pos="50000">
-              <a:schemeClr val="accent1">
-                <a:hueOff val="0"/>
-                <a:satOff val="0"/>
-                <a:lumOff val="0"/>
-                <a:alphaOff val="0"/>
-                <a:satMod val="110000"/>
-                <a:lumMod val="100000"/>
-                <a:shade val="100000"/>
-              </a:schemeClr>
-            </a:gs>
-            <a:gs pos="100000">
-              <a:schemeClr val="accent1">
-                <a:hueOff val="0"/>
-                <a:satOff val="0"/>
-                <a:lumOff val="0"/>
-                <a:alphaOff val="0"/>
-                <a:lumMod val="99000"/>
-                <a:satMod val="120000"/>
-                <a:shade val="78000"/>
-              </a:schemeClr>
-            </a:gs>
-          </a:gsLst>
-          <a:lin ang="5400000" scaled="0"/>
-        </a:gradFill>
-        <a:ln>
-          <a:noFill/>
-        </a:ln>
-        <a:effectLst/>
-      </dsp:spPr>
-      <dsp:style>
-        <a:lnRef idx="0">
-          <a:scrgbClr r="0" g="0" b="0"/>
-        </a:lnRef>
-        <a:fillRef idx="3">
-          <a:scrgbClr r="0" g="0" b="0"/>
-        </a:fillRef>
-        <a:effectRef idx="2">
-          <a:scrgbClr r="0" g="0" b="0"/>
-        </a:effectRef>
-        <a:fontRef idx="minor">
-          <a:schemeClr val="lt1"/>
-        </a:fontRef>
-      </dsp:style>
-      <dsp:txBody>
-        <a:bodyPr spcFirstLastPara="0" vert="horz" wrap="square" lIns="8255" tIns="8255" rIns="8255" bIns="8255" numCol="1" spcCol="1270" anchor="ctr" anchorCtr="0">
-          <a:noAutofit/>
-        </a:bodyPr>
-        <a:lstStyle/>
-        <a:p>
-          <a:pPr lvl="0" algn="ctr" defTabSz="577850">
-            <a:lnSpc>
-              <a:spcPct val="90000"/>
-            </a:lnSpc>
-            <a:spcBef>
-              <a:spcPct val="0"/>
-            </a:spcBef>
-            <a:spcAft>
-              <a:spcPct val="35000"/>
-            </a:spcAft>
-          </a:pPr>
-          <a:r>
-            <a:rPr lang="en-US" sz="1300" b="1" kern="1200" dirty="0" err="1" smtClean="0"/>
-            <a:t>RootLayout</a:t>
-          </a:r>
-          <a:endParaRPr lang="en-US" sz="1300" b="1" kern="1200" dirty="0" smtClean="0"/>
-        </a:p>
-        <a:p>
-          <a:pPr lvl="0" algn="ctr" defTabSz="577850">
-            <a:lnSpc>
-              <a:spcPct val="90000"/>
-            </a:lnSpc>
-            <a:spcBef>
-              <a:spcPct val="0"/>
-            </a:spcBef>
-            <a:spcAft>
-              <a:spcPct val="35000"/>
-            </a:spcAft>
-          </a:pPr>
-          <a:r>
-            <a:rPr lang="en-US" sz="1300" kern="1200" dirty="0" smtClean="0"/>
-            <a:t>- The basic window and </a:t>
-          </a:r>
-          <a:r>
-            <a:rPr lang="en-US" sz="1300" kern="1200" dirty="0" err="1" smtClean="0"/>
-            <a:t>menubar</a:t>
-          </a:r>
-          <a:endParaRPr lang="en-US" sz="1300" kern="1200" dirty="0"/>
-        </a:p>
-      </dsp:txBody>
-      <dsp:txXfrm>
-        <a:off x="728685" y="3236691"/>
-        <a:ext cx="2644966" cy="651091"/>
-      </dsp:txXfrm>
-    </dsp:sp>
-    <dsp:sp modelId="{1FC02C9F-9E09-8C42-AF69-19C03F84467B}">
-      <dsp:nvSpPr>
-        <dsp:cNvPr id="0" name=""/>
-        <dsp:cNvSpPr/>
-      </dsp:nvSpPr>
-      <dsp:spPr>
-        <a:xfrm>
-          <a:off x="1281116" y="4889896"/>
-          <a:ext cx="2719060" cy="651091"/>
-        </a:xfrm>
-        <a:prstGeom prst="rect">
-          <a:avLst/>
-        </a:prstGeom>
-        <a:gradFill rotWithShape="0">
-          <a:gsLst>
-            <a:gs pos="0">
-              <a:schemeClr val="accent1">
-                <a:hueOff val="0"/>
-                <a:satOff val="0"/>
-                <a:lumOff val="0"/>
-                <a:alphaOff val="0"/>
-                <a:satMod val="103000"/>
-                <a:lumMod val="102000"/>
-                <a:tint val="94000"/>
-              </a:schemeClr>
-            </a:gs>
-            <a:gs pos="50000">
-              <a:schemeClr val="accent1">
-                <a:hueOff val="0"/>
-                <a:satOff val="0"/>
-                <a:lumOff val="0"/>
-                <a:alphaOff val="0"/>
-                <a:satMod val="110000"/>
-                <a:lumMod val="100000"/>
-                <a:shade val="100000"/>
-              </a:schemeClr>
-            </a:gs>
-            <a:gs pos="100000">
-              <a:schemeClr val="accent1">
-                <a:hueOff val="0"/>
-                <a:satOff val="0"/>
-                <a:lumOff val="0"/>
-                <a:alphaOff val="0"/>
-                <a:lumMod val="99000"/>
-                <a:satMod val="120000"/>
-                <a:shade val="78000"/>
-              </a:schemeClr>
-            </a:gs>
-          </a:gsLst>
-          <a:lin ang="5400000" scaled="0"/>
-        </a:gradFill>
-        <a:ln>
-          <a:noFill/>
-        </a:ln>
-        <a:effectLst/>
-      </dsp:spPr>
-      <dsp:style>
-        <a:lnRef idx="0">
-          <a:scrgbClr r="0" g="0" b="0"/>
-        </a:lnRef>
-        <a:fillRef idx="3">
-          <a:scrgbClr r="0" g="0" b="0"/>
-        </a:fillRef>
-        <a:effectRef idx="2">
-          <a:scrgbClr r="0" g="0" b="0"/>
-        </a:effectRef>
-        <a:fontRef idx="minor">
-          <a:schemeClr val="lt1"/>
-        </a:fontRef>
-      </dsp:style>
-      <dsp:txBody>
-        <a:bodyPr spcFirstLastPara="0" vert="horz" wrap="square" lIns="8255" tIns="8255" rIns="8255" bIns="8255" numCol="1" spcCol="1270" anchor="ctr" anchorCtr="0">
-          <a:noAutofit/>
-        </a:bodyPr>
-        <a:lstStyle/>
-        <a:p>
-          <a:pPr lvl="0" algn="ctr" defTabSz="577850">
-            <a:lnSpc>
-              <a:spcPct val="90000"/>
-            </a:lnSpc>
-            <a:spcBef>
-              <a:spcPct val="0"/>
-            </a:spcBef>
-            <a:spcAft>
-              <a:spcPct val="35000"/>
-            </a:spcAft>
-          </a:pPr>
-          <a:r>
-            <a:rPr lang="en-US" sz="1300" kern="1200" dirty="0" err="1" smtClean="0"/>
-            <a:t>MainEditorView</a:t>
-          </a:r>
-          <a:endParaRPr lang="en-US" sz="1300" kern="1200" dirty="0" smtClean="0"/>
-        </a:p>
-        <a:p>
-          <a:pPr lvl="0" algn="ctr" defTabSz="577850">
-            <a:lnSpc>
-              <a:spcPct val="90000"/>
-            </a:lnSpc>
-            <a:spcBef>
-              <a:spcPct val="0"/>
-            </a:spcBef>
-            <a:spcAft>
-              <a:spcPct val="35000"/>
-            </a:spcAft>
-          </a:pPr>
-          <a:r>
-            <a:rPr lang="en-US" sz="1300" kern="1200" dirty="0" smtClean="0"/>
-            <a:t>- The graphical UI content</a:t>
-          </a:r>
-          <a:endParaRPr lang="en-US" sz="1300" kern="1200" dirty="0"/>
-        </a:p>
-      </dsp:txBody>
-      <dsp:txXfrm>
-        <a:off x="1281116" y="4889896"/>
-        <a:ext cx="2719060" cy="651091"/>
-      </dsp:txXfrm>
-    </dsp:sp>
-    <dsp:sp modelId="{9D264941-B744-944A-A6C3-E09FB9D87287}">
-      <dsp:nvSpPr>
-        <dsp:cNvPr id="0" name=""/>
-        <dsp:cNvSpPr/>
-      </dsp:nvSpPr>
-      <dsp:spPr>
-        <a:xfrm>
-          <a:off x="3653783" y="3250976"/>
-          <a:ext cx="1302182" cy="1246637"/>
-        </a:xfrm>
-        <a:prstGeom prst="rect">
-          <a:avLst/>
-        </a:prstGeom>
-        <a:gradFill rotWithShape="0">
-          <a:gsLst>
-            <a:gs pos="0">
-              <a:schemeClr val="accent1">
-                <a:hueOff val="0"/>
-                <a:satOff val="0"/>
-                <a:lumOff val="0"/>
-                <a:alphaOff val="0"/>
-                <a:satMod val="103000"/>
-                <a:lumMod val="102000"/>
-                <a:tint val="94000"/>
-              </a:schemeClr>
-            </a:gs>
-            <a:gs pos="50000">
-              <a:schemeClr val="accent1">
-                <a:hueOff val="0"/>
-                <a:satOff val="0"/>
-                <a:lumOff val="0"/>
-                <a:alphaOff val="0"/>
-                <a:satMod val="110000"/>
-                <a:lumMod val="100000"/>
-                <a:shade val="100000"/>
-              </a:schemeClr>
-            </a:gs>
-            <a:gs pos="100000">
-              <a:schemeClr val="accent1">
-                <a:hueOff val="0"/>
-                <a:satOff val="0"/>
-                <a:lumOff val="0"/>
-                <a:alphaOff val="0"/>
-                <a:lumMod val="99000"/>
-                <a:satMod val="120000"/>
-                <a:shade val="78000"/>
-              </a:schemeClr>
-            </a:gs>
-          </a:gsLst>
-          <a:lin ang="5400000" scaled="0"/>
-        </a:gradFill>
-        <a:ln>
-          <a:noFill/>
-        </a:ln>
-        <a:effectLst/>
-      </dsp:spPr>
-      <dsp:style>
-        <a:lnRef idx="0">
-          <a:scrgbClr r="0" g="0" b="0"/>
-        </a:lnRef>
-        <a:fillRef idx="3">
-          <a:scrgbClr r="0" g="0" b="0"/>
-        </a:fillRef>
-        <a:effectRef idx="2">
-          <a:scrgbClr r="0" g="0" b="0"/>
-        </a:effectRef>
-        <a:fontRef idx="minor">
-          <a:schemeClr val="lt1"/>
-        </a:fontRef>
-      </dsp:style>
-      <dsp:txBody>
-        <a:bodyPr spcFirstLastPara="0" vert="horz" wrap="square" lIns="8255" tIns="8255" rIns="8255" bIns="8255" numCol="1" spcCol="1270" anchor="ctr" anchorCtr="0">
-          <a:noAutofit/>
-        </a:bodyPr>
-        <a:lstStyle/>
-        <a:p>
-          <a:pPr lvl="0" algn="ctr" defTabSz="577850">
-            <a:lnSpc>
-              <a:spcPct val="90000"/>
-            </a:lnSpc>
-            <a:spcBef>
-              <a:spcPct val="0"/>
-            </a:spcBef>
-            <a:spcAft>
-              <a:spcPct val="35000"/>
-            </a:spcAft>
-          </a:pPr>
-          <a:r>
-            <a:rPr lang="en-US" sz="1300" kern="1200" dirty="0" err="1" smtClean="0"/>
-            <a:t>CompiledView</a:t>
-          </a:r>
-          <a:endParaRPr lang="en-US" sz="1300" kern="1200" dirty="0" smtClean="0"/>
-        </a:p>
-        <a:p>
-          <a:pPr lvl="0" algn="ctr" defTabSz="577850">
-            <a:lnSpc>
-              <a:spcPct val="90000"/>
-            </a:lnSpc>
-            <a:spcBef>
-              <a:spcPct val="0"/>
-            </a:spcBef>
-            <a:spcAft>
-              <a:spcPct val="35000"/>
-            </a:spcAft>
-          </a:pPr>
-          <a:r>
-            <a:rPr lang="en-US" sz="1300" kern="1200" dirty="0" smtClean="0"/>
-            <a:t>- Shows the video GUI</a:t>
-          </a:r>
-          <a:endParaRPr lang="en-US" sz="1300" kern="1200" dirty="0"/>
-        </a:p>
-      </dsp:txBody>
-      <dsp:txXfrm>
-        <a:off x="3653783" y="3250976"/>
-        <a:ext cx="1302182" cy="1246637"/>
-      </dsp:txXfrm>
-    </dsp:sp>
-    <dsp:sp modelId="{13D0ABDF-E05E-774A-9CDE-34211E6EFA3F}">
-      <dsp:nvSpPr>
-        <dsp:cNvPr id="0" name=""/>
-        <dsp:cNvSpPr/>
-      </dsp:nvSpPr>
-      <dsp:spPr>
-        <a:xfrm>
-          <a:off x="5229423" y="3250976"/>
-          <a:ext cx="1302182" cy="1246637"/>
-        </a:xfrm>
-        <a:prstGeom prst="rect">
-          <a:avLst/>
-        </a:prstGeom>
-        <a:gradFill rotWithShape="0">
-          <a:gsLst>
-            <a:gs pos="0">
-              <a:schemeClr val="accent1">
-                <a:hueOff val="0"/>
-                <a:satOff val="0"/>
-                <a:lumOff val="0"/>
-                <a:alphaOff val="0"/>
-                <a:satMod val="103000"/>
-                <a:lumMod val="102000"/>
-                <a:tint val="94000"/>
-              </a:schemeClr>
-            </a:gs>
-            <a:gs pos="50000">
-              <a:schemeClr val="accent1">
-                <a:hueOff val="0"/>
-                <a:satOff val="0"/>
-                <a:lumOff val="0"/>
-                <a:alphaOff val="0"/>
-                <a:satMod val="110000"/>
-                <a:lumMod val="100000"/>
-                <a:shade val="100000"/>
-              </a:schemeClr>
-            </a:gs>
-            <a:gs pos="100000">
-              <a:schemeClr val="accent1">
-                <a:hueOff val="0"/>
-                <a:satOff val="0"/>
-                <a:lumOff val="0"/>
-                <a:alphaOff val="0"/>
-                <a:lumMod val="99000"/>
-                <a:satMod val="120000"/>
-                <a:shade val="78000"/>
-              </a:schemeClr>
-            </a:gs>
-          </a:gsLst>
-          <a:lin ang="5400000" scaled="0"/>
-        </a:gradFill>
-        <a:ln>
-          <a:noFill/>
-        </a:ln>
-        <a:effectLst/>
-      </dsp:spPr>
-      <dsp:style>
-        <a:lnRef idx="0">
-          <a:scrgbClr r="0" g="0" b="0"/>
-        </a:lnRef>
-        <a:fillRef idx="3">
-          <a:scrgbClr r="0" g="0" b="0"/>
-        </a:fillRef>
-        <a:effectRef idx="2">
-          <a:scrgbClr r="0" g="0" b="0"/>
-        </a:effectRef>
-        <a:fontRef idx="minor">
-          <a:schemeClr val="lt1"/>
-        </a:fontRef>
-      </dsp:style>
-      <dsp:txBody>
-        <a:bodyPr spcFirstLastPara="0" vert="horz" wrap="square" lIns="8255" tIns="8255" rIns="8255" bIns="8255" numCol="1" spcCol="1270" anchor="ctr" anchorCtr="0">
-          <a:noAutofit/>
-        </a:bodyPr>
-        <a:lstStyle/>
-        <a:p>
-          <a:pPr lvl="0" algn="ctr" defTabSz="577850">
-            <a:lnSpc>
-              <a:spcPct val="90000"/>
-            </a:lnSpc>
-            <a:spcBef>
-              <a:spcPct val="0"/>
-            </a:spcBef>
-            <a:spcAft>
-              <a:spcPct val="35000"/>
-            </a:spcAft>
-          </a:pPr>
-          <a:r>
-            <a:rPr lang="en-US" sz="1300" kern="1200" dirty="0" err="1" smtClean="0"/>
-            <a:t>GetStartedView</a:t>
-          </a:r>
-          <a:endParaRPr lang="en-US" sz="1300" kern="1200" dirty="0" smtClean="0"/>
-        </a:p>
-        <a:p>
-          <a:pPr lvl="0" algn="ctr" defTabSz="577850">
-            <a:lnSpc>
-              <a:spcPct val="90000"/>
-            </a:lnSpc>
-            <a:spcBef>
-              <a:spcPct val="0"/>
-            </a:spcBef>
-            <a:spcAft>
-              <a:spcPct val="35000"/>
-            </a:spcAft>
-          </a:pPr>
-          <a:r>
-            <a:rPr lang="en-US" sz="1300" kern="1200" dirty="0" smtClean="0"/>
-            <a:t>- A quick introduction to </a:t>
-          </a:r>
-          <a:r>
-            <a:rPr lang="en-US" sz="1300" kern="1200" dirty="0" err="1" smtClean="0"/>
-            <a:t>ViNO</a:t>
-          </a:r>
-          <a:endParaRPr lang="en-US" sz="1300" kern="1200" dirty="0"/>
-        </a:p>
-      </dsp:txBody>
-      <dsp:txXfrm>
-        <a:off x="5229423" y="3250976"/>
-        <a:ext cx="1302182" cy="1246637"/>
-      </dsp:txXfrm>
-    </dsp:sp>
-    <dsp:sp modelId="{63C14AB2-CDA5-254B-BD0E-31094C7416D6}">
-      <dsp:nvSpPr>
-        <dsp:cNvPr id="0" name=""/>
-        <dsp:cNvSpPr/>
-      </dsp:nvSpPr>
-      <dsp:spPr>
-        <a:xfrm>
-          <a:off x="6805064" y="3250976"/>
-          <a:ext cx="1302182" cy="1246637"/>
-        </a:xfrm>
-        <a:prstGeom prst="rect">
-          <a:avLst/>
-        </a:prstGeom>
-        <a:gradFill rotWithShape="0">
-          <a:gsLst>
-            <a:gs pos="0">
-              <a:schemeClr val="accent1">
-                <a:hueOff val="0"/>
-                <a:satOff val="0"/>
-                <a:lumOff val="0"/>
-                <a:alphaOff val="0"/>
-                <a:satMod val="103000"/>
-                <a:lumMod val="102000"/>
-                <a:tint val="94000"/>
-              </a:schemeClr>
-            </a:gs>
-            <a:gs pos="50000">
-              <a:schemeClr val="accent1">
-                <a:hueOff val="0"/>
-                <a:satOff val="0"/>
-                <a:lumOff val="0"/>
-                <a:alphaOff val="0"/>
-                <a:satMod val="110000"/>
-                <a:lumMod val="100000"/>
-                <a:shade val="100000"/>
-              </a:schemeClr>
-            </a:gs>
-            <a:gs pos="100000">
-              <a:schemeClr val="accent1">
-                <a:hueOff val="0"/>
-                <a:satOff val="0"/>
-                <a:lumOff val="0"/>
-                <a:alphaOff val="0"/>
-                <a:lumMod val="99000"/>
-                <a:satMod val="120000"/>
-                <a:shade val="78000"/>
-              </a:schemeClr>
-            </a:gs>
-          </a:gsLst>
-          <a:lin ang="5400000" scaled="0"/>
-        </a:gradFill>
-        <a:ln>
-          <a:noFill/>
-        </a:ln>
-        <a:effectLst/>
-      </dsp:spPr>
-      <dsp:style>
-        <a:lnRef idx="0">
-          <a:scrgbClr r="0" g="0" b="0"/>
-        </a:lnRef>
-        <a:fillRef idx="3">
-          <a:scrgbClr r="0" g="0" b="0"/>
-        </a:fillRef>
-        <a:effectRef idx="2">
-          <a:scrgbClr r="0" g="0" b="0"/>
-        </a:effectRef>
-        <a:fontRef idx="minor">
-          <a:schemeClr val="lt1"/>
-        </a:fontRef>
-      </dsp:style>
-      <dsp:txBody>
-        <a:bodyPr spcFirstLastPara="0" vert="horz" wrap="square" lIns="8255" tIns="8255" rIns="8255" bIns="8255" numCol="1" spcCol="1270" anchor="ctr" anchorCtr="0">
-          <a:noAutofit/>
-        </a:bodyPr>
-        <a:lstStyle/>
-        <a:p>
-          <a:pPr lvl="0" algn="ctr" defTabSz="577850">
-            <a:lnSpc>
-              <a:spcPct val="90000"/>
-            </a:lnSpc>
-            <a:spcBef>
-              <a:spcPct val="0"/>
-            </a:spcBef>
-            <a:spcAft>
-              <a:spcPct val="35000"/>
-            </a:spcAft>
-          </a:pPr>
-          <a:r>
-            <a:rPr lang="en-US" sz="1300" kern="1200" dirty="0" err="1" smtClean="0"/>
-            <a:t>ImportVideosView</a:t>
-          </a:r>
-          <a:endParaRPr lang="en-US" sz="1300" kern="1200" dirty="0" smtClean="0"/>
-        </a:p>
-        <a:p>
-          <a:pPr lvl="0" algn="ctr" defTabSz="577850">
-            <a:lnSpc>
-              <a:spcPct val="90000"/>
-            </a:lnSpc>
-            <a:spcBef>
-              <a:spcPct val="0"/>
-            </a:spcBef>
-            <a:spcAft>
-              <a:spcPct val="35000"/>
-            </a:spcAft>
-          </a:pPr>
-          <a:r>
-            <a:rPr lang="en-US" sz="1300" kern="1200" dirty="0" smtClean="0"/>
-            <a:t>- Importing videos from the camera or memory card</a:t>
-          </a:r>
-          <a:endParaRPr lang="en-US" sz="1300" kern="1200" dirty="0"/>
-        </a:p>
-      </dsp:txBody>
-      <dsp:txXfrm>
-        <a:off x="6805064" y="3250976"/>
-        <a:ext cx="1302182" cy="1246637"/>
-      </dsp:txXfrm>
-    </dsp:sp>
-    <dsp:sp modelId="{5A1501C8-A3B6-3144-A030-37CB02246727}">
-      <dsp:nvSpPr>
-        <dsp:cNvPr id="0" name=""/>
-        <dsp:cNvSpPr/>
-      </dsp:nvSpPr>
-      <dsp:spPr>
-        <a:xfrm>
-          <a:off x="8380704" y="3250976"/>
-          <a:ext cx="1302182" cy="1246637"/>
-        </a:xfrm>
-        <a:prstGeom prst="rect">
-          <a:avLst/>
-        </a:prstGeom>
-        <a:gradFill rotWithShape="0">
-          <a:gsLst>
-            <a:gs pos="0">
-              <a:schemeClr val="accent1">
-                <a:hueOff val="0"/>
-                <a:satOff val="0"/>
-                <a:lumOff val="0"/>
-                <a:alphaOff val="0"/>
-                <a:satMod val="103000"/>
-                <a:lumMod val="102000"/>
-                <a:tint val="94000"/>
-              </a:schemeClr>
-            </a:gs>
-            <a:gs pos="50000">
-              <a:schemeClr val="accent1">
-                <a:hueOff val="0"/>
-                <a:satOff val="0"/>
-                <a:lumOff val="0"/>
-                <a:alphaOff val="0"/>
-                <a:satMod val="110000"/>
-                <a:lumMod val="100000"/>
-                <a:shade val="100000"/>
-              </a:schemeClr>
-            </a:gs>
-            <a:gs pos="100000">
-              <a:schemeClr val="accent1">
-                <a:hueOff val="0"/>
-                <a:satOff val="0"/>
-                <a:lumOff val="0"/>
-                <a:alphaOff val="0"/>
-                <a:lumMod val="99000"/>
-                <a:satMod val="120000"/>
-                <a:shade val="78000"/>
-              </a:schemeClr>
-            </a:gs>
-          </a:gsLst>
-          <a:lin ang="5400000" scaled="0"/>
-        </a:gradFill>
-        <a:ln>
-          <a:noFill/>
-        </a:ln>
-        <a:effectLst/>
-      </dsp:spPr>
-      <dsp:style>
-        <a:lnRef idx="0">
-          <a:scrgbClr r="0" g="0" b="0"/>
-        </a:lnRef>
-        <a:fillRef idx="3">
-          <a:scrgbClr r="0" g="0" b="0"/>
-        </a:fillRef>
-        <a:effectRef idx="2">
-          <a:scrgbClr r="0" g="0" b="0"/>
-        </a:effectRef>
-        <a:fontRef idx="minor">
-          <a:schemeClr val="lt1"/>
-        </a:fontRef>
-      </dsp:style>
-      <dsp:txBody>
-        <a:bodyPr spcFirstLastPara="0" vert="horz" wrap="square" lIns="8255" tIns="8255" rIns="8255" bIns="8255" numCol="1" spcCol="1270" anchor="ctr" anchorCtr="0">
-          <a:noAutofit/>
-        </a:bodyPr>
-        <a:lstStyle/>
-        <a:p>
-          <a:pPr lvl="0" algn="ctr" defTabSz="577850">
-            <a:lnSpc>
-              <a:spcPct val="90000"/>
-            </a:lnSpc>
-            <a:spcBef>
-              <a:spcPct val="0"/>
-            </a:spcBef>
-            <a:spcAft>
-              <a:spcPct val="35000"/>
-            </a:spcAft>
-          </a:pPr>
-          <a:r>
-            <a:rPr lang="en-US" sz="1300" b="1" kern="1200" dirty="0" smtClean="0"/>
-            <a:t>MediaView</a:t>
-          </a:r>
-        </a:p>
-        <a:p>
-          <a:pPr lvl="0" algn="ctr" defTabSz="577850">
-            <a:lnSpc>
-              <a:spcPct val="90000"/>
-            </a:lnSpc>
-            <a:spcBef>
-              <a:spcPct val="0"/>
-            </a:spcBef>
-            <a:spcAft>
-              <a:spcPct val="35000"/>
-            </a:spcAft>
-          </a:pPr>
-          <a:r>
-            <a:rPr lang="en-US" sz="1300" kern="1200" dirty="0" smtClean="0"/>
-            <a:t>- Not used, see </a:t>
-          </a:r>
-          <a:r>
-            <a:rPr lang="en-US" sz="1300" kern="1200" dirty="0" err="1" smtClean="0"/>
-            <a:t>CompiledView</a:t>
-          </a:r>
-          <a:r>
-            <a:rPr lang="en-US" sz="1300" kern="1200" dirty="0" smtClean="0"/>
-            <a:t> instead</a:t>
-          </a:r>
-          <a:endParaRPr lang="en-US" sz="1300" kern="1200" dirty="0"/>
-        </a:p>
-      </dsp:txBody>
-      <dsp:txXfrm>
-        <a:off x="8380704" y="3250976"/>
-        <a:ext cx="1302182" cy="1246637"/>
-      </dsp:txXfrm>
-    </dsp:sp>
-    <dsp:sp modelId="{F76AFC63-9020-C646-8913-D2BA5F56F803}">
-      <dsp:nvSpPr>
-        <dsp:cNvPr id="0" name=""/>
-        <dsp:cNvSpPr/>
-      </dsp:nvSpPr>
-      <dsp:spPr>
-        <a:xfrm>
-          <a:off x="9956344" y="3250976"/>
-          <a:ext cx="1302182" cy="1246644"/>
-        </a:xfrm>
-        <a:prstGeom prst="rect">
-          <a:avLst/>
-        </a:prstGeom>
-        <a:gradFill rotWithShape="0">
-          <a:gsLst>
-            <a:gs pos="0">
-              <a:schemeClr val="accent1">
-                <a:hueOff val="0"/>
-                <a:satOff val="0"/>
-                <a:lumOff val="0"/>
-                <a:alphaOff val="0"/>
-                <a:satMod val="103000"/>
-                <a:lumMod val="102000"/>
-                <a:tint val="94000"/>
-              </a:schemeClr>
-            </a:gs>
-            <a:gs pos="50000">
-              <a:schemeClr val="accent1">
-                <a:hueOff val="0"/>
-                <a:satOff val="0"/>
-                <a:lumOff val="0"/>
-                <a:alphaOff val="0"/>
-                <a:satMod val="110000"/>
-                <a:lumMod val="100000"/>
-                <a:shade val="100000"/>
-              </a:schemeClr>
-            </a:gs>
-            <a:gs pos="100000">
-              <a:schemeClr val="accent1">
-                <a:hueOff val="0"/>
-                <a:satOff val="0"/>
-                <a:lumOff val="0"/>
-                <a:alphaOff val="0"/>
-                <a:lumMod val="99000"/>
-                <a:satMod val="120000"/>
-                <a:shade val="78000"/>
-              </a:schemeClr>
-            </a:gs>
-          </a:gsLst>
-          <a:lin ang="5400000" scaled="0"/>
-        </a:gradFill>
-        <a:ln>
-          <a:noFill/>
-        </a:ln>
-        <a:effectLst/>
-      </dsp:spPr>
-      <dsp:style>
-        <a:lnRef idx="0">
-          <a:scrgbClr r="0" g="0" b="0"/>
-        </a:lnRef>
-        <a:fillRef idx="3">
-          <a:scrgbClr r="0" g="0" b="0"/>
-        </a:fillRef>
-        <a:effectRef idx="2">
-          <a:scrgbClr r="0" g="0" b="0"/>
-        </a:effectRef>
-        <a:fontRef idx="minor">
-          <a:schemeClr val="lt1"/>
-        </a:fontRef>
-      </dsp:style>
-      <dsp:txBody>
-        <a:bodyPr spcFirstLastPara="0" vert="horz" wrap="square" lIns="8255" tIns="8255" rIns="8255" bIns="8255" numCol="1" spcCol="1270" anchor="ctr" anchorCtr="0">
-          <a:noAutofit/>
-        </a:bodyPr>
-        <a:lstStyle/>
-        <a:p>
-          <a:pPr lvl="0" algn="ctr" defTabSz="577850">
-            <a:lnSpc>
-              <a:spcPct val="90000"/>
-            </a:lnSpc>
-            <a:spcBef>
-              <a:spcPct val="0"/>
-            </a:spcBef>
-            <a:spcAft>
-              <a:spcPct val="35000"/>
-            </a:spcAft>
-          </a:pPr>
-          <a:r>
-            <a:rPr lang="en-US" sz="1300" kern="1200" dirty="0" err="1" smtClean="0"/>
-            <a:t>NoteDetailsView</a:t>
-          </a:r>
-          <a:endParaRPr lang="en-US" sz="1300" kern="1200" dirty="0" smtClean="0"/>
-        </a:p>
-        <a:p>
-          <a:pPr lvl="0" algn="ctr" defTabSz="577850">
-            <a:lnSpc>
-              <a:spcPct val="90000"/>
-            </a:lnSpc>
-            <a:spcBef>
-              <a:spcPct val="0"/>
-            </a:spcBef>
-            <a:spcAft>
-              <a:spcPct val="35000"/>
-            </a:spcAft>
-          </a:pPr>
-          <a:r>
-            <a:rPr lang="en-US" sz="1300" kern="1200" dirty="0" smtClean="0"/>
-            <a:t>- Meta data GUI</a:t>
-          </a:r>
-          <a:endParaRPr lang="en-US" sz="1300" kern="1200" dirty="0"/>
-        </a:p>
-      </dsp:txBody>
-      <dsp:txXfrm>
-        <a:off x="9956344" y="3250976"/>
-        <a:ext cx="1302182" cy="1246644"/>
-      </dsp:txXfrm>
-    </dsp:sp>
   </dsp:spTree>
 </dsp:drawing>
 </file>
@@ -4578,906 +3188,6 @@
       <dsp:cNvGrpSpPr/>
     </dsp:nvGrpSpPr>
     <dsp:grpSpPr/>
-    <dsp:sp modelId="{A3661789-984B-4B12-AAFA-1703B25E4BE4}">
-      <dsp:nvSpPr>
-        <dsp:cNvPr id="0" name=""/>
-        <dsp:cNvSpPr/>
-      </dsp:nvSpPr>
-      <dsp:spPr>
-        <a:xfrm>
-          <a:off x="252061" y="1895742"/>
-          <a:ext cx="2634599" cy="1317299"/>
-        </a:xfrm>
-        <a:prstGeom prst="roundRect">
-          <a:avLst>
-            <a:gd name="adj" fmla="val 10000"/>
-          </a:avLst>
-        </a:prstGeom>
-        <a:solidFill>
-          <a:schemeClr val="accent1">
-            <a:hueOff val="0"/>
-            <a:satOff val="0"/>
-            <a:lumOff val="0"/>
-            <a:alphaOff val="0"/>
-          </a:schemeClr>
-        </a:solidFill>
-        <a:ln w="12700" cap="flat" cmpd="sng" algn="ctr">
-          <a:solidFill>
-            <a:schemeClr val="lt1">
-              <a:hueOff val="0"/>
-              <a:satOff val="0"/>
-              <a:lumOff val="0"/>
-              <a:alphaOff val="0"/>
-            </a:schemeClr>
-          </a:solidFill>
-          <a:prstDash val="solid"/>
-          <a:miter lim="800000"/>
-        </a:ln>
-        <a:effectLst/>
-      </dsp:spPr>
-      <dsp:style>
-        <a:lnRef idx="2">
-          <a:scrgbClr r="0" g="0" b="0"/>
-        </a:lnRef>
-        <a:fillRef idx="1">
-          <a:scrgbClr r="0" g="0" b="0"/>
-        </a:fillRef>
-        <a:effectRef idx="0">
-          <a:scrgbClr r="0" g="0" b="0"/>
-        </a:effectRef>
-        <a:fontRef idx="minor">
-          <a:schemeClr val="lt1"/>
-        </a:fontRef>
-      </dsp:style>
-      <dsp:txBody>
-        <a:bodyPr spcFirstLastPara="0" vert="horz" wrap="square" lIns="8255" tIns="8255" rIns="8255" bIns="8255" numCol="1" spcCol="1270" anchor="ctr" anchorCtr="0">
-          <a:noAutofit/>
-        </a:bodyPr>
-        <a:lstStyle/>
-        <a:p>
-          <a:pPr lvl="0" algn="ctr" defTabSz="577850">
-            <a:lnSpc>
-              <a:spcPct val="90000"/>
-            </a:lnSpc>
-            <a:spcBef>
-              <a:spcPct val="0"/>
-            </a:spcBef>
-            <a:spcAft>
-              <a:spcPct val="35000"/>
-            </a:spcAft>
-          </a:pPr>
-          <a:r>
-            <a:rPr lang="da-DK" sz="1300" kern="1200" dirty="0" err="1" smtClean="0"/>
-            <a:t>Mainapp.gopro</a:t>
-          </a:r>
-          <a:r>
-            <a:rPr lang="da-DK" sz="1300" kern="1200" dirty="0" smtClean="0"/>
-            <a:t>::</a:t>
-          </a:r>
-          <a:r>
-            <a:rPr lang="da-DK" sz="1300" kern="1200" dirty="0" err="1" smtClean="0"/>
-            <a:t>GoProAPI</a:t>
-          </a:r>
-          <a:endParaRPr lang="en-GB" sz="1300" kern="1200" dirty="0"/>
-        </a:p>
-      </dsp:txBody>
-      <dsp:txXfrm>
-        <a:off x="290643" y="1934324"/>
-        <a:ext cx="2557435" cy="1240135"/>
-      </dsp:txXfrm>
-    </dsp:sp>
-    <dsp:sp modelId="{BD868FF2-2C29-4C2A-9FDC-77A25C641E66}">
-      <dsp:nvSpPr>
-        <dsp:cNvPr id="0" name=""/>
-        <dsp:cNvSpPr/>
-      </dsp:nvSpPr>
-      <dsp:spPr>
-        <a:xfrm rot="18770822">
-          <a:off x="2638747" y="1959061"/>
-          <a:ext cx="1549665" cy="54492"/>
-        </a:xfrm>
-        <a:custGeom>
-          <a:avLst/>
-          <a:gdLst/>
-          <a:ahLst/>
-          <a:cxnLst/>
-          <a:rect l="0" t="0" r="0" b="0"/>
-          <a:pathLst>
-            <a:path>
-              <a:moveTo>
-                <a:pt x="0" y="27246"/>
-              </a:moveTo>
-              <a:lnTo>
-                <a:pt x="1549665" y="27246"/>
-              </a:lnTo>
-            </a:path>
-          </a:pathLst>
-        </a:custGeom>
-        <a:noFill/>
-        <a:ln w="12700" cap="flat" cmpd="sng" algn="ctr">
-          <a:solidFill>
-            <a:schemeClr val="accent1">
-              <a:shade val="60000"/>
-              <a:hueOff val="0"/>
-              <a:satOff val="0"/>
-              <a:lumOff val="0"/>
-              <a:alphaOff val="0"/>
-            </a:schemeClr>
-          </a:solidFill>
-          <a:prstDash val="solid"/>
-          <a:miter lim="800000"/>
-        </a:ln>
-        <a:effectLst/>
-      </dsp:spPr>
-      <dsp:style>
-        <a:lnRef idx="2">
-          <a:scrgbClr r="0" g="0" b="0"/>
-        </a:lnRef>
-        <a:fillRef idx="0">
-          <a:scrgbClr r="0" g="0" b="0"/>
-        </a:fillRef>
-        <a:effectRef idx="0">
-          <a:scrgbClr r="0" g="0" b="0"/>
-        </a:effectRef>
-        <a:fontRef idx="minor"/>
-      </dsp:style>
-      <dsp:txBody>
-        <a:bodyPr spcFirstLastPara="0" vert="horz" wrap="square" lIns="12700" tIns="0" rIns="12700" bIns="0" numCol="1" spcCol="1270" anchor="ctr" anchorCtr="0">
-          <a:noAutofit/>
-        </a:bodyPr>
-        <a:lstStyle/>
-        <a:p>
-          <a:pPr lvl="0" algn="ctr" defTabSz="222250">
-            <a:lnSpc>
-              <a:spcPct val="90000"/>
-            </a:lnSpc>
-            <a:spcBef>
-              <a:spcPct val="0"/>
-            </a:spcBef>
-            <a:spcAft>
-              <a:spcPct val="35000"/>
-            </a:spcAft>
-          </a:pPr>
-          <a:endParaRPr lang="en-GB" sz="500" kern="1200"/>
-        </a:p>
-      </dsp:txBody>
-      <dsp:txXfrm>
-        <a:off x="3374838" y="1947565"/>
-        <a:ext cx="77483" cy="77483"/>
-      </dsp:txXfrm>
-    </dsp:sp>
-    <dsp:sp modelId="{6E9A058B-3C46-4621-8C16-20C0E40254DB}">
-      <dsp:nvSpPr>
-        <dsp:cNvPr id="0" name=""/>
-        <dsp:cNvSpPr/>
-      </dsp:nvSpPr>
-      <dsp:spPr>
-        <a:xfrm>
-          <a:off x="3940500" y="759571"/>
-          <a:ext cx="2634599" cy="1317299"/>
-        </a:xfrm>
-        <a:prstGeom prst="roundRect">
-          <a:avLst>
-            <a:gd name="adj" fmla="val 10000"/>
-          </a:avLst>
-        </a:prstGeom>
-        <a:solidFill>
-          <a:schemeClr val="accent1">
-            <a:hueOff val="0"/>
-            <a:satOff val="0"/>
-            <a:lumOff val="0"/>
-            <a:alphaOff val="0"/>
-          </a:schemeClr>
-        </a:solidFill>
-        <a:ln w="12700" cap="flat" cmpd="sng" algn="ctr">
-          <a:solidFill>
-            <a:schemeClr val="lt1">
-              <a:hueOff val="0"/>
-              <a:satOff val="0"/>
-              <a:lumOff val="0"/>
-              <a:alphaOff val="0"/>
-            </a:schemeClr>
-          </a:solidFill>
-          <a:prstDash val="solid"/>
-          <a:miter lim="800000"/>
-        </a:ln>
-        <a:effectLst/>
-      </dsp:spPr>
-      <dsp:style>
-        <a:lnRef idx="2">
-          <a:scrgbClr r="0" g="0" b="0"/>
-        </a:lnRef>
-        <a:fillRef idx="1">
-          <a:scrgbClr r="0" g="0" b="0"/>
-        </a:fillRef>
-        <a:effectRef idx="0">
-          <a:scrgbClr r="0" g="0" b="0"/>
-        </a:effectRef>
-        <a:fontRef idx="minor">
-          <a:schemeClr val="lt1"/>
-        </a:fontRef>
-      </dsp:style>
-      <dsp:txBody>
-        <a:bodyPr spcFirstLastPara="0" vert="horz" wrap="square" lIns="8255" tIns="8255" rIns="8255" bIns="8255" numCol="1" spcCol="1270" anchor="ctr" anchorCtr="0">
-          <a:noAutofit/>
-        </a:bodyPr>
-        <a:lstStyle/>
-        <a:p>
-          <a:pPr lvl="0" algn="ctr" defTabSz="577850">
-            <a:lnSpc>
-              <a:spcPct val="90000"/>
-            </a:lnSpc>
-            <a:spcBef>
-              <a:spcPct val="0"/>
-            </a:spcBef>
-            <a:spcAft>
-              <a:spcPct val="35000"/>
-            </a:spcAft>
-          </a:pPr>
-          <a:r>
-            <a:rPr lang="da-DK" sz="1300" kern="1200" dirty="0" err="1" smtClean="0"/>
-            <a:t>GoProHelper</a:t>
-          </a:r>
-          <a:r>
-            <a:rPr lang="da-DK" sz="1300" kern="1200" dirty="0" smtClean="0"/>
-            <a:t>::</a:t>
-          </a:r>
-          <a:r>
-            <a:rPr lang="da-DK" sz="1300" kern="1200" dirty="0" err="1" smtClean="0"/>
-            <a:t>GoProHelper</a:t>
-          </a:r>
-          <a:endParaRPr lang="en-GB" sz="1300" kern="1200" dirty="0"/>
-        </a:p>
-      </dsp:txBody>
-      <dsp:txXfrm>
-        <a:off x="3979082" y="798153"/>
-        <a:ext cx="2557435" cy="1240135"/>
-      </dsp:txXfrm>
-    </dsp:sp>
-    <dsp:sp modelId="{BC3C51C2-FE4A-461D-8012-EA4C23FD71B7}">
-      <dsp:nvSpPr>
-        <dsp:cNvPr id="0" name=""/>
-        <dsp:cNvSpPr/>
-      </dsp:nvSpPr>
-      <dsp:spPr>
-        <a:xfrm rot="19457599">
-          <a:off x="6453115" y="1012252"/>
-          <a:ext cx="1297807" cy="54492"/>
-        </a:xfrm>
-        <a:custGeom>
-          <a:avLst/>
-          <a:gdLst/>
-          <a:ahLst/>
-          <a:cxnLst/>
-          <a:rect l="0" t="0" r="0" b="0"/>
-          <a:pathLst>
-            <a:path>
-              <a:moveTo>
-                <a:pt x="0" y="27246"/>
-              </a:moveTo>
-              <a:lnTo>
-                <a:pt x="1297807" y="27246"/>
-              </a:lnTo>
-            </a:path>
-          </a:pathLst>
-        </a:custGeom>
-        <a:noFill/>
-        <a:ln w="12700" cap="flat" cmpd="sng" algn="ctr">
-          <a:solidFill>
-            <a:schemeClr val="accent1">
-              <a:shade val="80000"/>
-              <a:hueOff val="0"/>
-              <a:satOff val="0"/>
-              <a:lumOff val="0"/>
-              <a:alphaOff val="0"/>
-            </a:schemeClr>
-          </a:solidFill>
-          <a:prstDash val="solid"/>
-          <a:miter lim="800000"/>
-        </a:ln>
-        <a:effectLst/>
-      </dsp:spPr>
-      <dsp:style>
-        <a:lnRef idx="2">
-          <a:scrgbClr r="0" g="0" b="0"/>
-        </a:lnRef>
-        <a:fillRef idx="0">
-          <a:scrgbClr r="0" g="0" b="0"/>
-        </a:fillRef>
-        <a:effectRef idx="0">
-          <a:scrgbClr r="0" g="0" b="0"/>
-        </a:effectRef>
-        <a:fontRef idx="minor"/>
-      </dsp:style>
-      <dsp:txBody>
-        <a:bodyPr spcFirstLastPara="0" vert="horz" wrap="square" lIns="12700" tIns="0" rIns="12700" bIns="0" numCol="1" spcCol="1270" anchor="ctr" anchorCtr="0">
-          <a:noAutofit/>
-        </a:bodyPr>
-        <a:lstStyle/>
-        <a:p>
-          <a:pPr lvl="0" algn="ctr" defTabSz="222250">
-            <a:lnSpc>
-              <a:spcPct val="90000"/>
-            </a:lnSpc>
-            <a:spcBef>
-              <a:spcPct val="0"/>
-            </a:spcBef>
-            <a:spcAft>
-              <a:spcPct val="35000"/>
-            </a:spcAft>
-          </a:pPr>
-          <a:endParaRPr lang="en-GB" sz="500" kern="1200"/>
-        </a:p>
-      </dsp:txBody>
-      <dsp:txXfrm>
-        <a:off x="7069574" y="1007052"/>
-        <a:ext cx="64890" cy="64890"/>
-      </dsp:txXfrm>
-    </dsp:sp>
-    <dsp:sp modelId="{9F0FD1FC-514D-4BAB-9922-4EEF3DA665B0}">
-      <dsp:nvSpPr>
-        <dsp:cNvPr id="0" name=""/>
-        <dsp:cNvSpPr/>
-      </dsp:nvSpPr>
-      <dsp:spPr>
-        <a:xfrm>
-          <a:off x="7628939" y="2124"/>
-          <a:ext cx="2634599" cy="1317299"/>
-        </a:xfrm>
-        <a:prstGeom prst="roundRect">
-          <a:avLst>
-            <a:gd name="adj" fmla="val 10000"/>
-          </a:avLst>
-        </a:prstGeom>
-        <a:solidFill>
-          <a:schemeClr val="accent1">
-            <a:hueOff val="0"/>
-            <a:satOff val="0"/>
-            <a:lumOff val="0"/>
-            <a:alphaOff val="0"/>
-          </a:schemeClr>
-        </a:solidFill>
-        <a:ln w="12700" cap="flat" cmpd="sng" algn="ctr">
-          <a:solidFill>
-            <a:schemeClr val="lt1">
-              <a:hueOff val="0"/>
-              <a:satOff val="0"/>
-              <a:lumOff val="0"/>
-              <a:alphaOff val="0"/>
-            </a:schemeClr>
-          </a:solidFill>
-          <a:prstDash val="solid"/>
-          <a:miter lim="800000"/>
-        </a:ln>
-        <a:effectLst/>
-      </dsp:spPr>
-      <dsp:style>
-        <a:lnRef idx="2">
-          <a:scrgbClr r="0" g="0" b="0"/>
-        </a:lnRef>
-        <a:fillRef idx="1">
-          <a:scrgbClr r="0" g="0" b="0"/>
-        </a:fillRef>
-        <a:effectRef idx="0">
-          <a:scrgbClr r="0" g="0" b="0"/>
-        </a:effectRef>
-        <a:fontRef idx="minor">
-          <a:schemeClr val="lt1"/>
-        </a:fontRef>
-      </dsp:style>
-      <dsp:txBody>
-        <a:bodyPr spcFirstLastPara="0" vert="horz" wrap="square" lIns="8255" tIns="8255" rIns="8255" bIns="8255" numCol="1" spcCol="1270" anchor="ctr" anchorCtr="0">
-          <a:noAutofit/>
-        </a:bodyPr>
-        <a:lstStyle/>
-        <a:p>
-          <a:pPr lvl="0" algn="ctr" defTabSz="577850">
-            <a:lnSpc>
-              <a:spcPct val="90000"/>
-            </a:lnSpc>
-            <a:spcBef>
-              <a:spcPct val="0"/>
-            </a:spcBef>
-            <a:spcAft>
-              <a:spcPct val="35000"/>
-            </a:spcAft>
-          </a:pPr>
-          <a:r>
-            <a:rPr lang="da-DK" sz="1300" kern="1200" dirty="0" err="1" smtClean="0"/>
-            <a:t>mClient</a:t>
-          </a:r>
-          <a:r>
-            <a:rPr lang="da-DK" sz="1300" kern="1200" dirty="0" smtClean="0"/>
-            <a:t>::</a:t>
-          </a:r>
-          <a:r>
-            <a:rPr lang="da-DK" sz="1300" kern="1200" dirty="0" err="1" smtClean="0"/>
-            <a:t>HttpClient</a:t>
-          </a:r>
-          <a:endParaRPr lang="en-GB" sz="1300" kern="1200" dirty="0"/>
-        </a:p>
-      </dsp:txBody>
-      <dsp:txXfrm>
-        <a:off x="7667521" y="40706"/>
-        <a:ext cx="2557435" cy="1240135"/>
-      </dsp:txXfrm>
-    </dsp:sp>
-    <dsp:sp modelId="{2739BC17-6545-4BB4-8DA5-AB47358EF6E3}">
-      <dsp:nvSpPr>
-        <dsp:cNvPr id="0" name=""/>
-        <dsp:cNvSpPr/>
-      </dsp:nvSpPr>
-      <dsp:spPr>
-        <a:xfrm rot="2142401">
-          <a:off x="6453115" y="1769699"/>
-          <a:ext cx="1297807" cy="54492"/>
-        </a:xfrm>
-        <a:custGeom>
-          <a:avLst/>
-          <a:gdLst/>
-          <a:ahLst/>
-          <a:cxnLst/>
-          <a:rect l="0" t="0" r="0" b="0"/>
-          <a:pathLst>
-            <a:path>
-              <a:moveTo>
-                <a:pt x="0" y="27246"/>
-              </a:moveTo>
-              <a:lnTo>
-                <a:pt x="1297807" y="27246"/>
-              </a:lnTo>
-            </a:path>
-          </a:pathLst>
-        </a:custGeom>
-        <a:noFill/>
-        <a:ln w="12700" cap="flat" cmpd="sng" algn="ctr">
-          <a:solidFill>
-            <a:schemeClr val="accent1">
-              <a:shade val="80000"/>
-              <a:hueOff val="0"/>
-              <a:satOff val="0"/>
-              <a:lumOff val="0"/>
-              <a:alphaOff val="0"/>
-            </a:schemeClr>
-          </a:solidFill>
-          <a:prstDash val="solid"/>
-          <a:miter lim="800000"/>
-        </a:ln>
-        <a:effectLst/>
-      </dsp:spPr>
-      <dsp:style>
-        <a:lnRef idx="2">
-          <a:scrgbClr r="0" g="0" b="0"/>
-        </a:lnRef>
-        <a:fillRef idx="0">
-          <a:scrgbClr r="0" g="0" b="0"/>
-        </a:fillRef>
-        <a:effectRef idx="0">
-          <a:scrgbClr r="0" g="0" b="0"/>
-        </a:effectRef>
-        <a:fontRef idx="minor"/>
-      </dsp:style>
-      <dsp:txBody>
-        <a:bodyPr spcFirstLastPara="0" vert="horz" wrap="square" lIns="12700" tIns="0" rIns="12700" bIns="0" numCol="1" spcCol="1270" anchor="ctr" anchorCtr="0">
-          <a:noAutofit/>
-        </a:bodyPr>
-        <a:lstStyle/>
-        <a:p>
-          <a:pPr lvl="0" algn="ctr" defTabSz="222250">
-            <a:lnSpc>
-              <a:spcPct val="90000"/>
-            </a:lnSpc>
-            <a:spcBef>
-              <a:spcPct val="0"/>
-            </a:spcBef>
-            <a:spcAft>
-              <a:spcPct val="35000"/>
-            </a:spcAft>
-          </a:pPr>
-          <a:endParaRPr lang="en-GB" sz="500" kern="1200"/>
-        </a:p>
-      </dsp:txBody>
-      <dsp:txXfrm>
-        <a:off x="7069574" y="1764500"/>
-        <a:ext cx="64890" cy="64890"/>
-      </dsp:txXfrm>
-    </dsp:sp>
-    <dsp:sp modelId="{C6D84F83-5413-4EAA-AC66-99AA0AB75FB6}">
-      <dsp:nvSpPr>
-        <dsp:cNvPr id="0" name=""/>
-        <dsp:cNvSpPr/>
-      </dsp:nvSpPr>
-      <dsp:spPr>
-        <a:xfrm>
-          <a:off x="7628939" y="1517019"/>
-          <a:ext cx="2634599" cy="1317299"/>
-        </a:xfrm>
-        <a:prstGeom prst="roundRect">
-          <a:avLst>
-            <a:gd name="adj" fmla="val 10000"/>
-          </a:avLst>
-        </a:prstGeom>
-        <a:solidFill>
-          <a:schemeClr val="accent1">
-            <a:hueOff val="0"/>
-            <a:satOff val="0"/>
-            <a:lumOff val="0"/>
-            <a:alphaOff val="0"/>
-          </a:schemeClr>
-        </a:solidFill>
-        <a:ln w="12700" cap="flat" cmpd="sng" algn="ctr">
-          <a:solidFill>
-            <a:schemeClr val="lt1">
-              <a:hueOff val="0"/>
-              <a:satOff val="0"/>
-              <a:lumOff val="0"/>
-              <a:alphaOff val="0"/>
-            </a:schemeClr>
-          </a:solidFill>
-          <a:prstDash val="solid"/>
-          <a:miter lim="800000"/>
-        </a:ln>
-        <a:effectLst/>
-      </dsp:spPr>
-      <dsp:style>
-        <a:lnRef idx="2">
-          <a:scrgbClr r="0" g="0" b="0"/>
-        </a:lnRef>
-        <a:fillRef idx="1">
-          <a:scrgbClr r="0" g="0" b="0"/>
-        </a:fillRef>
-        <a:effectRef idx="0">
-          <a:scrgbClr r="0" g="0" b="0"/>
-        </a:effectRef>
-        <a:fontRef idx="minor">
-          <a:schemeClr val="lt1"/>
-        </a:fontRef>
-      </dsp:style>
-      <dsp:txBody>
-        <a:bodyPr spcFirstLastPara="0" vert="horz" wrap="square" lIns="8255" tIns="8255" rIns="8255" bIns="8255" numCol="1" spcCol="1270" anchor="ctr" anchorCtr="0">
-          <a:noAutofit/>
-        </a:bodyPr>
-        <a:lstStyle/>
-        <a:p>
-          <a:pPr lvl="0" algn="ctr" defTabSz="577850">
-            <a:lnSpc>
-              <a:spcPct val="90000"/>
-            </a:lnSpc>
-            <a:spcBef>
-              <a:spcPct val="0"/>
-            </a:spcBef>
-            <a:spcAft>
-              <a:spcPct val="35000"/>
-            </a:spcAft>
-          </a:pPr>
-          <a:r>
-            <a:rPr lang="en-GB" sz="1300" kern="1200" err="1" smtClean="0"/>
-            <a:t>activeGoProAPI</a:t>
-          </a:r>
-          <a:r>
-            <a:rPr lang="en-GB" sz="1300" kern="1200" smtClean="0"/>
-            <a:t>::GoProAPIconstants</a:t>
-          </a:r>
-          <a:endParaRPr lang="en-GB" sz="1300" kern="1200" dirty="0"/>
-        </a:p>
-      </dsp:txBody>
-      <dsp:txXfrm>
-        <a:off x="7667521" y="1555601"/>
-        <a:ext cx="2557435" cy="1240135"/>
-      </dsp:txXfrm>
-    </dsp:sp>
-    <dsp:sp modelId="{BCA4B487-17B2-4CCC-B602-C10F2A180696}">
-      <dsp:nvSpPr>
-        <dsp:cNvPr id="0" name=""/>
-        <dsp:cNvSpPr/>
-      </dsp:nvSpPr>
-      <dsp:spPr>
-        <a:xfrm rot="2829178">
-          <a:off x="2638747" y="3095231"/>
-          <a:ext cx="1549665" cy="54492"/>
-        </a:xfrm>
-        <a:custGeom>
-          <a:avLst/>
-          <a:gdLst/>
-          <a:ahLst/>
-          <a:cxnLst/>
-          <a:rect l="0" t="0" r="0" b="0"/>
-          <a:pathLst>
-            <a:path>
-              <a:moveTo>
-                <a:pt x="0" y="27246"/>
-              </a:moveTo>
-              <a:lnTo>
-                <a:pt x="1549665" y="27246"/>
-              </a:lnTo>
-            </a:path>
-          </a:pathLst>
-        </a:custGeom>
-        <a:noFill/>
-        <a:ln w="12700" cap="flat" cmpd="sng" algn="ctr">
-          <a:solidFill>
-            <a:schemeClr val="accent1">
-              <a:shade val="60000"/>
-              <a:hueOff val="0"/>
-              <a:satOff val="0"/>
-              <a:lumOff val="0"/>
-              <a:alphaOff val="0"/>
-            </a:schemeClr>
-          </a:solidFill>
-          <a:prstDash val="solid"/>
-          <a:miter lim="800000"/>
-        </a:ln>
-        <a:effectLst/>
-      </dsp:spPr>
-      <dsp:style>
-        <a:lnRef idx="2">
-          <a:scrgbClr r="0" g="0" b="0"/>
-        </a:lnRef>
-        <a:fillRef idx="0">
-          <a:scrgbClr r="0" g="0" b="0"/>
-        </a:fillRef>
-        <a:effectRef idx="0">
-          <a:scrgbClr r="0" g="0" b="0"/>
-        </a:effectRef>
-        <a:fontRef idx="minor"/>
-      </dsp:style>
-      <dsp:txBody>
-        <a:bodyPr spcFirstLastPara="0" vert="horz" wrap="square" lIns="12700" tIns="0" rIns="12700" bIns="0" numCol="1" spcCol="1270" anchor="ctr" anchorCtr="0">
-          <a:noAutofit/>
-        </a:bodyPr>
-        <a:lstStyle/>
-        <a:p>
-          <a:pPr lvl="0" algn="ctr" defTabSz="222250">
-            <a:lnSpc>
-              <a:spcPct val="90000"/>
-            </a:lnSpc>
-            <a:spcBef>
-              <a:spcPct val="0"/>
-            </a:spcBef>
-            <a:spcAft>
-              <a:spcPct val="35000"/>
-            </a:spcAft>
-          </a:pPr>
-          <a:endParaRPr lang="en-GB" sz="500" kern="1200"/>
-        </a:p>
-      </dsp:txBody>
-      <dsp:txXfrm>
-        <a:off x="3374838" y="3083736"/>
-        <a:ext cx="77483" cy="77483"/>
-      </dsp:txXfrm>
-    </dsp:sp>
-    <dsp:sp modelId="{8429CEE7-FE1C-4D21-98C4-57718A675A1C}">
-      <dsp:nvSpPr>
-        <dsp:cNvPr id="0" name=""/>
-        <dsp:cNvSpPr/>
-      </dsp:nvSpPr>
-      <dsp:spPr>
-        <a:xfrm>
-          <a:off x="3940500" y="3031913"/>
-          <a:ext cx="2634599" cy="1317299"/>
-        </a:xfrm>
-        <a:prstGeom prst="roundRect">
-          <a:avLst>
-            <a:gd name="adj" fmla="val 10000"/>
-          </a:avLst>
-        </a:prstGeom>
-        <a:solidFill>
-          <a:schemeClr val="accent1">
-            <a:hueOff val="0"/>
-            <a:satOff val="0"/>
-            <a:lumOff val="0"/>
-            <a:alphaOff val="0"/>
-          </a:schemeClr>
-        </a:solidFill>
-        <a:ln w="12700" cap="flat" cmpd="sng" algn="ctr">
-          <a:solidFill>
-            <a:schemeClr val="lt1">
-              <a:hueOff val="0"/>
-              <a:satOff val="0"/>
-              <a:lumOff val="0"/>
-              <a:alphaOff val="0"/>
-            </a:schemeClr>
-          </a:solidFill>
-          <a:prstDash val="solid"/>
-          <a:miter lim="800000"/>
-        </a:ln>
-        <a:effectLst/>
-      </dsp:spPr>
-      <dsp:style>
-        <a:lnRef idx="2">
-          <a:scrgbClr r="0" g="0" b="0"/>
-        </a:lnRef>
-        <a:fillRef idx="1">
-          <a:scrgbClr r="0" g="0" b="0"/>
-        </a:fillRef>
-        <a:effectRef idx="0">
-          <a:scrgbClr r="0" g="0" b="0"/>
-        </a:effectRef>
-        <a:fontRef idx="minor">
-          <a:schemeClr val="lt1"/>
-        </a:fontRef>
-      </dsp:style>
-      <dsp:txBody>
-        <a:bodyPr spcFirstLastPara="0" vert="horz" wrap="square" lIns="8255" tIns="8255" rIns="8255" bIns="8255" numCol="1" spcCol="1270" anchor="ctr" anchorCtr="0">
-          <a:noAutofit/>
-        </a:bodyPr>
-        <a:lstStyle/>
-        <a:p>
-          <a:pPr lvl="0" algn="ctr" defTabSz="577850">
-            <a:lnSpc>
-              <a:spcPct val="90000"/>
-            </a:lnSpc>
-            <a:spcBef>
-              <a:spcPct val="0"/>
-            </a:spcBef>
-            <a:spcAft>
-              <a:spcPct val="35000"/>
-            </a:spcAft>
-          </a:pPr>
-          <a:endParaRPr lang="en-GB" sz="1300" kern="1200"/>
-        </a:p>
-      </dsp:txBody>
-      <dsp:txXfrm>
-        <a:off x="3979082" y="3070495"/>
-        <a:ext cx="2557435" cy="1240135"/>
-      </dsp:txXfrm>
-    </dsp:sp>
-    <dsp:sp modelId="{E3AA8C3A-73A5-4744-B386-BF6D3D88B9B5}">
-      <dsp:nvSpPr>
-        <dsp:cNvPr id="0" name=""/>
-        <dsp:cNvSpPr/>
-      </dsp:nvSpPr>
-      <dsp:spPr>
-        <a:xfrm>
-          <a:off x="6575099" y="3663317"/>
-          <a:ext cx="1053839" cy="54492"/>
-        </a:xfrm>
-        <a:custGeom>
-          <a:avLst/>
-          <a:gdLst/>
-          <a:ahLst/>
-          <a:cxnLst/>
-          <a:rect l="0" t="0" r="0" b="0"/>
-          <a:pathLst>
-            <a:path>
-              <a:moveTo>
-                <a:pt x="0" y="27246"/>
-              </a:moveTo>
-              <a:lnTo>
-                <a:pt x="1053839" y="27246"/>
-              </a:lnTo>
-            </a:path>
-          </a:pathLst>
-        </a:custGeom>
-        <a:noFill/>
-        <a:ln w="12700" cap="flat" cmpd="sng" algn="ctr">
-          <a:solidFill>
-            <a:schemeClr val="accent1">
-              <a:shade val="80000"/>
-              <a:hueOff val="0"/>
-              <a:satOff val="0"/>
-              <a:lumOff val="0"/>
-              <a:alphaOff val="0"/>
-            </a:schemeClr>
-          </a:solidFill>
-          <a:prstDash val="solid"/>
-          <a:miter lim="800000"/>
-        </a:ln>
-        <a:effectLst/>
-      </dsp:spPr>
-      <dsp:style>
-        <a:lnRef idx="2">
-          <a:scrgbClr r="0" g="0" b="0"/>
-        </a:lnRef>
-        <a:fillRef idx="0">
-          <a:scrgbClr r="0" g="0" b="0"/>
-        </a:fillRef>
-        <a:effectRef idx="0">
-          <a:scrgbClr r="0" g="0" b="0"/>
-        </a:effectRef>
-        <a:fontRef idx="minor"/>
-      </dsp:style>
-      <dsp:txBody>
-        <a:bodyPr spcFirstLastPara="0" vert="horz" wrap="square" lIns="12700" tIns="0" rIns="12700" bIns="0" numCol="1" spcCol="1270" anchor="ctr" anchorCtr="0">
-          <a:noAutofit/>
-        </a:bodyPr>
-        <a:lstStyle/>
-        <a:p>
-          <a:pPr lvl="0" algn="ctr" defTabSz="222250">
-            <a:lnSpc>
-              <a:spcPct val="90000"/>
-            </a:lnSpc>
-            <a:spcBef>
-              <a:spcPct val="0"/>
-            </a:spcBef>
-            <a:spcAft>
-              <a:spcPct val="35000"/>
-            </a:spcAft>
-          </a:pPr>
-          <a:endParaRPr lang="en-GB" sz="500" kern="1200"/>
-        </a:p>
-      </dsp:txBody>
-      <dsp:txXfrm>
-        <a:off x="7075673" y="3664217"/>
-        <a:ext cx="52691" cy="52691"/>
-      </dsp:txXfrm>
-    </dsp:sp>
-    <dsp:sp modelId="{35E51A8A-B501-4C80-8C19-169EE305B69B}">
-      <dsp:nvSpPr>
-        <dsp:cNvPr id="0" name=""/>
-        <dsp:cNvSpPr/>
-      </dsp:nvSpPr>
-      <dsp:spPr>
-        <a:xfrm>
-          <a:off x="7628939" y="3031913"/>
-          <a:ext cx="2634599" cy="1317299"/>
-        </a:xfrm>
-        <a:prstGeom prst="roundRect">
-          <a:avLst>
-            <a:gd name="adj" fmla="val 10000"/>
-          </a:avLst>
-        </a:prstGeom>
-        <a:solidFill>
-          <a:schemeClr val="accent1">
-            <a:hueOff val="0"/>
-            <a:satOff val="0"/>
-            <a:lumOff val="0"/>
-            <a:alphaOff val="0"/>
-          </a:schemeClr>
-        </a:solidFill>
-        <a:ln w="12700" cap="flat" cmpd="sng" algn="ctr">
-          <a:solidFill>
-            <a:schemeClr val="lt1">
-              <a:hueOff val="0"/>
-              <a:satOff val="0"/>
-              <a:lumOff val="0"/>
-              <a:alphaOff val="0"/>
-            </a:schemeClr>
-          </a:solidFill>
-          <a:prstDash val="solid"/>
-          <a:miter lim="800000"/>
-        </a:ln>
-        <a:effectLst/>
-      </dsp:spPr>
-      <dsp:style>
-        <a:lnRef idx="2">
-          <a:scrgbClr r="0" g="0" b="0"/>
-        </a:lnRef>
-        <a:fillRef idx="1">
-          <a:scrgbClr r="0" g="0" b="0"/>
-        </a:fillRef>
-        <a:effectRef idx="0">
-          <a:scrgbClr r="0" g="0" b="0"/>
-        </a:effectRef>
-        <a:fontRef idx="minor">
-          <a:schemeClr val="lt1"/>
-        </a:fontRef>
-      </dsp:style>
-      <dsp:txBody>
-        <a:bodyPr spcFirstLastPara="0" vert="horz" wrap="square" lIns="8255" tIns="8255" rIns="8255" bIns="8255" numCol="1" spcCol="1270" anchor="ctr" anchorCtr="0">
-          <a:noAutofit/>
-        </a:bodyPr>
-        <a:lstStyle/>
-        <a:p>
-          <a:pPr lvl="0" algn="ctr" defTabSz="577850">
-            <a:lnSpc>
-              <a:spcPct val="90000"/>
-            </a:lnSpc>
-            <a:spcBef>
-              <a:spcPct val="0"/>
-            </a:spcBef>
-            <a:spcAft>
-              <a:spcPct val="35000"/>
-            </a:spcAft>
-          </a:pPr>
-          <a:endParaRPr lang="en-GB" sz="1300" kern="1200"/>
-        </a:p>
-      </dsp:txBody>
-      <dsp:txXfrm>
-        <a:off x="7667521" y="3070495"/>
-        <a:ext cx="2557435" cy="1240135"/>
-      </dsp:txXfrm>
-    </dsp:sp>
   </dsp:spTree>
 </dsp:drawing>
 </file>
@@ -18830,7 +16540,7 @@
         <p:spPr/>
         <p:txBody>
           <a:bodyPr>
-            <a:normAutofit fontScale="77500" lnSpcReduction="20000"/>
+            <a:normAutofit fontScale="62500" lnSpcReduction="20000"/>
           </a:bodyPr>
           <a:lstStyle/>
           <a:p>
@@ -18965,7 +16675,63 @@
           </a:p>
           <a:p>
             <a:pPr lvl="1"/>
+            <a:r>
+              <a:rPr lang="en-US" dirty="0" smtClean="0"/>
+              <a:t>Java-</a:t>
+            </a:r>
+            <a:r>
+              <a:rPr lang="en-US" dirty="0" err="1" smtClean="0"/>
+              <a:t>json</a:t>
+            </a:r>
+            <a:r>
+              <a:rPr lang="en-US" dirty="0"/>
+              <a:t>  (</a:t>
+            </a:r>
+            <a:r>
+              <a:rPr lang="en-US" dirty="0">
+                <a:hlinkClick r:id="rId7"/>
+              </a:rPr>
+              <a:t>http://</a:t>
+            </a:r>
+            <a:r>
+              <a:rPr lang="en-US" dirty="0" smtClean="0">
+                <a:hlinkClick r:id="rId7"/>
+              </a:rPr>
+              <a:t>www.java2s.com/Code/Jar/j/Downloadjavajsonjar.htm</a:t>
+            </a:r>
+            <a:r>
+              <a:rPr lang="en-US" dirty="0" smtClean="0"/>
+              <a:t> )</a:t>
+            </a:r>
             <a:endParaRPr lang="en-US" dirty="0"/>
+          </a:p>
+          <a:p>
+            <a:pPr lvl="1"/>
+            <a:endParaRPr lang="en-US" dirty="0" smtClean="0"/>
+          </a:p>
+          <a:p>
+            <a:pPr lvl="1"/>
+            <a:r>
+              <a:rPr lang="en-US" b="1" dirty="0" smtClean="0"/>
+              <a:t>A working version of </a:t>
+            </a:r>
+            <a:r>
+              <a:rPr lang="en-US" b="1" smtClean="0"/>
+              <a:t>all binary libraries </a:t>
+            </a:r>
+            <a:r>
+              <a:rPr lang="en-US" b="1" dirty="0" smtClean="0"/>
+              <a:t>is located in </a:t>
+            </a:r>
+            <a:r>
+              <a:rPr lang="en-US" b="1" dirty="0"/>
+              <a:t>the “libs working </a:t>
+            </a:r>
+            <a:r>
+              <a:rPr lang="en-US" b="1" dirty="0" smtClean="0"/>
+              <a:t>versions.zip” file.</a:t>
+            </a:r>
+            <a:endParaRPr lang="en-US" b="1" dirty="0"/>
           </a:p>
           <a:p>
             <a:pPr marL="0" indent="0">
@@ -18996,13 +16762,13 @@
             </a:pPr>
             <a:r>
               <a:rPr lang="en-US" dirty="0">
-                <a:hlinkClick r:id="rId7"/>
+                <a:hlinkClick r:id="rId8"/>
               </a:rPr>
               <a:t>https://</a:t>
             </a:r>
             <a:r>
               <a:rPr lang="en-US" dirty="0" smtClean="0">
-                <a:hlinkClick r:id="rId7"/>
+                <a:hlinkClick r:id="rId8"/>
               </a:rPr>
               <a:t>github.com/KonradIT/goprowifihack</a:t>
             </a:r>
@@ -19014,13 +16780,13 @@
             </a:pPr>
             <a:r>
               <a:rPr lang="en-US" dirty="0">
-                <a:hlinkClick r:id="rId8"/>
+                <a:hlinkClick r:id="rId9"/>
               </a:rPr>
               <a:t>https://</a:t>
             </a:r>
             <a:r>
               <a:rPr lang="en-US" dirty="0" smtClean="0">
-                <a:hlinkClick r:id="rId8"/>
+                <a:hlinkClick r:id="rId9"/>
               </a:rPr>
               <a:t>github.com/DomDomHaas/gopro-wifi-API</a:t>
             </a:r>
@@ -19055,7 +16821,7 @@
         </p:nvSpPr>
         <p:spPr>
           <a:xfrm>
-            <a:off x="9010780" y="2547646"/>
+            <a:off x="9111448" y="3193599"/>
             <a:ext cx="2946270" cy="1477328"/>
           </a:xfrm>
           <a:prstGeom prst="rect">

</xml_diff>